<commit_message>
Teste commit adicionei nome
</commit_message>
<xml_diff>
--- a/Apresentacoes/v01.pptx
+++ b/Apresentacoes/v01.pptx
@@ -120,6 +120,36 @@
       </a:defRPr>
     </a:lvl9pPr>
   </p:defaultTextStyle>
+  <p:extLst>
+    <p:ext uri="{EFAFB233-063F-42B5-8137-9DF3F51BA10A}">
+      <p15:sldGuideLst xmlns:p15="http://schemas.microsoft.com/office/powerpoint/2012/main">
+        <p15:guide id="1" orient="horz" pos="1800">
+          <p15:clr>
+            <a:srgbClr val="A4A3A4"/>
+          </p15:clr>
+        </p15:guide>
+        <p15:guide id="2" pos="2880">
+          <p15:clr>
+            <a:srgbClr val="A4A3A4"/>
+          </p15:clr>
+        </p15:guide>
+      </p15:sldGuideLst>
+    </p:ext>
+    <p:ext uri="{2D200454-40CA-4A62-9FC3-DE9A4176ACB9}">
+      <p15:notesGuideLst xmlns:p15="http://schemas.microsoft.com/office/powerpoint/2012/main">
+        <p15:guide id="1" orient="horz" pos="2880">
+          <p15:clr>
+            <a:srgbClr val="A4A3A4"/>
+          </p15:clr>
+        </p15:guide>
+        <p15:guide id="2" pos="2160">
+          <p15:clr>
+            <a:srgbClr val="A4A3A4"/>
+          </p15:clr>
+        </p15:guide>
+      </p15:notesGuideLst>
+    </p:ext>
+  </p:extLst>
 </p:presentation>
 </file>
 
@@ -206,7 +236,7 @@
             <a:fld id="{26E7F2CC-330F-4FEA-A2B0-657791948129}" type="datetimeFigureOut">
               <a:rPr lang="pt-PT" smtClean="0"/>
               <a:pPr/>
-              <a:t>24/03/2014</a:t>
+              <a:t>25-03-2014</a:t>
             </a:fld>
             <a:endParaRPr lang="pt-PT"/>
           </a:p>
@@ -280,6 +310,11 @@
         </p:txBody>
       </p:sp>
     </p:spTree>
+    <p:extLst>
+      <p:ext uri="{BB962C8B-B14F-4D97-AF65-F5344CB8AC3E}">
+        <p14:creationId xmlns:p14="http://schemas.microsoft.com/office/powerpoint/2010/main" val="2066723714"/>
+      </p:ext>
+    </p:extLst>
   </p:cSld>
   <p:clrMap bg1="lt1" tx1="dk1" bg2="lt2" tx2="dk2" accent1="accent1" accent2="accent2" accent3="accent3" accent4="accent4" accent5="accent5" accent6="accent6" hlink="hlink" folHlink="folHlink"/>
 </p:handoutMaster>
@@ -467,7 +502,7 @@
             <a:fld id="{57B51982-E955-4F1A-BFA0-0F0AB3300023}" type="datetimeFigureOut">
               <a:rPr lang="pt-PT" smtClean="0"/>
               <a:pPr/>
-              <a:t>24/03/2014</a:t>
+              <a:t>25-03-2014</a:t>
             </a:fld>
             <a:endParaRPr lang="pt-PT"/>
           </a:p>
@@ -634,7 +669,7 @@
             <a:fld id="{57B51982-E955-4F1A-BFA0-0F0AB3300023}" type="datetimeFigureOut">
               <a:rPr lang="pt-PT" smtClean="0"/>
               <a:pPr/>
-              <a:t>24/03/2014</a:t>
+              <a:t>25-03-2014</a:t>
             </a:fld>
             <a:endParaRPr lang="pt-PT"/>
           </a:p>
@@ -811,7 +846,7 @@
             <a:fld id="{57B51982-E955-4F1A-BFA0-0F0AB3300023}" type="datetimeFigureOut">
               <a:rPr lang="pt-PT" smtClean="0"/>
               <a:pPr/>
-              <a:t>24/03/2014</a:t>
+              <a:t>25-03-2014</a:t>
             </a:fld>
             <a:endParaRPr lang="pt-PT"/>
           </a:p>
@@ -903,7 +938,7 @@
             <a:fld id="{57B51982-E955-4F1A-BFA0-0F0AB3300023}" type="datetimeFigureOut">
               <a:rPr lang="pt-PT" smtClean="0"/>
               <a:pPr/>
-              <a:t>24/03/2014</a:t>
+              <a:t>25-03-2014</a:t>
             </a:fld>
             <a:endParaRPr lang="pt-PT"/>
           </a:p>
@@ -1095,7 +1130,7 @@
             <a:fld id="{57B51982-E955-4F1A-BFA0-0F0AB3300023}" type="datetimeFigureOut">
               <a:rPr lang="pt-PT" smtClean="0"/>
               <a:pPr/>
-              <a:t>24/03/2014</a:t>
+              <a:t>25-03-2014</a:t>
             </a:fld>
             <a:endParaRPr lang="pt-PT"/>
           </a:p>
@@ -1403,7 +1438,7 @@
             <a:fld id="{57B51982-E955-4F1A-BFA0-0F0AB3300023}" type="datetimeFigureOut">
               <a:rPr lang="pt-PT" smtClean="0"/>
               <a:pPr/>
-              <a:t>24/03/2014</a:t>
+              <a:t>25-03-2014</a:t>
             </a:fld>
             <a:endParaRPr lang="pt-PT"/>
           </a:p>
@@ -1529,7 +1564,7 @@
           <a:p>
             <a:fld id="{977049CB-4CB5-45FE-B82E-F474B91E1741}" type="datetimeFigureOut">
               <a:rPr lang="pt-PT" smtClean="0"/>
-              <a:t>24/03/2014</a:t>
+              <a:t>25-03-2014</a:t>
             </a:fld>
             <a:endParaRPr lang="pt-PT"/>
           </a:p>
@@ -1828,7 +1863,7 @@
           <a:p>
             <a:fld id="{92136B68-69E5-45CD-8C6F-F60CE3B7E52C}" type="datetimeFigureOut">
               <a:rPr lang="pt-PT" smtClean="0"/>
-              <a:t>25/03/2014</a:t>
+              <a:t>25-03-2014</a:t>
             </a:fld>
             <a:endParaRPr lang="pt-PT"/>
           </a:p>
@@ -2051,7 +2086,7 @@
             <a:fld id="{57B51982-E955-4F1A-BFA0-0F0AB3300023}" type="datetimeFigureOut">
               <a:rPr lang="pt-PT" smtClean="0"/>
               <a:pPr/>
-              <a:t>24/03/2014</a:t>
+              <a:t>25-03-2014</a:t>
             </a:fld>
             <a:endParaRPr lang="pt-PT"/>
           </a:p>
@@ -2294,7 +2329,7 @@
             <a:fld id="{57B51982-E955-4F1A-BFA0-0F0AB3300023}" type="datetimeFigureOut">
               <a:rPr lang="pt-PT" smtClean="0"/>
               <a:pPr/>
-              <a:t>24/03/2014</a:t>
+              <a:t>25-03-2014</a:t>
             </a:fld>
             <a:endParaRPr lang="pt-PT"/>
           </a:p>
@@ -2579,7 +2614,7 @@
             <a:fld id="{57B51982-E955-4F1A-BFA0-0F0AB3300023}" type="datetimeFigureOut">
               <a:rPr lang="pt-PT" smtClean="0"/>
               <a:pPr/>
-              <a:t>24/03/2014</a:t>
+              <a:t>25-03-2014</a:t>
             </a:fld>
             <a:endParaRPr lang="pt-PT"/>
           </a:p>
@@ -3003,7 +3038,7 @@
             <a:fld id="{57B51982-E955-4F1A-BFA0-0F0AB3300023}" type="datetimeFigureOut">
               <a:rPr lang="pt-PT" smtClean="0"/>
               <a:pPr/>
-              <a:t>24/03/2014</a:t>
+              <a:t>25-03-2014</a:t>
             </a:fld>
             <a:endParaRPr lang="pt-PT"/>
           </a:p>
@@ -3118,7 +3153,7 @@
             <a:fld id="{57B51982-E955-4F1A-BFA0-0F0AB3300023}" type="datetimeFigureOut">
               <a:rPr lang="pt-PT" smtClean="0"/>
               <a:pPr/>
-              <a:t>24/03/2014</a:t>
+              <a:t>25-03-2014</a:t>
             </a:fld>
             <a:endParaRPr lang="pt-PT"/>
           </a:p>
@@ -3210,7 +3245,7 @@
             <a:fld id="{57B51982-E955-4F1A-BFA0-0F0AB3300023}" type="datetimeFigureOut">
               <a:rPr lang="pt-PT" smtClean="0"/>
               <a:pPr/>
-              <a:t>24/03/2014</a:t>
+              <a:t>25-03-2014</a:t>
             </a:fld>
             <a:endParaRPr lang="pt-PT"/>
           </a:p>
@@ -3484,7 +3519,7 @@
             <a:fld id="{57B51982-E955-4F1A-BFA0-0F0AB3300023}" type="datetimeFigureOut">
               <a:rPr lang="pt-PT" smtClean="0"/>
               <a:pPr/>
-              <a:t>24/03/2014</a:t>
+              <a:t>25-03-2014</a:t>
             </a:fld>
             <a:endParaRPr lang="pt-PT"/>
           </a:p>
@@ -3734,7 +3769,7 @@
             <a:fld id="{57B51982-E955-4F1A-BFA0-0F0AB3300023}" type="datetimeFigureOut">
               <a:rPr lang="pt-PT" smtClean="0"/>
               <a:pPr/>
-              <a:t>24/03/2014</a:t>
+              <a:t>25-03-2014</a:t>
             </a:fld>
             <a:endParaRPr lang="pt-PT"/>
           </a:p>
@@ -3969,7 +4004,7 @@
             <a:fld id="{57B51982-E955-4F1A-BFA0-0F0AB3300023}" type="datetimeFigureOut">
               <a:rPr lang="pt-PT" smtClean="0"/>
               <a:pPr/>
-              <a:t>24/03/2014</a:t>
+              <a:t>25-03-2014</a:t>
             </a:fld>
             <a:endParaRPr lang="pt-PT"/>
           </a:p>
@@ -4478,7 +4513,7 @@
           <a:p>
             <a:fld id="{977049CB-4CB5-45FE-B82E-F474B91E1741}" type="datetimeFigureOut">
               <a:rPr lang="pt-PT" smtClean="0"/>
-              <a:t>24/03/2014</a:t>
+              <a:t>25-03-2014</a:t>
             </a:fld>
             <a:endParaRPr lang="pt-PT"/>
           </a:p>
@@ -4973,7 +5008,7 @@
           <a:p>
             <a:fld id="{92136B68-69E5-45CD-8C6F-F60CE3B7E52C}" type="datetimeFigureOut">
               <a:rPr lang="pt-PT" smtClean="0"/>
-              <a:t>25/03/2014</a:t>
+              <a:t>25-03-2014</a:t>
             </a:fld>
             <a:endParaRPr lang="pt-PT"/>
           </a:p>
@@ -5436,6 +5471,11 @@
           </p:cNvGraphicFramePr>
           <p:nvPr>
             <p:ph type="tbl" sz="quarter" idx="13"/>
+            <p:extLst>
+              <p:ext uri="{D42A27DB-BD31-4B8C-83A1-F6EECF244321}">
+                <p14:modId xmlns:p14="http://schemas.microsoft.com/office/powerpoint/2010/main" val="3897326886"/>
+              </p:ext>
+            </p:extLst>
           </p:nvPr>
         </p:nvGraphicFramePr>
         <p:xfrm>
@@ -5558,7 +5598,7 @@
                     <a:p>
                       <a:r>
                         <a:rPr lang="pt-PT" sz="1400" dirty="0" smtClean="0"/>
-                        <a:t>João</a:t>
+                        <a:t>João Carvalho</a:t>
                       </a:r>
                       <a:endParaRPr lang="pt-PT" sz="1400" dirty="0"/>
                     </a:p>

</xml_diff>

<commit_message>
Nova versão da app, com possibilidade de inserção do endereço ip do servidor.
</commit_message>
<xml_diff>
--- a/Apresentacoes/v01.pptx
+++ b/Apresentacoes/v01.pptx
@@ -120,36 +120,6 @@
       </a:defRPr>
     </a:lvl9pPr>
   </p:defaultTextStyle>
-  <p:extLst>
-    <p:ext uri="{EFAFB233-063F-42B5-8137-9DF3F51BA10A}">
-      <p15:sldGuideLst xmlns:p15="http://schemas.microsoft.com/office/powerpoint/2012/main">
-        <p15:guide id="1" orient="horz" pos="1800">
-          <p15:clr>
-            <a:srgbClr val="A4A3A4"/>
-          </p15:clr>
-        </p15:guide>
-        <p15:guide id="2" pos="2880">
-          <p15:clr>
-            <a:srgbClr val="A4A3A4"/>
-          </p15:clr>
-        </p15:guide>
-      </p15:sldGuideLst>
-    </p:ext>
-    <p:ext uri="{2D200454-40CA-4A62-9FC3-DE9A4176ACB9}">
-      <p15:notesGuideLst xmlns:p15="http://schemas.microsoft.com/office/powerpoint/2012/main">
-        <p15:guide id="1" orient="horz" pos="2880">
-          <p15:clr>
-            <a:srgbClr val="A4A3A4"/>
-          </p15:clr>
-        </p15:guide>
-        <p15:guide id="2" pos="2160">
-          <p15:clr>
-            <a:srgbClr val="A4A3A4"/>
-          </p15:clr>
-        </p15:guide>
-      </p15:notesGuideLst>
-    </p:ext>
-  </p:extLst>
 </p:presentation>
 </file>
 
@@ -236,7 +206,7 @@
             <a:fld id="{26E7F2CC-330F-4FEA-A2B0-657791948129}" type="datetimeFigureOut">
               <a:rPr lang="pt-PT" smtClean="0"/>
               <a:pPr/>
-              <a:t>25-03-2014</a:t>
+              <a:t>24/03/2014</a:t>
             </a:fld>
             <a:endParaRPr lang="pt-PT"/>
           </a:p>
@@ -310,11 +280,6 @@
         </p:txBody>
       </p:sp>
     </p:spTree>
-    <p:extLst>
-      <p:ext uri="{BB962C8B-B14F-4D97-AF65-F5344CB8AC3E}">
-        <p14:creationId xmlns:p14="http://schemas.microsoft.com/office/powerpoint/2010/main" val="2066723714"/>
-      </p:ext>
-    </p:extLst>
   </p:cSld>
   <p:clrMap bg1="lt1" tx1="dk1" bg2="lt2" tx2="dk2" accent1="accent1" accent2="accent2" accent3="accent3" accent4="accent4" accent5="accent5" accent6="accent6" hlink="hlink" folHlink="folHlink"/>
 </p:handoutMaster>
@@ -502,7 +467,7 @@
             <a:fld id="{57B51982-E955-4F1A-BFA0-0F0AB3300023}" type="datetimeFigureOut">
               <a:rPr lang="pt-PT" smtClean="0"/>
               <a:pPr/>
-              <a:t>25-03-2014</a:t>
+              <a:t>24/03/2014</a:t>
             </a:fld>
             <a:endParaRPr lang="pt-PT"/>
           </a:p>
@@ -669,7 +634,7 @@
             <a:fld id="{57B51982-E955-4F1A-BFA0-0F0AB3300023}" type="datetimeFigureOut">
               <a:rPr lang="pt-PT" smtClean="0"/>
               <a:pPr/>
-              <a:t>25-03-2014</a:t>
+              <a:t>24/03/2014</a:t>
             </a:fld>
             <a:endParaRPr lang="pt-PT"/>
           </a:p>
@@ -846,7 +811,7 @@
             <a:fld id="{57B51982-E955-4F1A-BFA0-0F0AB3300023}" type="datetimeFigureOut">
               <a:rPr lang="pt-PT" smtClean="0"/>
               <a:pPr/>
-              <a:t>25-03-2014</a:t>
+              <a:t>24/03/2014</a:t>
             </a:fld>
             <a:endParaRPr lang="pt-PT"/>
           </a:p>
@@ -938,7 +903,7 @@
             <a:fld id="{57B51982-E955-4F1A-BFA0-0F0AB3300023}" type="datetimeFigureOut">
               <a:rPr lang="pt-PT" smtClean="0"/>
               <a:pPr/>
-              <a:t>25-03-2014</a:t>
+              <a:t>24/03/2014</a:t>
             </a:fld>
             <a:endParaRPr lang="pt-PT"/>
           </a:p>
@@ -1130,7 +1095,7 @@
             <a:fld id="{57B51982-E955-4F1A-BFA0-0F0AB3300023}" type="datetimeFigureOut">
               <a:rPr lang="pt-PT" smtClean="0"/>
               <a:pPr/>
-              <a:t>25-03-2014</a:t>
+              <a:t>24/03/2014</a:t>
             </a:fld>
             <a:endParaRPr lang="pt-PT"/>
           </a:p>
@@ -1438,7 +1403,7 @@
             <a:fld id="{57B51982-E955-4F1A-BFA0-0F0AB3300023}" type="datetimeFigureOut">
               <a:rPr lang="pt-PT" smtClean="0"/>
               <a:pPr/>
-              <a:t>25-03-2014</a:t>
+              <a:t>24/03/2014</a:t>
             </a:fld>
             <a:endParaRPr lang="pt-PT"/>
           </a:p>
@@ -1564,7 +1529,7 @@
           <a:p>
             <a:fld id="{977049CB-4CB5-45FE-B82E-F474B91E1741}" type="datetimeFigureOut">
               <a:rPr lang="pt-PT" smtClean="0"/>
-              <a:t>25-03-2014</a:t>
+              <a:t>24/03/2014</a:t>
             </a:fld>
             <a:endParaRPr lang="pt-PT"/>
           </a:p>
@@ -1863,7 +1828,7 @@
           <a:p>
             <a:fld id="{92136B68-69E5-45CD-8C6F-F60CE3B7E52C}" type="datetimeFigureOut">
               <a:rPr lang="pt-PT" smtClean="0"/>
-              <a:t>25-03-2014</a:t>
+              <a:t>25/03/2014</a:t>
             </a:fld>
             <a:endParaRPr lang="pt-PT"/>
           </a:p>
@@ -2086,7 +2051,7 @@
             <a:fld id="{57B51982-E955-4F1A-BFA0-0F0AB3300023}" type="datetimeFigureOut">
               <a:rPr lang="pt-PT" smtClean="0"/>
               <a:pPr/>
-              <a:t>25-03-2014</a:t>
+              <a:t>24/03/2014</a:t>
             </a:fld>
             <a:endParaRPr lang="pt-PT"/>
           </a:p>
@@ -2329,7 +2294,7 @@
             <a:fld id="{57B51982-E955-4F1A-BFA0-0F0AB3300023}" type="datetimeFigureOut">
               <a:rPr lang="pt-PT" smtClean="0"/>
               <a:pPr/>
-              <a:t>25-03-2014</a:t>
+              <a:t>24/03/2014</a:t>
             </a:fld>
             <a:endParaRPr lang="pt-PT"/>
           </a:p>
@@ -2614,7 +2579,7 @@
             <a:fld id="{57B51982-E955-4F1A-BFA0-0F0AB3300023}" type="datetimeFigureOut">
               <a:rPr lang="pt-PT" smtClean="0"/>
               <a:pPr/>
-              <a:t>25-03-2014</a:t>
+              <a:t>24/03/2014</a:t>
             </a:fld>
             <a:endParaRPr lang="pt-PT"/>
           </a:p>
@@ -3038,7 +3003,7 @@
             <a:fld id="{57B51982-E955-4F1A-BFA0-0F0AB3300023}" type="datetimeFigureOut">
               <a:rPr lang="pt-PT" smtClean="0"/>
               <a:pPr/>
-              <a:t>25-03-2014</a:t>
+              <a:t>24/03/2014</a:t>
             </a:fld>
             <a:endParaRPr lang="pt-PT"/>
           </a:p>
@@ -3153,7 +3118,7 @@
             <a:fld id="{57B51982-E955-4F1A-BFA0-0F0AB3300023}" type="datetimeFigureOut">
               <a:rPr lang="pt-PT" smtClean="0"/>
               <a:pPr/>
-              <a:t>25-03-2014</a:t>
+              <a:t>24/03/2014</a:t>
             </a:fld>
             <a:endParaRPr lang="pt-PT"/>
           </a:p>
@@ -3245,7 +3210,7 @@
             <a:fld id="{57B51982-E955-4F1A-BFA0-0F0AB3300023}" type="datetimeFigureOut">
               <a:rPr lang="pt-PT" smtClean="0"/>
               <a:pPr/>
-              <a:t>25-03-2014</a:t>
+              <a:t>24/03/2014</a:t>
             </a:fld>
             <a:endParaRPr lang="pt-PT"/>
           </a:p>
@@ -3519,7 +3484,7 @@
             <a:fld id="{57B51982-E955-4F1A-BFA0-0F0AB3300023}" type="datetimeFigureOut">
               <a:rPr lang="pt-PT" smtClean="0"/>
               <a:pPr/>
-              <a:t>25-03-2014</a:t>
+              <a:t>24/03/2014</a:t>
             </a:fld>
             <a:endParaRPr lang="pt-PT"/>
           </a:p>
@@ -3769,7 +3734,7 @@
             <a:fld id="{57B51982-E955-4F1A-BFA0-0F0AB3300023}" type="datetimeFigureOut">
               <a:rPr lang="pt-PT" smtClean="0"/>
               <a:pPr/>
-              <a:t>25-03-2014</a:t>
+              <a:t>24/03/2014</a:t>
             </a:fld>
             <a:endParaRPr lang="pt-PT"/>
           </a:p>
@@ -4004,7 +3969,7 @@
             <a:fld id="{57B51982-E955-4F1A-BFA0-0F0AB3300023}" type="datetimeFigureOut">
               <a:rPr lang="pt-PT" smtClean="0"/>
               <a:pPr/>
-              <a:t>25-03-2014</a:t>
+              <a:t>24/03/2014</a:t>
             </a:fld>
             <a:endParaRPr lang="pt-PT"/>
           </a:p>
@@ -4513,7 +4478,7 @@
           <a:p>
             <a:fld id="{977049CB-4CB5-45FE-B82E-F474B91E1741}" type="datetimeFigureOut">
               <a:rPr lang="pt-PT" smtClean="0"/>
-              <a:t>25-03-2014</a:t>
+              <a:t>24/03/2014</a:t>
             </a:fld>
             <a:endParaRPr lang="pt-PT"/>
           </a:p>
@@ -5008,7 +4973,7 @@
           <a:p>
             <a:fld id="{92136B68-69E5-45CD-8C6F-F60CE3B7E52C}" type="datetimeFigureOut">
               <a:rPr lang="pt-PT" smtClean="0"/>
-              <a:t>25-03-2014</a:t>
+              <a:t>25/03/2014</a:t>
             </a:fld>
             <a:endParaRPr lang="pt-PT"/>
           </a:p>
@@ -5471,11 +5436,6 @@
           </p:cNvGraphicFramePr>
           <p:nvPr>
             <p:ph type="tbl" sz="quarter" idx="13"/>
-            <p:extLst>
-              <p:ext uri="{D42A27DB-BD31-4B8C-83A1-F6EECF244321}">
-                <p14:modId xmlns:p14="http://schemas.microsoft.com/office/powerpoint/2010/main" val="605565030"/>
-              </p:ext>
-            </p:extLst>
           </p:nvPr>
         </p:nvGraphicFramePr>
         <p:xfrm>
@@ -5582,7 +5542,7 @@
                     <a:p>
                       <a:r>
                         <a:rPr lang="pt-PT" sz="1400" dirty="0" smtClean="0"/>
-                        <a:t>16182</a:t>
+                        <a:t>?</a:t>
                       </a:r>
                       <a:endParaRPr lang="pt-PT" sz="1400" dirty="0"/>
                     </a:p>
@@ -5598,7 +5558,7 @@
                     <a:p>
                       <a:r>
                         <a:rPr lang="pt-PT" sz="1400" dirty="0" smtClean="0"/>
-                        <a:t>João Carvalho</a:t>
+                        <a:t>João</a:t>
                       </a:r>
                       <a:endParaRPr lang="pt-PT" sz="1400" dirty="0"/>
                     </a:p>
@@ -5612,7 +5572,7 @@
                     <a:p>
                       <a:r>
                         <a:rPr lang="pt-PT" sz="1400" dirty="0" smtClean="0"/>
-                        <a:t>15499</a:t>
+                        <a:t>?</a:t>
                       </a:r>
                       <a:endParaRPr lang="pt-PT" sz="1400" dirty="0"/>
                     </a:p>
@@ -5642,7 +5602,7 @@
                     <a:p>
                       <a:r>
                         <a:rPr lang="pt-PT" sz="1400" dirty="0" smtClean="0"/>
-                        <a:t>15501</a:t>
+                        <a:t>?</a:t>
                       </a:r>
                       <a:endParaRPr lang="pt-PT" sz="1400" dirty="0"/>
                     </a:p>
@@ -5671,8 +5631,8 @@
                     <a:lstStyle/>
                     <a:p>
                       <a:r>
-                        <a:rPr lang="pt-PT" sz="1400" smtClean="0"/>
-                        <a:t>15192</a:t>
+                        <a:rPr lang="pt-PT" sz="1400" dirty="0" smtClean="0"/>
+                        <a:t>?</a:t>
                       </a:r>
                       <a:endParaRPr lang="pt-PT" sz="1400" dirty="0"/>
                     </a:p>

</xml_diff>

<commit_message>
Continuação da edição da apresentação de 28-3.
</commit_message>
<xml_diff>
--- a/Apresentacoes/v01.pptx
+++ b/Apresentacoes/v01.pptx
@@ -6,22 +6,32 @@
     <p:sldMasterId id="2147483663" r:id="rId2"/>
     <p:sldMasterId id="2147483665" r:id="rId3"/>
   </p:sldMasterIdLst>
+  <p:notesMasterIdLst>
+    <p:notesMasterId r:id="rId23"/>
+  </p:notesMasterIdLst>
   <p:handoutMasterIdLst>
-    <p:handoutMasterId r:id="rId16"/>
+    <p:handoutMasterId r:id="rId24"/>
   </p:handoutMasterIdLst>
   <p:sldIdLst>
     <p:sldId id="256" r:id="rId4"/>
     <p:sldId id="257" r:id="rId5"/>
     <p:sldId id="258" r:id="rId6"/>
     <p:sldId id="259" r:id="rId7"/>
-    <p:sldId id="260" r:id="rId8"/>
-    <p:sldId id="261" r:id="rId9"/>
-    <p:sldId id="262" r:id="rId10"/>
-    <p:sldId id="264" r:id="rId11"/>
-    <p:sldId id="263" r:id="rId12"/>
-    <p:sldId id="265" r:id="rId13"/>
-    <p:sldId id="266" r:id="rId14"/>
-    <p:sldId id="267" r:id="rId15"/>
+    <p:sldId id="272" r:id="rId8"/>
+    <p:sldId id="260" r:id="rId9"/>
+    <p:sldId id="261" r:id="rId10"/>
+    <p:sldId id="262" r:id="rId11"/>
+    <p:sldId id="264" r:id="rId12"/>
+    <p:sldId id="269" r:id="rId13"/>
+    <p:sldId id="271" r:id="rId14"/>
+    <p:sldId id="273" r:id="rId15"/>
+    <p:sldId id="270" r:id="rId16"/>
+    <p:sldId id="274" r:id="rId17"/>
+    <p:sldId id="263" r:id="rId18"/>
+    <p:sldId id="265" r:id="rId19"/>
+    <p:sldId id="266" r:id="rId20"/>
+    <p:sldId id="268" r:id="rId21"/>
+    <p:sldId id="267" r:id="rId22"/>
   </p:sldIdLst>
   <p:sldSz cx="9144000" cy="5715000" type="screen16x10"/>
   <p:notesSz cx="6858000" cy="9144000"/>
@@ -206,7 +216,7 @@
             <a:fld id="{26E7F2CC-330F-4FEA-A2B0-657791948129}" type="datetimeFigureOut">
               <a:rPr lang="pt-PT" smtClean="0"/>
               <a:pPr/>
-              <a:t>24/03/2014</a:t>
+              <a:t>26/03/2014</a:t>
             </a:fld>
             <a:endParaRPr lang="pt-PT"/>
           </a:p>
@@ -283,6 +293,437 @@
   </p:cSld>
   <p:clrMap bg1="lt1" tx1="dk1" bg2="lt2" tx2="dk2" accent1="accent1" accent2="accent2" accent3="accent3" accent4="accent4" accent5="accent5" accent6="accent6" hlink="hlink" folHlink="folHlink"/>
 </p:handoutMaster>
+</file>
+
+<file path=ppt/notesMasters/notesMaster1.xml><?xml version="1.0" encoding="utf-8"?>
+<p:notesMaster xmlns:a="http://schemas.openxmlformats.org/drawingml/2006/main" xmlns:r="http://schemas.openxmlformats.org/officeDocument/2006/relationships" xmlns:p="http://schemas.openxmlformats.org/presentationml/2006/main">
+  <p:cSld>
+    <p:bg>
+      <p:bgRef idx="1001">
+        <a:schemeClr val="bg1"/>
+      </p:bgRef>
+    </p:bg>
+    <p:spTree>
+      <p:nvGrpSpPr>
+        <p:cNvPr id="1" name=""/>
+        <p:cNvGrpSpPr/>
+        <p:nvPr/>
+      </p:nvGrpSpPr>
+      <p:grpSpPr>
+        <a:xfrm>
+          <a:off x="0" y="0"/>
+          <a:ext cx="0" cy="0"/>
+          <a:chOff x="0" y="0"/>
+          <a:chExt cx="0" cy="0"/>
+        </a:xfrm>
+      </p:grpSpPr>
+      <p:sp>
+        <p:nvSpPr>
+          <p:cNvPr id="2" name="Marcador de Posição do Cabeçalho 1"/>
+          <p:cNvSpPr>
+            <a:spLocks noGrp="1"/>
+          </p:cNvSpPr>
+          <p:nvPr>
+            <p:ph type="hdr" sz="quarter"/>
+          </p:nvPr>
+        </p:nvSpPr>
+        <p:spPr>
+          <a:xfrm>
+            <a:off x="0" y="0"/>
+            <a:ext cx="2971800" cy="457200"/>
+          </a:xfrm>
+          <a:prstGeom prst="rect">
+            <a:avLst/>
+          </a:prstGeom>
+        </p:spPr>
+        <p:txBody>
+          <a:bodyPr vert="horz" lIns="91440" tIns="45720" rIns="91440" bIns="45720" rtlCol="0"/>
+          <a:lstStyle>
+            <a:lvl1pPr algn="l">
+              <a:defRPr sz="1200"/>
+            </a:lvl1pPr>
+          </a:lstStyle>
+          <a:p>
+            <a:endParaRPr lang="pt-PT"/>
+          </a:p>
+        </p:txBody>
+      </p:sp>
+      <p:sp>
+        <p:nvSpPr>
+          <p:cNvPr id="3" name="Marcador de Posição da Data 2"/>
+          <p:cNvSpPr>
+            <a:spLocks noGrp="1"/>
+          </p:cNvSpPr>
+          <p:nvPr>
+            <p:ph type="dt" idx="1"/>
+          </p:nvPr>
+        </p:nvSpPr>
+        <p:spPr>
+          <a:xfrm>
+            <a:off x="3884613" y="0"/>
+            <a:ext cx="2971800" cy="457200"/>
+          </a:xfrm>
+          <a:prstGeom prst="rect">
+            <a:avLst/>
+          </a:prstGeom>
+        </p:spPr>
+        <p:txBody>
+          <a:bodyPr vert="horz" lIns="91440" tIns="45720" rIns="91440" bIns="45720" rtlCol="0"/>
+          <a:lstStyle>
+            <a:lvl1pPr algn="r">
+              <a:defRPr sz="1200"/>
+            </a:lvl1pPr>
+          </a:lstStyle>
+          <a:p>
+            <a:fld id="{64C1928E-6349-48A8-8C96-32B641D59371}" type="datetimeFigureOut">
+              <a:rPr lang="pt-PT" smtClean="0"/>
+              <a:pPr/>
+              <a:t>26/03/2014</a:t>
+            </a:fld>
+            <a:endParaRPr lang="pt-PT"/>
+          </a:p>
+        </p:txBody>
+      </p:sp>
+      <p:sp>
+        <p:nvSpPr>
+          <p:cNvPr id="4" name="Marcador de Posição da Imagem do Diapositivo 3"/>
+          <p:cNvSpPr>
+            <a:spLocks noGrp="1" noRot="1" noChangeAspect="1"/>
+          </p:cNvSpPr>
+          <p:nvPr>
+            <p:ph type="sldImg" idx="2"/>
+          </p:nvPr>
+        </p:nvSpPr>
+        <p:spPr>
+          <a:xfrm>
+            <a:off x="685800" y="685800"/>
+            <a:ext cx="5486400" cy="3429000"/>
+          </a:xfrm>
+          <a:prstGeom prst="rect">
+            <a:avLst/>
+          </a:prstGeom>
+          <a:noFill/>
+          <a:ln w="12700">
+            <a:solidFill>
+              <a:prstClr val="black"/>
+            </a:solidFill>
+          </a:ln>
+        </p:spPr>
+        <p:txBody>
+          <a:bodyPr vert="horz" lIns="91440" tIns="45720" rIns="91440" bIns="45720" rtlCol="0" anchor="ctr"/>
+          <a:lstStyle/>
+          <a:p>
+            <a:endParaRPr lang="pt-PT"/>
+          </a:p>
+        </p:txBody>
+      </p:sp>
+      <p:sp>
+        <p:nvSpPr>
+          <p:cNvPr id="5" name="Marcador de Posição de Notas 4"/>
+          <p:cNvSpPr>
+            <a:spLocks noGrp="1"/>
+          </p:cNvSpPr>
+          <p:nvPr>
+            <p:ph type="body" sz="quarter" idx="3"/>
+          </p:nvPr>
+        </p:nvSpPr>
+        <p:spPr>
+          <a:xfrm>
+            <a:off x="685800" y="4343400"/>
+            <a:ext cx="5486400" cy="4114800"/>
+          </a:xfrm>
+          <a:prstGeom prst="rect">
+            <a:avLst/>
+          </a:prstGeom>
+        </p:spPr>
+        <p:txBody>
+          <a:bodyPr vert="horz" lIns="91440" tIns="45720" rIns="91440" bIns="45720" rtlCol="0">
+            <a:normAutofit/>
+          </a:bodyPr>
+          <a:lstStyle/>
+          <a:p>
+            <a:pPr lvl="0"/>
+            <a:r>
+              <a:rPr lang="pt-PT" smtClean="0"/>
+              <a:t>Clique para editar os estilos</a:t>
+            </a:r>
+          </a:p>
+          <a:p>
+            <a:pPr lvl="1"/>
+            <a:r>
+              <a:rPr lang="pt-PT" smtClean="0"/>
+              <a:t>Segundo nível</a:t>
+            </a:r>
+          </a:p>
+          <a:p>
+            <a:pPr lvl="2"/>
+            <a:r>
+              <a:rPr lang="pt-PT" smtClean="0"/>
+              <a:t>Terceiro nível</a:t>
+            </a:r>
+          </a:p>
+          <a:p>
+            <a:pPr lvl="3"/>
+            <a:r>
+              <a:rPr lang="pt-PT" smtClean="0"/>
+              <a:t>Quarto nível</a:t>
+            </a:r>
+          </a:p>
+          <a:p>
+            <a:pPr lvl="4"/>
+            <a:r>
+              <a:rPr lang="pt-PT" smtClean="0"/>
+              <a:t>Quinto nível</a:t>
+            </a:r>
+            <a:endParaRPr lang="pt-PT"/>
+          </a:p>
+        </p:txBody>
+      </p:sp>
+      <p:sp>
+        <p:nvSpPr>
+          <p:cNvPr id="6" name="Marcador de Posição do Rodapé 5"/>
+          <p:cNvSpPr>
+            <a:spLocks noGrp="1"/>
+          </p:cNvSpPr>
+          <p:nvPr>
+            <p:ph type="ftr" sz="quarter" idx="4"/>
+          </p:nvPr>
+        </p:nvSpPr>
+        <p:spPr>
+          <a:xfrm>
+            <a:off x="0" y="8685213"/>
+            <a:ext cx="2971800" cy="457200"/>
+          </a:xfrm>
+          <a:prstGeom prst="rect">
+            <a:avLst/>
+          </a:prstGeom>
+        </p:spPr>
+        <p:txBody>
+          <a:bodyPr vert="horz" lIns="91440" tIns="45720" rIns="91440" bIns="45720" rtlCol="0" anchor="b"/>
+          <a:lstStyle>
+            <a:lvl1pPr algn="l">
+              <a:defRPr sz="1200"/>
+            </a:lvl1pPr>
+          </a:lstStyle>
+          <a:p>
+            <a:endParaRPr lang="pt-PT"/>
+          </a:p>
+        </p:txBody>
+      </p:sp>
+      <p:sp>
+        <p:nvSpPr>
+          <p:cNvPr id="7" name="Marcador de Posição do Número do Diapositivo 6"/>
+          <p:cNvSpPr>
+            <a:spLocks noGrp="1"/>
+          </p:cNvSpPr>
+          <p:nvPr>
+            <p:ph type="sldNum" sz="quarter" idx="5"/>
+          </p:nvPr>
+        </p:nvSpPr>
+        <p:spPr>
+          <a:xfrm>
+            <a:off x="3884613" y="8685213"/>
+            <a:ext cx="2971800" cy="457200"/>
+          </a:xfrm>
+          <a:prstGeom prst="rect">
+            <a:avLst/>
+          </a:prstGeom>
+        </p:spPr>
+        <p:txBody>
+          <a:bodyPr vert="horz" lIns="91440" tIns="45720" rIns="91440" bIns="45720" rtlCol="0" anchor="b"/>
+          <a:lstStyle>
+            <a:lvl1pPr algn="r">
+              <a:defRPr sz="1200"/>
+            </a:lvl1pPr>
+          </a:lstStyle>
+          <a:p>
+            <a:fld id="{88F4BC70-1E78-4FA8-B0FE-372303FE609B}" type="slidenum">
+              <a:rPr lang="pt-PT" smtClean="0"/>
+              <a:pPr/>
+              <a:t>‹nº›</a:t>
+            </a:fld>
+            <a:endParaRPr lang="pt-PT"/>
+          </a:p>
+        </p:txBody>
+      </p:sp>
+    </p:spTree>
+  </p:cSld>
+  <p:clrMap bg1="lt1" tx1="dk1" bg2="lt2" tx2="dk2" accent1="accent1" accent2="accent2" accent3="accent3" accent4="accent4" accent5="accent5" accent6="accent6" hlink="hlink" folHlink="folHlink"/>
+  <p:notesStyle>
+    <a:lvl1pPr marL="0" algn="l" defTabSz="914400" rtl="0" eaLnBrk="1" latinLnBrk="0" hangingPunct="1">
+      <a:defRPr sz="1200" kern="1200">
+        <a:solidFill>
+          <a:schemeClr val="tx1"/>
+        </a:solidFill>
+        <a:latin typeface="+mn-lt"/>
+        <a:ea typeface="+mn-ea"/>
+        <a:cs typeface="+mn-cs"/>
+      </a:defRPr>
+    </a:lvl1pPr>
+    <a:lvl2pPr marL="457200" algn="l" defTabSz="914400" rtl="0" eaLnBrk="1" latinLnBrk="0" hangingPunct="1">
+      <a:defRPr sz="1200" kern="1200">
+        <a:solidFill>
+          <a:schemeClr val="tx1"/>
+        </a:solidFill>
+        <a:latin typeface="+mn-lt"/>
+        <a:ea typeface="+mn-ea"/>
+        <a:cs typeface="+mn-cs"/>
+      </a:defRPr>
+    </a:lvl2pPr>
+    <a:lvl3pPr marL="914400" algn="l" defTabSz="914400" rtl="0" eaLnBrk="1" latinLnBrk="0" hangingPunct="1">
+      <a:defRPr sz="1200" kern="1200">
+        <a:solidFill>
+          <a:schemeClr val="tx1"/>
+        </a:solidFill>
+        <a:latin typeface="+mn-lt"/>
+        <a:ea typeface="+mn-ea"/>
+        <a:cs typeface="+mn-cs"/>
+      </a:defRPr>
+    </a:lvl3pPr>
+    <a:lvl4pPr marL="1371600" algn="l" defTabSz="914400" rtl="0" eaLnBrk="1" latinLnBrk="0" hangingPunct="1">
+      <a:defRPr sz="1200" kern="1200">
+        <a:solidFill>
+          <a:schemeClr val="tx1"/>
+        </a:solidFill>
+        <a:latin typeface="+mn-lt"/>
+        <a:ea typeface="+mn-ea"/>
+        <a:cs typeface="+mn-cs"/>
+      </a:defRPr>
+    </a:lvl4pPr>
+    <a:lvl5pPr marL="1828800" algn="l" defTabSz="914400" rtl="0" eaLnBrk="1" latinLnBrk="0" hangingPunct="1">
+      <a:defRPr sz="1200" kern="1200">
+        <a:solidFill>
+          <a:schemeClr val="tx1"/>
+        </a:solidFill>
+        <a:latin typeface="+mn-lt"/>
+        <a:ea typeface="+mn-ea"/>
+        <a:cs typeface="+mn-cs"/>
+      </a:defRPr>
+    </a:lvl5pPr>
+    <a:lvl6pPr marL="2286000" algn="l" defTabSz="914400" rtl="0" eaLnBrk="1" latinLnBrk="0" hangingPunct="1">
+      <a:defRPr sz="1200" kern="1200">
+        <a:solidFill>
+          <a:schemeClr val="tx1"/>
+        </a:solidFill>
+        <a:latin typeface="+mn-lt"/>
+        <a:ea typeface="+mn-ea"/>
+        <a:cs typeface="+mn-cs"/>
+      </a:defRPr>
+    </a:lvl6pPr>
+    <a:lvl7pPr marL="2743200" algn="l" defTabSz="914400" rtl="0" eaLnBrk="1" latinLnBrk="0" hangingPunct="1">
+      <a:defRPr sz="1200" kern="1200">
+        <a:solidFill>
+          <a:schemeClr val="tx1"/>
+        </a:solidFill>
+        <a:latin typeface="+mn-lt"/>
+        <a:ea typeface="+mn-ea"/>
+        <a:cs typeface="+mn-cs"/>
+      </a:defRPr>
+    </a:lvl7pPr>
+    <a:lvl8pPr marL="3200400" algn="l" defTabSz="914400" rtl="0" eaLnBrk="1" latinLnBrk="0" hangingPunct="1">
+      <a:defRPr sz="1200" kern="1200">
+        <a:solidFill>
+          <a:schemeClr val="tx1"/>
+        </a:solidFill>
+        <a:latin typeface="+mn-lt"/>
+        <a:ea typeface="+mn-ea"/>
+        <a:cs typeface="+mn-cs"/>
+      </a:defRPr>
+    </a:lvl8pPr>
+    <a:lvl9pPr marL="3657600" algn="l" defTabSz="914400" rtl="0" eaLnBrk="1" latinLnBrk="0" hangingPunct="1">
+      <a:defRPr sz="1200" kern="1200">
+        <a:solidFill>
+          <a:schemeClr val="tx1"/>
+        </a:solidFill>
+        <a:latin typeface="+mn-lt"/>
+        <a:ea typeface="+mn-ea"/>
+        <a:cs typeface="+mn-cs"/>
+      </a:defRPr>
+    </a:lvl9pPr>
+  </p:notesStyle>
+</p:notesMaster>
+</file>
+
+<file path=ppt/notesSlides/notesSlide1.xml><?xml version="1.0" encoding="utf-8"?>
+<p:notes xmlns:a="http://schemas.openxmlformats.org/drawingml/2006/main" xmlns:r="http://schemas.openxmlformats.org/officeDocument/2006/relationships" xmlns:p="http://schemas.openxmlformats.org/presentationml/2006/main">
+  <p:cSld>
+    <p:spTree>
+      <p:nvGrpSpPr>
+        <p:cNvPr id="1" name=""/>
+        <p:cNvGrpSpPr/>
+        <p:nvPr/>
+      </p:nvGrpSpPr>
+      <p:grpSpPr>
+        <a:xfrm>
+          <a:off x="0" y="0"/>
+          <a:ext cx="0" cy="0"/>
+          <a:chOff x="0" y="0"/>
+          <a:chExt cx="0" cy="0"/>
+        </a:xfrm>
+      </p:grpSpPr>
+      <p:sp>
+        <p:nvSpPr>
+          <p:cNvPr id="2" name="Marcador de Posição da Imagem do Diapositivo 1"/>
+          <p:cNvSpPr>
+            <a:spLocks noGrp="1" noRot="1" noChangeAspect="1"/>
+          </p:cNvSpPr>
+          <p:nvPr>
+            <p:ph type="sldImg"/>
+          </p:nvPr>
+        </p:nvSpPr>
+        <p:spPr/>
+      </p:sp>
+      <p:sp>
+        <p:nvSpPr>
+          <p:cNvPr id="3" name="Marcador de Posição de Notas 2"/>
+          <p:cNvSpPr>
+            <a:spLocks noGrp="1"/>
+          </p:cNvSpPr>
+          <p:nvPr>
+            <p:ph type="body" idx="1"/>
+          </p:nvPr>
+        </p:nvSpPr>
+        <p:spPr/>
+        <p:txBody>
+          <a:bodyPr>
+            <a:normAutofit/>
+          </a:bodyPr>
+          <a:lstStyle/>
+          <a:p>
+            <a:endParaRPr lang="pt-PT" dirty="0"/>
+          </a:p>
+        </p:txBody>
+      </p:sp>
+      <p:sp>
+        <p:nvSpPr>
+          <p:cNvPr id="4" name="Marcador de Posição do Número do Diapositivo 3"/>
+          <p:cNvSpPr>
+            <a:spLocks noGrp="1"/>
+          </p:cNvSpPr>
+          <p:nvPr>
+            <p:ph type="sldNum" sz="quarter" idx="10"/>
+          </p:nvPr>
+        </p:nvSpPr>
+        <p:spPr/>
+        <p:txBody>
+          <a:bodyPr/>
+          <a:lstStyle/>
+          <a:p>
+            <a:fld id="{88F4BC70-1E78-4FA8-B0FE-372303FE609B}" type="slidenum">
+              <a:rPr lang="pt-PT" smtClean="0"/>
+              <a:pPr/>
+              <a:t>18</a:t>
+            </a:fld>
+            <a:endParaRPr lang="pt-PT"/>
+          </a:p>
+        </p:txBody>
+      </p:sp>
+    </p:spTree>
+  </p:cSld>
+  <p:clrMapOvr>
+    <a:masterClrMapping/>
+  </p:clrMapOvr>
+</p:notes>
 </file>
 
 <file path=ppt/slideLayouts/slideLayout1.xml><?xml version="1.0" encoding="utf-8"?>
@@ -467,7 +908,7 @@
             <a:fld id="{57B51982-E955-4F1A-BFA0-0F0AB3300023}" type="datetimeFigureOut">
               <a:rPr lang="pt-PT" smtClean="0"/>
               <a:pPr/>
-              <a:t>24/03/2014</a:t>
+              <a:t>26/03/2014</a:t>
             </a:fld>
             <a:endParaRPr lang="pt-PT"/>
           </a:p>
@@ -634,7 +1075,7 @@
             <a:fld id="{57B51982-E955-4F1A-BFA0-0F0AB3300023}" type="datetimeFigureOut">
               <a:rPr lang="pt-PT" smtClean="0"/>
               <a:pPr/>
-              <a:t>24/03/2014</a:t>
+              <a:t>26/03/2014</a:t>
             </a:fld>
             <a:endParaRPr lang="pt-PT"/>
           </a:p>
@@ -811,7 +1252,7 @@
             <a:fld id="{57B51982-E955-4F1A-BFA0-0F0AB3300023}" type="datetimeFigureOut">
               <a:rPr lang="pt-PT" smtClean="0"/>
               <a:pPr/>
-              <a:t>24/03/2014</a:t>
+              <a:t>26/03/2014</a:t>
             </a:fld>
             <a:endParaRPr lang="pt-PT"/>
           </a:p>
@@ -903,7 +1344,7 @@
             <a:fld id="{57B51982-E955-4F1A-BFA0-0F0AB3300023}" type="datetimeFigureOut">
               <a:rPr lang="pt-PT" smtClean="0"/>
               <a:pPr/>
-              <a:t>24/03/2014</a:t>
+              <a:t>26/03/2014</a:t>
             </a:fld>
             <a:endParaRPr lang="pt-PT"/>
           </a:p>
@@ -1062,6 +1503,198 @@
 
 <file path=ppt/slideLayouts/slideLayout13.xml><?xml version="1.0" encoding="utf-8"?>
 <p:sldLayout xmlns:a="http://schemas.openxmlformats.org/drawingml/2006/main" xmlns:r="http://schemas.openxmlformats.org/officeDocument/2006/relationships" xmlns:p="http://schemas.openxmlformats.org/presentationml/2006/main" preserve="1" userDrawn="1">
+  <p:cSld name="Imagem">
+    <p:spTree>
+      <p:nvGrpSpPr>
+        <p:cNvPr id="1" name=""/>
+        <p:cNvGrpSpPr/>
+        <p:nvPr/>
+      </p:nvGrpSpPr>
+      <p:grpSpPr>
+        <a:xfrm>
+          <a:off x="0" y="0"/>
+          <a:ext cx="0" cy="0"/>
+          <a:chOff x="0" y="0"/>
+          <a:chExt cx="0" cy="0"/>
+        </a:xfrm>
+      </p:grpSpPr>
+      <p:sp>
+        <p:nvSpPr>
+          <p:cNvPr id="6" name="Marcador de Posição da Data 5"/>
+          <p:cNvSpPr>
+            <a:spLocks noGrp="1"/>
+          </p:cNvSpPr>
+          <p:nvPr>
+            <p:ph type="dt" sz="half" idx="10"/>
+          </p:nvPr>
+        </p:nvSpPr>
+        <p:spPr/>
+        <p:txBody>
+          <a:bodyPr/>
+          <a:lstStyle/>
+          <a:p>
+            <a:fld id="{57B51982-E955-4F1A-BFA0-0F0AB3300023}" type="datetimeFigureOut">
+              <a:rPr lang="pt-PT" smtClean="0"/>
+              <a:pPr/>
+              <a:t>26/03/2014</a:t>
+            </a:fld>
+            <a:endParaRPr lang="pt-PT"/>
+          </a:p>
+        </p:txBody>
+      </p:sp>
+      <p:sp>
+        <p:nvSpPr>
+          <p:cNvPr id="7" name="Marcador de Posição do Número do Diapositivo 6"/>
+          <p:cNvSpPr>
+            <a:spLocks noGrp="1"/>
+          </p:cNvSpPr>
+          <p:nvPr>
+            <p:ph type="sldNum" sz="quarter" idx="11"/>
+          </p:nvPr>
+        </p:nvSpPr>
+        <p:spPr/>
+        <p:txBody>
+          <a:bodyPr/>
+          <a:lstStyle/>
+          <a:p>
+            <a:fld id="{401E976E-C8D5-4C14-AA28-98D0FCC98DAD}" type="slidenum">
+              <a:rPr lang="pt-PT" smtClean="0"/>
+              <a:pPr/>
+              <a:t>‹nº›</a:t>
+            </a:fld>
+            <a:endParaRPr lang="pt-PT"/>
+          </a:p>
+        </p:txBody>
+      </p:sp>
+      <p:sp>
+        <p:nvSpPr>
+          <p:cNvPr id="8" name="Marcador de Posição do Rodapé 7"/>
+          <p:cNvSpPr>
+            <a:spLocks noGrp="1"/>
+          </p:cNvSpPr>
+          <p:nvPr>
+            <p:ph type="ftr" sz="quarter" idx="12"/>
+          </p:nvPr>
+        </p:nvSpPr>
+        <p:spPr/>
+        <p:txBody>
+          <a:bodyPr/>
+          <a:lstStyle/>
+          <a:p>
+            <a:endParaRPr lang="pt-PT"/>
+          </a:p>
+        </p:txBody>
+      </p:sp>
+      <p:sp>
+        <p:nvSpPr>
+          <p:cNvPr id="10" name="Marcador de Posição do Texto 9"/>
+          <p:cNvSpPr>
+            <a:spLocks noGrp="1"/>
+          </p:cNvSpPr>
+          <p:nvPr>
+            <p:ph type="body" sz="quarter" idx="13" hasCustomPrompt="1"/>
+          </p:nvPr>
+        </p:nvSpPr>
+        <p:spPr>
+          <a:xfrm>
+            <a:off x="251520" y="696913"/>
+            <a:ext cx="8640960" cy="3600747"/>
+          </a:xfrm>
+        </p:spPr>
+        <p:txBody>
+          <a:bodyPr>
+            <a:normAutofit/>
+          </a:bodyPr>
+          <a:lstStyle>
+            <a:lvl1pPr algn="l">
+              <a:buFont typeface="Arial" pitchFamily="34" charset="0"/>
+              <a:buNone/>
+              <a:defRPr sz="1600">
+                <a:latin typeface="Source Code Pro" pitchFamily="49" charset="0"/>
+                <a:cs typeface="Consolas" pitchFamily="49" charset="0"/>
+              </a:defRPr>
+            </a:lvl1pPr>
+            <a:lvl2pPr algn="l">
+              <a:defRPr sz="1800">
+                <a:latin typeface="Source Code Pro" pitchFamily="49" charset="0"/>
+                <a:cs typeface="Consolas" pitchFamily="49" charset="0"/>
+              </a:defRPr>
+            </a:lvl2pPr>
+            <a:lvl3pPr algn="l">
+              <a:defRPr sz="1800">
+                <a:latin typeface="Source Code Pro" pitchFamily="49" charset="0"/>
+                <a:cs typeface="Consolas" pitchFamily="49" charset="0"/>
+              </a:defRPr>
+            </a:lvl3pPr>
+            <a:lvl4pPr algn="l">
+              <a:defRPr sz="1800">
+                <a:latin typeface="Source Code Pro" pitchFamily="49" charset="0"/>
+                <a:cs typeface="Consolas" pitchFamily="49" charset="0"/>
+              </a:defRPr>
+            </a:lvl4pPr>
+            <a:lvl5pPr algn="l">
+              <a:defRPr sz="1800">
+                <a:latin typeface="Source Code Pro" pitchFamily="49" charset="0"/>
+                <a:cs typeface="Consolas" pitchFamily="49" charset="0"/>
+              </a:defRPr>
+            </a:lvl5pPr>
+          </a:lstStyle>
+          <a:p>
+            <a:pPr lvl="0"/>
+            <a:r>
+              <a:rPr lang="pt-PT" dirty="0" smtClean="0"/>
+              <a:t>Código-fonte</a:t>
+            </a:r>
+            <a:endParaRPr lang="pt-PT" dirty="0"/>
+          </a:p>
+        </p:txBody>
+      </p:sp>
+      <p:sp>
+        <p:nvSpPr>
+          <p:cNvPr id="12" name="Marcador de Posição do Texto 11"/>
+          <p:cNvSpPr>
+            <a:spLocks noGrp="1"/>
+          </p:cNvSpPr>
+          <p:nvPr>
+            <p:ph type="body" sz="quarter" idx="14" hasCustomPrompt="1"/>
+          </p:nvPr>
+        </p:nvSpPr>
+        <p:spPr>
+          <a:xfrm>
+            <a:off x="251520" y="4586288"/>
+            <a:ext cx="8640960" cy="431800"/>
+          </a:xfrm>
+        </p:spPr>
+        <p:txBody>
+          <a:bodyPr>
+            <a:normAutofit/>
+          </a:bodyPr>
+          <a:lstStyle>
+            <a:lvl1pPr algn="ctr">
+              <a:buNone/>
+              <a:defRPr sz="1600"/>
+            </a:lvl1pPr>
+          </a:lstStyle>
+          <a:p>
+            <a:pPr lvl="0"/>
+            <a:r>
+              <a:rPr lang="pt-PT" dirty="0" smtClean="0"/>
+              <a:t>Legenda</a:t>
+            </a:r>
+            <a:endParaRPr lang="pt-PT" dirty="0"/>
+          </a:p>
+        </p:txBody>
+      </p:sp>
+    </p:spTree>
+  </p:cSld>
+  <p:clrMapOvr>
+    <a:masterClrMapping/>
+  </p:clrMapOvr>
+</p:sldLayout>
+</file>
+
+<file path=ppt/slideLayouts/slideLayout14.xml><?xml version="1.0" encoding="utf-8"?>
+<p:sldLayout xmlns:a="http://schemas.openxmlformats.org/drawingml/2006/main" xmlns:r="http://schemas.openxmlformats.org/officeDocument/2006/relationships" xmlns:p="http://schemas.openxmlformats.org/presentationml/2006/main" preserve="1" userDrawn="1">
   <p:cSld name="1_Código-Fonte">
     <p:spTree>
       <p:nvGrpSpPr>
@@ -1095,7 +1728,7 @@
             <a:fld id="{57B51982-E955-4F1A-BFA0-0F0AB3300023}" type="datetimeFigureOut">
               <a:rPr lang="pt-PT" smtClean="0"/>
               <a:pPr/>
-              <a:t>24/03/2014</a:t>
+              <a:t>26/03/2014</a:t>
             </a:fld>
             <a:endParaRPr lang="pt-PT"/>
           </a:p>
@@ -1217,7 +1850,7 @@
 </p:sldLayout>
 </file>
 
-<file path=ppt/slideLayouts/slideLayout14.xml><?xml version="1.0" encoding="utf-8"?>
+<file path=ppt/slideLayouts/slideLayout15.xml><?xml version="1.0" encoding="utf-8"?>
 <p:sldLayout xmlns:a="http://schemas.openxmlformats.org/drawingml/2006/main" xmlns:r="http://schemas.openxmlformats.org/officeDocument/2006/relationships" xmlns:p="http://schemas.openxmlformats.org/presentationml/2006/main" preserve="1" userDrawn="1">
   <p:cSld name="Título">
     <p:spTree>
@@ -1403,7 +2036,7 @@
             <a:fld id="{57B51982-E955-4F1A-BFA0-0F0AB3300023}" type="datetimeFigureOut">
               <a:rPr lang="pt-PT" smtClean="0"/>
               <a:pPr/>
-              <a:t>24/03/2014</a:t>
+              <a:t>26/03/2014</a:t>
             </a:fld>
             <a:endParaRPr lang="pt-PT"/>
           </a:p>
@@ -1495,7 +2128,7 @@
 </p:sldLayout>
 </file>
 
-<file path=ppt/slideLayouts/slideLayout15.xml><?xml version="1.0" encoding="utf-8"?>
+<file path=ppt/slideLayouts/slideLayout16.xml><?xml version="1.0" encoding="utf-8"?>
 <p:sldLayout xmlns:a="http://schemas.openxmlformats.org/drawingml/2006/main" xmlns:r="http://schemas.openxmlformats.org/officeDocument/2006/relationships" xmlns:p="http://schemas.openxmlformats.org/presentationml/2006/main" preserve="1" userDrawn="1">
   <p:cSld name="Esquema Personalizado">
     <p:spTree>
@@ -1529,7 +2162,8 @@
           <a:p>
             <a:fld id="{977049CB-4CB5-45FE-B82E-F474B91E1741}" type="datetimeFigureOut">
               <a:rPr lang="pt-PT" smtClean="0"/>
-              <a:t>24/03/2014</a:t>
+              <a:pPr/>
+              <a:t>26/03/2014</a:t>
             </a:fld>
             <a:endParaRPr lang="pt-PT"/>
           </a:p>
@@ -1571,6 +2205,7 @@
           <a:p>
             <a:fld id="{4D1F0FFA-2844-45DE-A4DA-DCB14069D4D2}" type="slidenum">
               <a:rPr lang="pt-PT" smtClean="0"/>
+              <a:pPr/>
               <a:t>‹nº›</a:t>
             </a:fld>
             <a:endParaRPr lang="pt-PT"/>
@@ -1771,7 +2406,7 @@
 </p:sldLayout>
 </file>
 
-<file path=ppt/slideLayouts/slideLayout16.xml><?xml version="1.0" encoding="utf-8"?>
+<file path=ppt/slideLayouts/slideLayout17.xml><?xml version="1.0" encoding="utf-8"?>
 <p:sldLayout xmlns:a="http://schemas.openxmlformats.org/drawingml/2006/main" xmlns:r="http://schemas.openxmlformats.org/officeDocument/2006/relationships" xmlns:p="http://schemas.openxmlformats.org/presentationml/2006/main" preserve="1" userDrawn="1">
   <p:cSld name="Esquema Personalizado">
     <p:spTree>
@@ -1828,7 +2463,8 @@
           <a:p>
             <a:fld id="{92136B68-69E5-45CD-8C6F-F60CE3B7E52C}" type="datetimeFigureOut">
               <a:rPr lang="pt-PT" smtClean="0"/>
-              <a:t>25/03/2014</a:t>
+              <a:pPr/>
+              <a:t>26/03/2014</a:t>
             </a:fld>
             <a:endParaRPr lang="pt-PT"/>
           </a:p>
@@ -1870,6 +2506,7 @@
           <a:p>
             <a:fld id="{59E077A0-70BA-41C0-A677-AFB79C3F962D}" type="slidenum">
               <a:rPr lang="pt-PT" smtClean="0"/>
+              <a:pPr/>
               <a:t>‹nº›</a:t>
             </a:fld>
             <a:endParaRPr lang="pt-PT"/>
@@ -2051,7 +2688,7 @@
             <a:fld id="{57B51982-E955-4F1A-BFA0-0F0AB3300023}" type="datetimeFigureOut">
               <a:rPr lang="pt-PT" smtClean="0"/>
               <a:pPr/>
-              <a:t>24/03/2014</a:t>
+              <a:t>26/03/2014</a:t>
             </a:fld>
             <a:endParaRPr lang="pt-PT"/>
           </a:p>
@@ -2294,7 +2931,7 @@
             <a:fld id="{57B51982-E955-4F1A-BFA0-0F0AB3300023}" type="datetimeFigureOut">
               <a:rPr lang="pt-PT" smtClean="0"/>
               <a:pPr/>
-              <a:t>24/03/2014</a:t>
+              <a:t>26/03/2014</a:t>
             </a:fld>
             <a:endParaRPr lang="pt-PT"/>
           </a:p>
@@ -2579,7 +3216,7 @@
             <a:fld id="{57B51982-E955-4F1A-BFA0-0F0AB3300023}" type="datetimeFigureOut">
               <a:rPr lang="pt-PT" smtClean="0"/>
               <a:pPr/>
-              <a:t>24/03/2014</a:t>
+              <a:t>26/03/2014</a:t>
             </a:fld>
             <a:endParaRPr lang="pt-PT"/>
           </a:p>
@@ -3003,7 +3640,7 @@
             <a:fld id="{57B51982-E955-4F1A-BFA0-0F0AB3300023}" type="datetimeFigureOut">
               <a:rPr lang="pt-PT" smtClean="0"/>
               <a:pPr/>
-              <a:t>24/03/2014</a:t>
+              <a:t>26/03/2014</a:t>
             </a:fld>
             <a:endParaRPr lang="pt-PT"/>
           </a:p>
@@ -3118,7 +3755,7 @@
             <a:fld id="{57B51982-E955-4F1A-BFA0-0F0AB3300023}" type="datetimeFigureOut">
               <a:rPr lang="pt-PT" smtClean="0"/>
               <a:pPr/>
-              <a:t>24/03/2014</a:t>
+              <a:t>26/03/2014</a:t>
             </a:fld>
             <a:endParaRPr lang="pt-PT"/>
           </a:p>
@@ -3210,7 +3847,7 @@
             <a:fld id="{57B51982-E955-4F1A-BFA0-0F0AB3300023}" type="datetimeFigureOut">
               <a:rPr lang="pt-PT" smtClean="0"/>
               <a:pPr/>
-              <a:t>24/03/2014</a:t>
+              <a:t>26/03/2014</a:t>
             </a:fld>
             <a:endParaRPr lang="pt-PT"/>
           </a:p>
@@ -3484,7 +4121,7 @@
             <a:fld id="{57B51982-E955-4F1A-BFA0-0F0AB3300023}" type="datetimeFigureOut">
               <a:rPr lang="pt-PT" smtClean="0"/>
               <a:pPr/>
-              <a:t>24/03/2014</a:t>
+              <a:t>26/03/2014</a:t>
             </a:fld>
             <a:endParaRPr lang="pt-PT"/>
           </a:p>
@@ -3734,7 +4371,7 @@
             <a:fld id="{57B51982-E955-4F1A-BFA0-0F0AB3300023}" type="datetimeFigureOut">
               <a:rPr lang="pt-PT" smtClean="0"/>
               <a:pPr/>
-              <a:t>24/03/2014</a:t>
+              <a:t>26/03/2014</a:t>
             </a:fld>
             <a:endParaRPr lang="pt-PT"/>
           </a:p>
@@ -3822,7 +4459,7 @@
           <p:nvPr userDrawn="1"/>
         </p:nvPicPr>
         <p:blipFill>
-          <a:blip r:embed="rId16" cstate="print"/>
+          <a:blip r:embed="rId17" cstate="print"/>
           <a:stretch>
             <a:fillRect/>
           </a:stretch>
@@ -3969,7 +4606,7 @@
             <a:fld id="{57B51982-E955-4F1A-BFA0-0F0AB3300023}" type="datetimeFigureOut">
               <a:rPr lang="pt-PT" smtClean="0"/>
               <a:pPr/>
-              <a:t>24/03/2014</a:t>
+              <a:t>26/03/2014</a:t>
             </a:fld>
             <a:endParaRPr lang="pt-PT"/>
           </a:p>
@@ -4070,8 +4707,9 @@
     <p:sldLayoutId id="2147483658" r:id="rId10"/>
     <p:sldLayoutId id="2147483659" r:id="rId11"/>
     <p:sldLayoutId id="2147483661" r:id="rId12"/>
-    <p:sldLayoutId id="2147483662" r:id="rId13"/>
-    <p:sldLayoutId id="2147483660" r:id="rId14"/>
+    <p:sldLayoutId id="2147483667" r:id="rId13"/>
+    <p:sldLayoutId id="2147483662" r:id="rId14"/>
+    <p:sldLayoutId id="2147483660" r:id="rId15"/>
   </p:sldLayoutIdLst>
   <p:txStyles>
     <p:titleStyle>
@@ -4478,7 +5116,8 @@
           <a:p>
             <a:fld id="{977049CB-4CB5-45FE-B82E-F474B91E1741}" type="datetimeFigureOut">
               <a:rPr lang="pt-PT" smtClean="0"/>
-              <a:t>24/03/2014</a:t>
+              <a:pPr/>
+              <a:t>26/03/2014</a:t>
             </a:fld>
             <a:endParaRPr lang="pt-PT"/>
           </a:p>
@@ -4556,6 +5195,7 @@
           <a:p>
             <a:fld id="{4D1F0FFA-2844-45DE-A4DA-DCB14069D4D2}" type="slidenum">
               <a:rPr lang="pt-PT" smtClean="0"/>
+              <a:pPr/>
               <a:t>‹nº›</a:t>
             </a:fld>
             <a:endParaRPr lang="pt-PT"/>
@@ -4973,7 +5613,8 @@
           <a:p>
             <a:fld id="{92136B68-69E5-45CD-8C6F-F60CE3B7E52C}" type="datetimeFigureOut">
               <a:rPr lang="pt-PT" smtClean="0"/>
-              <a:t>25/03/2014</a:t>
+              <a:pPr/>
+              <a:t>26/03/2014</a:t>
             </a:fld>
             <a:endParaRPr lang="pt-PT"/>
           </a:p>
@@ -5051,6 +5692,7 @@
           <a:p>
             <a:fld id="{59E077A0-70BA-41C0-A677-AFB79C3F962D}" type="slidenum">
               <a:rPr lang="pt-PT" smtClean="0"/>
+              <a:pPr/>
               <a:t>‹nº›</a:t>
             </a:fld>
             <a:endParaRPr lang="pt-PT"/>
@@ -5542,7 +6184,7 @@
                     <a:p>
                       <a:r>
                         <a:rPr lang="pt-PT" sz="1400" dirty="0" smtClean="0"/>
-                        <a:t>?</a:t>
+                        <a:t>16182</a:t>
                       </a:r>
                       <a:endParaRPr lang="pt-PT" sz="1400" dirty="0"/>
                     </a:p>
@@ -5558,7 +6200,11 @@
                     <a:p>
                       <a:r>
                         <a:rPr lang="pt-PT" sz="1400" dirty="0" smtClean="0"/>
-                        <a:t>João</a:t>
+                        <a:t>João </a:t>
+                      </a:r>
+                      <a:r>
+                        <a:rPr lang="pt-PT" sz="1400" dirty="0" smtClean="0"/>
+                        <a:t>Carvalho</a:t>
                       </a:r>
                       <a:endParaRPr lang="pt-PT" sz="1400" dirty="0"/>
                     </a:p>
@@ -5572,7 +6218,7 @@
                     <a:p>
                       <a:r>
                         <a:rPr lang="pt-PT" sz="1400" dirty="0" smtClean="0"/>
-                        <a:t>?</a:t>
+                        <a:t>15499</a:t>
                       </a:r>
                       <a:endParaRPr lang="pt-PT" sz="1400" dirty="0"/>
                     </a:p>
@@ -5602,7 +6248,7 @@
                     <a:p>
                       <a:r>
                         <a:rPr lang="pt-PT" sz="1400" dirty="0" smtClean="0"/>
-                        <a:t>?</a:t>
+                        <a:t>15501</a:t>
                       </a:r>
                       <a:endParaRPr lang="pt-PT" sz="1400" dirty="0"/>
                     </a:p>
@@ -5632,7 +6278,7 @@
                     <a:p>
                       <a:r>
                         <a:rPr lang="pt-PT" sz="1400" dirty="0" smtClean="0"/>
-                        <a:t>?</a:t>
+                        <a:t>15192</a:t>
                       </a:r>
                       <a:endParaRPr lang="pt-PT" sz="1400" dirty="0"/>
                     </a:p>
@@ -5660,6 +6306,515 @@
 </file>
 
 <file path=ppt/slides/slide10.xml><?xml version="1.0" encoding="utf-8"?>
+<p:sld xmlns:a="http://schemas.openxmlformats.org/drawingml/2006/main" xmlns:r="http://schemas.openxmlformats.org/officeDocument/2006/relationships" xmlns:p="http://schemas.openxmlformats.org/presentationml/2006/main">
+  <p:cSld>
+    <p:spTree>
+      <p:nvGrpSpPr>
+        <p:cNvPr id="1" name=""/>
+        <p:cNvGrpSpPr/>
+        <p:nvPr/>
+      </p:nvGrpSpPr>
+      <p:grpSpPr>
+        <a:xfrm>
+          <a:off x="0" y="0"/>
+          <a:ext cx="0" cy="0"/>
+          <a:chOff x="0" y="0"/>
+          <a:chExt cx="0" cy="0"/>
+        </a:xfrm>
+      </p:grpSpPr>
+      <p:sp>
+        <p:nvSpPr>
+          <p:cNvPr id="2" name="Título 1"/>
+          <p:cNvSpPr>
+            <a:spLocks noGrp="1"/>
+          </p:cNvSpPr>
+          <p:nvPr>
+            <p:ph type="ctrTitle"/>
+          </p:nvPr>
+        </p:nvSpPr>
+        <p:spPr/>
+        <p:txBody>
+          <a:bodyPr/>
+          <a:lstStyle/>
+          <a:p>
+            <a:r>
+              <a:rPr lang="pt-PT" dirty="0" smtClean="0"/>
+              <a:t>Sistema de Informação</a:t>
+            </a:r>
+            <a:endParaRPr lang="pt-PT" dirty="0"/>
+          </a:p>
+        </p:txBody>
+      </p:sp>
+      <p:sp>
+        <p:nvSpPr>
+          <p:cNvPr id="3" name="Subtítulo 2"/>
+          <p:cNvSpPr>
+            <a:spLocks noGrp="1"/>
+          </p:cNvSpPr>
+          <p:nvPr>
+            <p:ph type="subTitle" idx="1"/>
+          </p:nvPr>
+        </p:nvSpPr>
+        <p:spPr/>
+        <p:txBody>
+          <a:bodyPr/>
+          <a:lstStyle/>
+          <a:p>
+            <a:r>
+              <a:rPr lang="pt-PT" dirty="0" err="1" smtClean="0"/>
+              <a:t>WebService</a:t>
+            </a:r>
+            <a:r>
+              <a:rPr lang="pt-PT" dirty="0" smtClean="0"/>
+              <a:t> de suporte à </a:t>
+            </a:r>
+            <a:r>
+              <a:rPr lang="pt-PT" dirty="0" err="1" smtClean="0"/>
+              <a:t>app</a:t>
+            </a:r>
+            <a:r>
+              <a:rPr lang="pt-PT" dirty="0" smtClean="0"/>
+              <a:t>.</a:t>
+            </a:r>
+            <a:endParaRPr lang="pt-PT" dirty="0"/>
+          </a:p>
+        </p:txBody>
+      </p:sp>
+    </p:spTree>
+  </p:cSld>
+  <p:clrMapOvr>
+    <a:masterClrMapping/>
+  </p:clrMapOvr>
+</p:sld>
+</file>
+
+<file path=ppt/slides/slide11.xml><?xml version="1.0" encoding="utf-8"?>
+<p:sld xmlns:a="http://schemas.openxmlformats.org/drawingml/2006/main" xmlns:r="http://schemas.openxmlformats.org/officeDocument/2006/relationships" xmlns:p="http://schemas.openxmlformats.org/presentationml/2006/main">
+  <p:cSld>
+    <p:spTree>
+      <p:nvGrpSpPr>
+        <p:cNvPr id="1" name=""/>
+        <p:cNvGrpSpPr/>
+        <p:nvPr/>
+      </p:nvGrpSpPr>
+      <p:grpSpPr>
+        <a:xfrm>
+          <a:off x="0" y="0"/>
+          <a:ext cx="0" cy="0"/>
+          <a:chOff x="0" y="0"/>
+          <a:chExt cx="0" cy="0"/>
+        </a:xfrm>
+      </p:grpSpPr>
+      <p:sp>
+        <p:nvSpPr>
+          <p:cNvPr id="2" name="Título 1"/>
+          <p:cNvSpPr>
+            <a:spLocks noGrp="1"/>
+          </p:cNvSpPr>
+          <p:nvPr>
+            <p:ph type="title"/>
+          </p:nvPr>
+        </p:nvSpPr>
+        <p:spPr/>
+        <p:txBody>
+          <a:bodyPr/>
+          <a:lstStyle/>
+          <a:p>
+            <a:r>
+              <a:rPr lang="pt-PT" dirty="0" smtClean="0"/>
+              <a:t>Sistema de Informação</a:t>
+            </a:r>
+            <a:endParaRPr lang="pt-PT" dirty="0"/>
+          </a:p>
+        </p:txBody>
+      </p:sp>
+      <p:sp>
+        <p:nvSpPr>
+          <p:cNvPr id="3" name="Marcador de Posição de Conteúdo 2"/>
+          <p:cNvSpPr>
+            <a:spLocks noGrp="1"/>
+          </p:cNvSpPr>
+          <p:nvPr>
+            <p:ph idx="1"/>
+          </p:nvPr>
+        </p:nvSpPr>
+        <p:spPr/>
+        <p:txBody>
+          <a:bodyPr/>
+          <a:lstStyle/>
+          <a:p>
+            <a:r>
+              <a:rPr lang="pt-PT" dirty="0" smtClean="0"/>
+              <a:t>Tecnologia em </a:t>
+            </a:r>
+            <a:r>
+              <a:rPr lang="pt-PT" dirty="0" err="1" smtClean="0"/>
+              <a:t>Node.JS</a:t>
+            </a:r>
+            <a:endParaRPr lang="pt-PT" dirty="0" smtClean="0"/>
+          </a:p>
+          <a:p>
+            <a:r>
+              <a:rPr lang="pt-PT" dirty="0" smtClean="0"/>
+              <a:t>Suporte para servir uma lista de testes à </a:t>
+            </a:r>
+            <a:r>
+              <a:rPr lang="pt-PT" dirty="0" err="1" smtClean="0"/>
+              <a:t>app</a:t>
+            </a:r>
+            <a:endParaRPr lang="pt-PT" dirty="0" smtClean="0"/>
+          </a:p>
+          <a:p>
+            <a:r>
+              <a:rPr lang="pt-PT" dirty="0" smtClean="0"/>
+              <a:t>Suporte para receber uma lista de respostas aos testes a partir da </a:t>
+            </a:r>
+            <a:r>
+              <a:rPr lang="pt-PT" dirty="0" err="1" smtClean="0"/>
+              <a:t>app</a:t>
+            </a:r>
+            <a:endParaRPr lang="pt-PT" dirty="0" smtClean="0"/>
+          </a:p>
+          <a:p>
+            <a:r>
+              <a:rPr lang="pt-PT" dirty="0" smtClean="0"/>
+              <a:t>Comunicação feita através de </a:t>
+            </a:r>
+            <a:r>
+              <a:rPr lang="pt-PT" dirty="0" err="1" smtClean="0"/>
+              <a:t>Http</a:t>
+            </a:r>
+            <a:endParaRPr lang="pt-PT" dirty="0" smtClean="0"/>
+          </a:p>
+          <a:p>
+            <a:r>
+              <a:rPr lang="pt-PT" dirty="0" smtClean="0"/>
+              <a:t>Dados transferidos em JSON + Base64</a:t>
+            </a:r>
+          </a:p>
+          <a:p>
+            <a:endParaRPr lang="pt-PT" dirty="0"/>
+          </a:p>
+        </p:txBody>
+      </p:sp>
+    </p:spTree>
+  </p:cSld>
+  <p:clrMapOvr>
+    <a:masterClrMapping/>
+  </p:clrMapOvr>
+</p:sld>
+</file>
+
+<file path=ppt/slides/slide12.xml><?xml version="1.0" encoding="utf-8"?>
+<p:sld xmlns:a="http://schemas.openxmlformats.org/drawingml/2006/main" xmlns:r="http://schemas.openxmlformats.org/officeDocument/2006/relationships" xmlns:p="http://schemas.openxmlformats.org/presentationml/2006/main">
+  <p:cSld>
+    <p:spTree>
+      <p:nvGrpSpPr>
+        <p:cNvPr id="1" name=""/>
+        <p:cNvGrpSpPr/>
+        <p:nvPr/>
+      </p:nvGrpSpPr>
+      <p:grpSpPr>
+        <a:xfrm>
+          <a:off x="0" y="0"/>
+          <a:ext cx="0" cy="0"/>
+          <a:chOff x="0" y="0"/>
+          <a:chExt cx="0" cy="0"/>
+        </a:xfrm>
+      </p:grpSpPr>
+      <p:sp>
+        <p:nvSpPr>
+          <p:cNvPr id="2" name="Título 1"/>
+          <p:cNvSpPr>
+            <a:spLocks noGrp="1"/>
+          </p:cNvSpPr>
+          <p:nvPr>
+            <p:ph type="title"/>
+          </p:nvPr>
+        </p:nvSpPr>
+        <p:spPr/>
+        <p:txBody>
+          <a:bodyPr/>
+          <a:lstStyle/>
+          <a:p>
+            <a:endParaRPr lang="pt-PT" dirty="0"/>
+          </a:p>
+        </p:txBody>
+      </p:sp>
+      <p:sp>
+        <p:nvSpPr>
+          <p:cNvPr id="3" name="Marcador de Posição de Conteúdo 2"/>
+          <p:cNvSpPr>
+            <a:spLocks noGrp="1"/>
+          </p:cNvSpPr>
+          <p:nvPr>
+            <p:ph idx="1"/>
+          </p:nvPr>
+        </p:nvSpPr>
+        <p:spPr/>
+        <p:txBody>
+          <a:bodyPr/>
+          <a:lstStyle/>
+          <a:p>
+            <a:endParaRPr lang="pt-PT"/>
+          </a:p>
+        </p:txBody>
+      </p:sp>
+    </p:spTree>
+  </p:cSld>
+  <p:clrMapOvr>
+    <a:masterClrMapping/>
+  </p:clrMapOvr>
+</p:sld>
+</file>
+
+<file path=ppt/slides/slide13.xml><?xml version="1.0" encoding="utf-8"?>
+<p:sld xmlns:a="http://schemas.openxmlformats.org/drawingml/2006/main" xmlns:r="http://schemas.openxmlformats.org/officeDocument/2006/relationships" xmlns:p="http://schemas.openxmlformats.org/presentationml/2006/main">
+  <p:cSld>
+    <p:spTree>
+      <p:nvGrpSpPr>
+        <p:cNvPr id="1" name=""/>
+        <p:cNvGrpSpPr/>
+        <p:nvPr/>
+      </p:nvGrpSpPr>
+      <p:grpSpPr>
+        <a:xfrm>
+          <a:off x="0" y="0"/>
+          <a:ext cx="0" cy="0"/>
+          <a:chOff x="0" y="0"/>
+          <a:chExt cx="0" cy="0"/>
+        </a:xfrm>
+      </p:grpSpPr>
+      <p:sp>
+        <p:nvSpPr>
+          <p:cNvPr id="2" name="Título 1"/>
+          <p:cNvSpPr>
+            <a:spLocks noGrp="1"/>
+          </p:cNvSpPr>
+          <p:nvPr>
+            <p:ph type="ctrTitle"/>
+          </p:nvPr>
+        </p:nvSpPr>
+        <p:spPr/>
+        <p:txBody>
+          <a:bodyPr/>
+          <a:lstStyle/>
+          <a:p>
+            <a:r>
+              <a:rPr lang="pt-PT" dirty="0" err="1" smtClean="0"/>
+              <a:t>App</a:t>
+            </a:r>
+            <a:r>
+              <a:rPr lang="pt-PT" dirty="0" smtClean="0"/>
+              <a:t> </a:t>
+            </a:r>
+            <a:r>
+              <a:rPr lang="pt-PT" dirty="0" err="1" smtClean="0"/>
+              <a:t>Android</a:t>
+            </a:r>
+            <a:endParaRPr lang="pt-PT" dirty="0"/>
+          </a:p>
+        </p:txBody>
+      </p:sp>
+      <p:sp>
+        <p:nvSpPr>
+          <p:cNvPr id="3" name="Subtítulo 2"/>
+          <p:cNvSpPr>
+            <a:spLocks noGrp="1"/>
+          </p:cNvSpPr>
+          <p:nvPr>
+            <p:ph type="subTitle" idx="1"/>
+          </p:nvPr>
+        </p:nvSpPr>
+        <p:spPr/>
+        <p:txBody>
+          <a:bodyPr/>
+          <a:lstStyle/>
+          <a:p>
+            <a:r>
+              <a:rPr lang="pt-PT" dirty="0" smtClean="0"/>
+              <a:t>Obtenção e colocação de dados.</a:t>
+            </a:r>
+            <a:endParaRPr lang="pt-PT" dirty="0"/>
+          </a:p>
+        </p:txBody>
+      </p:sp>
+    </p:spTree>
+  </p:cSld>
+  <p:clrMapOvr>
+    <a:masterClrMapping/>
+  </p:clrMapOvr>
+</p:sld>
+</file>
+
+<file path=ppt/slides/slide14.xml><?xml version="1.0" encoding="utf-8"?>
+<p:sld xmlns:a="http://schemas.openxmlformats.org/drawingml/2006/main" xmlns:r="http://schemas.openxmlformats.org/officeDocument/2006/relationships" xmlns:p="http://schemas.openxmlformats.org/presentationml/2006/main">
+  <p:cSld>
+    <p:spTree>
+      <p:nvGrpSpPr>
+        <p:cNvPr id="1" name=""/>
+        <p:cNvGrpSpPr/>
+        <p:nvPr/>
+      </p:nvGrpSpPr>
+      <p:grpSpPr>
+        <a:xfrm>
+          <a:off x="0" y="0"/>
+          <a:ext cx="0" cy="0"/>
+          <a:chOff x="0" y="0"/>
+          <a:chExt cx="0" cy="0"/>
+        </a:xfrm>
+      </p:grpSpPr>
+      <p:sp>
+        <p:nvSpPr>
+          <p:cNvPr id="2" name="Título 1"/>
+          <p:cNvSpPr>
+            <a:spLocks noGrp="1"/>
+          </p:cNvSpPr>
+          <p:nvPr>
+            <p:ph type="title"/>
+          </p:nvPr>
+        </p:nvSpPr>
+        <p:spPr/>
+        <p:txBody>
+          <a:bodyPr/>
+          <a:lstStyle/>
+          <a:p>
+            <a:r>
+              <a:rPr lang="pt-PT" dirty="0" smtClean="0"/>
+              <a:t>Características</a:t>
+            </a:r>
+            <a:endParaRPr lang="pt-PT" dirty="0"/>
+          </a:p>
+        </p:txBody>
+      </p:sp>
+      <p:sp>
+        <p:nvSpPr>
+          <p:cNvPr id="3" name="Marcador de Posição de Conteúdo 2"/>
+          <p:cNvSpPr>
+            <a:spLocks noGrp="1"/>
+          </p:cNvSpPr>
+          <p:nvPr>
+            <p:ph idx="1"/>
+          </p:nvPr>
+        </p:nvSpPr>
+        <p:spPr/>
+        <p:txBody>
+          <a:bodyPr/>
+          <a:lstStyle/>
+          <a:p>
+            <a:r>
+              <a:rPr lang="pt-PT" dirty="0" smtClean="0"/>
+              <a:t>Faz uso de um </a:t>
+            </a:r>
+            <a:r>
+              <a:rPr lang="pt-PT" dirty="0" err="1" smtClean="0"/>
+              <a:t>HttpClient</a:t>
+            </a:r>
+            <a:r>
+              <a:rPr lang="pt-PT" dirty="0" smtClean="0"/>
+              <a:t> para requisitar e colocar recursos no servidor</a:t>
+            </a:r>
+          </a:p>
+          <a:p>
+            <a:r>
+              <a:rPr lang="pt-PT" dirty="0" smtClean="0"/>
+              <a:t>Faz uso de </a:t>
+            </a:r>
+            <a:r>
+              <a:rPr lang="pt-PT" dirty="0" err="1" smtClean="0"/>
+              <a:t>APIs</a:t>
+            </a:r>
+            <a:r>
+              <a:rPr lang="pt-PT" dirty="0" smtClean="0"/>
+              <a:t> do </a:t>
+            </a:r>
+            <a:r>
+              <a:rPr lang="pt-PT" dirty="0" err="1" smtClean="0"/>
+              <a:t>Android</a:t>
+            </a:r>
+            <a:r>
+              <a:rPr lang="pt-PT" dirty="0" smtClean="0"/>
+              <a:t> para fazer o tratamento de JSON</a:t>
+            </a:r>
+          </a:p>
+          <a:p>
+            <a:r>
+              <a:rPr lang="pt-PT" dirty="0" smtClean="0"/>
+              <a:t>Recursos são </a:t>
+            </a:r>
+            <a:r>
+              <a:rPr lang="pt-PT" smtClean="0"/>
+              <a:t>disponibili</a:t>
+            </a:r>
+            <a:endParaRPr lang="pt-PT" dirty="0"/>
+          </a:p>
+        </p:txBody>
+      </p:sp>
+    </p:spTree>
+  </p:cSld>
+  <p:clrMapOvr>
+    <a:masterClrMapping/>
+  </p:clrMapOvr>
+</p:sld>
+</file>
+
+<file path=ppt/slides/slide15.xml><?xml version="1.0" encoding="utf-8"?>
+<p:sld xmlns:a="http://schemas.openxmlformats.org/drawingml/2006/main" xmlns:r="http://schemas.openxmlformats.org/officeDocument/2006/relationships" xmlns:p="http://schemas.openxmlformats.org/presentationml/2006/main">
+  <p:cSld>
+    <p:spTree>
+      <p:nvGrpSpPr>
+        <p:cNvPr id="1" name=""/>
+        <p:cNvGrpSpPr/>
+        <p:nvPr/>
+      </p:nvGrpSpPr>
+      <p:grpSpPr>
+        <a:xfrm>
+          <a:off x="0" y="0"/>
+          <a:ext cx="0" cy="0"/>
+          <a:chOff x="0" y="0"/>
+          <a:chExt cx="0" cy="0"/>
+        </a:xfrm>
+      </p:grpSpPr>
+      <p:pic>
+        <p:nvPicPr>
+          <p:cNvPr id="8" name="Imagem 7" descr="dart-logo-wordmark-1200w.png"/>
+          <p:cNvPicPr>
+            <a:picLocks noChangeAspect="1"/>
+          </p:cNvPicPr>
+          <p:nvPr/>
+        </p:nvPicPr>
+        <p:blipFill>
+          <a:blip r:embed="rId2" cstate="print"/>
+          <a:stretch>
+            <a:fillRect/>
+          </a:stretch>
+        </p:blipFill>
+        <p:spPr>
+          <a:xfrm>
+            <a:off x="2743196" y="1485897"/>
+            <a:ext cx="3657607" cy="2743206"/>
+          </a:xfrm>
+          <a:prstGeom prst="rect">
+            <a:avLst/>
+          </a:prstGeom>
+        </p:spPr>
+      </p:pic>
+    </p:spTree>
+  </p:cSld>
+  <p:clrMapOvr>
+    <a:masterClrMapping/>
+  </p:clrMapOvr>
+  <p:timing>
+    <p:tnLst>
+      <p:par>
+        <p:cTn id="1" dur="indefinite" restart="never" nodeType="tmRoot"/>
+      </p:par>
+    </p:tnLst>
+  </p:timing>
+</p:sld>
+</file>
+
+<file path=ppt/slides/slide16.xml><?xml version="1.0" encoding="utf-8"?>
 <p:sld xmlns:a="http://schemas.openxmlformats.org/drawingml/2006/main" xmlns:r="http://schemas.openxmlformats.org/officeDocument/2006/relationships" xmlns:p="http://schemas.openxmlformats.org/presentationml/2006/main">
   <p:cSld>
     <p:spTree>
@@ -6186,7 +7341,7 @@
 </p:sld>
 </file>
 
-<file path=ppt/slides/slide11.xml><?xml version="1.0" encoding="utf-8"?>
+<file path=ppt/slides/slide17.xml><?xml version="1.0" encoding="utf-8"?>
 <p:sld xmlns:a="http://schemas.openxmlformats.org/drawingml/2006/main" xmlns:r="http://schemas.openxmlformats.org/officeDocument/2006/relationships" xmlns:p="http://schemas.openxmlformats.org/presentationml/2006/main">
   <p:cSld>
     <p:spTree>
@@ -6339,7 +7494,7 @@
 </p:sld>
 </file>
 
-<file path=ppt/slides/slide12.xml><?xml version="1.0" encoding="utf-8"?>
+<file path=ppt/slides/slide18.xml><?xml version="1.0" encoding="utf-8"?>
 <p:sld xmlns:a="http://schemas.openxmlformats.org/drawingml/2006/main" xmlns:r="http://schemas.openxmlformats.org/officeDocument/2006/relationships" xmlns:p="http://schemas.openxmlformats.org/presentationml/2006/main">
   <p:cSld>
     <p:spTree>
@@ -6356,106 +7511,169 @@
           <a:chExt cx="0" cy="0"/>
         </a:xfrm>
       </p:grpSpPr>
-      <p:sp>
-        <p:nvSpPr>
-          <p:cNvPr id="2" name="Título 1"/>
-          <p:cNvSpPr>
-            <a:spLocks noGrp="1"/>
-          </p:cNvSpPr>
-          <p:nvPr>
-            <p:ph type="title"/>
-          </p:nvPr>
-        </p:nvSpPr>
-        <p:spPr/>
-        <p:txBody>
-          <a:bodyPr/>
-          <a:lstStyle/>
-          <a:p>
-            <a:r>
-              <a:rPr lang="pt-PT" dirty="0" smtClean="0"/>
-              <a:t>Limitações</a:t>
-            </a:r>
-            <a:endParaRPr lang="pt-PT" dirty="0"/>
-          </a:p>
-        </p:txBody>
-      </p:sp>
-      <p:sp>
-        <p:nvSpPr>
-          <p:cNvPr id="3" name="Marcador de Posição de Conteúdo 2"/>
-          <p:cNvSpPr>
-            <a:spLocks noGrp="1"/>
-          </p:cNvSpPr>
-          <p:nvPr>
-            <p:ph idx="1"/>
-          </p:nvPr>
-        </p:nvSpPr>
-        <p:spPr/>
-        <p:txBody>
-          <a:bodyPr/>
-          <a:lstStyle/>
-          <a:p>
-            <a:r>
-              <a:rPr lang="pt-PT" dirty="0" smtClean="0"/>
-              <a:t>Bibliotecas de autenticação inexistentes</a:t>
-            </a:r>
-          </a:p>
-          <a:p>
-            <a:r>
-              <a:rPr lang="pt-PT" dirty="0" smtClean="0"/>
-              <a:t>Linguagem relativamente recente</a:t>
-            </a:r>
-          </a:p>
-          <a:p>
-            <a:r>
-              <a:rPr lang="pt-PT" dirty="0" err="1" smtClean="0"/>
-              <a:t>Isolates</a:t>
-            </a:r>
-            <a:r>
-              <a:rPr lang="pt-PT" dirty="0" smtClean="0"/>
-              <a:t> não são </a:t>
-            </a:r>
-            <a:r>
-              <a:rPr lang="pt-PT" dirty="0" err="1" smtClean="0"/>
-              <a:t>Threads</a:t>
-            </a:r>
-            <a:endParaRPr lang="pt-PT" dirty="0" smtClean="0"/>
-          </a:p>
-          <a:p>
-            <a:pPr lvl="1"/>
-            <a:r>
-              <a:rPr lang="pt-PT" dirty="0" smtClean="0"/>
-              <a:t>Não há memória partilhada entre </a:t>
-            </a:r>
-            <a:r>
-              <a:rPr lang="pt-PT" dirty="0" err="1" smtClean="0"/>
-              <a:t>Isolates</a:t>
-            </a:r>
-            <a:endParaRPr lang="pt-PT" dirty="0" smtClean="0"/>
-          </a:p>
-          <a:p>
-            <a:pPr lvl="1"/>
-            <a:r>
-              <a:rPr lang="pt-PT" dirty="0" smtClean="0"/>
-              <a:t>Comunicação feita através de mensagens</a:t>
-            </a:r>
-          </a:p>
-          <a:p>
-            <a:pPr lvl="1"/>
-            <a:r>
-              <a:rPr lang="pt-PT" dirty="0" smtClean="0"/>
-              <a:t>Tipos limitados de objetos transportáveis</a:t>
-            </a:r>
-          </a:p>
-          <a:p>
-            <a:endParaRPr lang="pt-PT" dirty="0" smtClean="0"/>
-          </a:p>
-        </p:txBody>
-      </p:sp>
+      <p:pic>
+        <p:nvPicPr>
+          <p:cNvPr id="6" name="Imagem 5" descr="Untitled-1.png"/>
+          <p:cNvPicPr>
+            <a:picLocks noChangeAspect="1"/>
+          </p:cNvPicPr>
+          <p:nvPr/>
+        </p:nvPicPr>
+        <p:blipFill>
+          <a:blip r:embed="rId3" cstate="print"/>
+          <a:stretch>
+            <a:fillRect/>
+          </a:stretch>
+        </p:blipFill>
+        <p:spPr>
+          <a:xfrm>
+            <a:off x="971600" y="494664"/>
+            <a:ext cx="7200800" cy="4725672"/>
+          </a:xfrm>
+          <a:prstGeom prst="rect">
+            <a:avLst/>
+          </a:prstGeom>
+        </p:spPr>
+      </p:pic>
     </p:spTree>
   </p:cSld>
   <p:clrMapOvr>
     <a:masterClrMapping/>
   </p:clrMapOvr>
+  <p:timing>
+    <p:tnLst>
+      <p:par>
+        <p:cTn id="1" dur="indefinite" restart="never" nodeType="tmRoot"/>
+      </p:par>
+    </p:tnLst>
+  </p:timing>
+</p:sld>
+</file>
+
+<file path=ppt/slides/slide19.xml><?xml version="1.0" encoding="utf-8"?>
+<p:sld xmlns:a="http://schemas.openxmlformats.org/drawingml/2006/main" xmlns:r="http://schemas.openxmlformats.org/officeDocument/2006/relationships" xmlns:p="http://schemas.openxmlformats.org/presentationml/2006/main">
+  <p:cSld>
+    <p:spTree>
+      <p:nvGrpSpPr>
+        <p:cNvPr id="1" name=""/>
+        <p:cNvGrpSpPr/>
+        <p:nvPr/>
+      </p:nvGrpSpPr>
+      <p:grpSpPr>
+        <a:xfrm>
+          <a:off x="0" y="0"/>
+          <a:ext cx="0" cy="0"/>
+          <a:chOff x="0" y="0"/>
+          <a:chExt cx="0" cy="0"/>
+        </a:xfrm>
+      </p:grpSpPr>
+      <p:sp>
+        <p:nvSpPr>
+          <p:cNvPr id="2" name="Título 1"/>
+          <p:cNvSpPr>
+            <a:spLocks noGrp="1"/>
+          </p:cNvSpPr>
+          <p:nvPr>
+            <p:ph type="title"/>
+          </p:nvPr>
+        </p:nvSpPr>
+        <p:spPr/>
+        <p:txBody>
+          <a:bodyPr/>
+          <a:lstStyle/>
+          <a:p>
+            <a:r>
+              <a:rPr lang="pt-PT" dirty="0" smtClean="0"/>
+              <a:t>Limitações</a:t>
+            </a:r>
+            <a:endParaRPr lang="pt-PT" dirty="0"/>
+          </a:p>
+        </p:txBody>
+      </p:sp>
+      <p:sp>
+        <p:nvSpPr>
+          <p:cNvPr id="3" name="Marcador de Posição de Conteúdo 2"/>
+          <p:cNvSpPr>
+            <a:spLocks noGrp="1"/>
+          </p:cNvSpPr>
+          <p:nvPr>
+            <p:ph idx="1"/>
+          </p:nvPr>
+        </p:nvSpPr>
+        <p:spPr/>
+        <p:txBody>
+          <a:bodyPr/>
+          <a:lstStyle/>
+          <a:p>
+            <a:r>
+              <a:rPr lang="pt-PT" dirty="0" smtClean="0"/>
+              <a:t>Bibliotecas de autenticação inexistentes</a:t>
+            </a:r>
+          </a:p>
+          <a:p>
+            <a:r>
+              <a:rPr lang="pt-PT" dirty="0" smtClean="0"/>
+              <a:t>Linguagem relativamente recente</a:t>
+            </a:r>
+          </a:p>
+          <a:p>
+            <a:r>
+              <a:rPr lang="pt-PT" dirty="0" err="1" smtClean="0"/>
+              <a:t>Isolates</a:t>
+            </a:r>
+            <a:r>
+              <a:rPr lang="pt-PT" dirty="0" smtClean="0"/>
+              <a:t> não são </a:t>
+            </a:r>
+            <a:r>
+              <a:rPr lang="pt-PT" dirty="0" err="1" smtClean="0"/>
+              <a:t>Threads</a:t>
+            </a:r>
+            <a:endParaRPr lang="pt-PT" dirty="0" smtClean="0"/>
+          </a:p>
+          <a:p>
+            <a:pPr lvl="1"/>
+            <a:r>
+              <a:rPr lang="pt-PT" dirty="0" smtClean="0"/>
+              <a:t>Não há memória partilhada entre </a:t>
+            </a:r>
+            <a:r>
+              <a:rPr lang="pt-PT" dirty="0" err="1" smtClean="0"/>
+              <a:t>Isolates</a:t>
+            </a:r>
+            <a:endParaRPr lang="pt-PT" dirty="0" smtClean="0"/>
+          </a:p>
+          <a:p>
+            <a:pPr lvl="1"/>
+            <a:r>
+              <a:rPr lang="pt-PT" dirty="0" smtClean="0"/>
+              <a:t>Comunicação feita através de mensagens</a:t>
+            </a:r>
+          </a:p>
+          <a:p>
+            <a:pPr lvl="1"/>
+            <a:r>
+              <a:rPr lang="pt-PT" dirty="0" smtClean="0"/>
+              <a:t>Tipos limitados de objetos transportáveis</a:t>
+            </a:r>
+          </a:p>
+          <a:p>
+            <a:endParaRPr lang="pt-PT" dirty="0" smtClean="0"/>
+          </a:p>
+        </p:txBody>
+      </p:sp>
+    </p:spTree>
+  </p:cSld>
+  <p:clrMapOvr>
+    <a:masterClrMapping/>
+  </p:clrMapOvr>
+  <p:timing>
+    <p:tnLst>
+      <p:par>
+        <p:cTn id="1" dur="indefinite" restart="never" nodeType="tmRoot"/>
+      </p:par>
+    </p:tnLst>
+  </p:timing>
 </p:sld>
 </file>
 
@@ -6786,12 +8004,12 @@
       </p:grpSpPr>
       <p:sp>
         <p:nvSpPr>
-          <p:cNvPr id="2" name="Título 1"/>
-          <p:cNvSpPr>
-            <a:spLocks noGrp="1"/>
-          </p:cNvSpPr>
-          <p:nvPr>
-            <p:ph type="title"/>
+          <p:cNvPr id="2" name="Marcador de Posição do Texto 1"/>
+          <p:cNvSpPr>
+            <a:spLocks noGrp="1"/>
+          </p:cNvSpPr>
+          <p:nvPr>
+            <p:ph type="body" sz="quarter" idx="14"/>
           </p:nvPr>
         </p:nvSpPr>
         <p:spPr/>
@@ -6801,130 +8019,40 @@
           <a:p>
             <a:r>
               <a:rPr lang="pt-PT" dirty="0" smtClean="0"/>
-              <a:t>Tecnologias para o Servidor</a:t>
+              <a:t>Estrutura do </a:t>
+            </a:r>
+            <a:r>
+              <a:rPr lang="pt-PT" dirty="0" err="1" smtClean="0"/>
+              <a:t>WebService</a:t>
             </a:r>
             <a:endParaRPr lang="pt-PT" dirty="0"/>
           </a:p>
         </p:txBody>
       </p:sp>
-      <p:sp>
-        <p:nvSpPr>
-          <p:cNvPr id="3" name="Marcador de Posição de Conteúdo 2"/>
-          <p:cNvSpPr>
-            <a:spLocks noGrp="1"/>
-          </p:cNvSpPr>
-          <p:nvPr>
-            <p:ph idx="1"/>
-          </p:nvPr>
-        </p:nvSpPr>
-        <p:spPr/>
-        <p:txBody>
-          <a:bodyPr>
-            <a:normAutofit/>
-          </a:bodyPr>
-          <a:lstStyle/>
-          <a:p>
-            <a:r>
-              <a:rPr lang="pt-PT" dirty="0" smtClean="0"/>
-              <a:t>Pensou-se nas seguintes opções:</a:t>
-            </a:r>
-          </a:p>
-          <a:p>
-            <a:pPr lvl="1"/>
-            <a:r>
-              <a:rPr lang="pt-PT" dirty="0" err="1" smtClean="0"/>
-              <a:t>asp.NET</a:t>
-            </a:r>
-            <a:r>
-              <a:rPr lang="pt-PT" dirty="0" smtClean="0"/>
-              <a:t> (</a:t>
-            </a:r>
-            <a:r>
-              <a:rPr lang="pt-PT" dirty="0" err="1" smtClean="0"/>
-              <a:t>Licensas</a:t>
-            </a:r>
-            <a:r>
-              <a:rPr lang="pt-PT" dirty="0" smtClean="0"/>
-              <a:t> do Windows são pagas)</a:t>
-            </a:r>
-          </a:p>
-          <a:p>
-            <a:pPr lvl="1"/>
-            <a:r>
-              <a:rPr lang="pt-PT" dirty="0" err="1" smtClean="0"/>
-              <a:t>Python</a:t>
-            </a:r>
-            <a:r>
-              <a:rPr lang="pt-PT" dirty="0" smtClean="0"/>
-              <a:t> (Só uma pessoa conhece, e pouco)</a:t>
-            </a:r>
-          </a:p>
-          <a:p>
-            <a:pPr lvl="1"/>
-            <a:r>
-              <a:rPr lang="pt-PT" dirty="0" smtClean="0"/>
-              <a:t>Apache, </a:t>
-            </a:r>
-            <a:r>
-              <a:rPr lang="pt-PT" dirty="0" err="1" smtClean="0"/>
-              <a:t>Nginx</a:t>
-            </a:r>
-            <a:r>
-              <a:rPr lang="pt-PT" dirty="0" smtClean="0"/>
-              <a:t> (Só servem ficheiros estáticos)</a:t>
-            </a:r>
-          </a:p>
-          <a:p>
-            <a:pPr lvl="1"/>
-            <a:r>
-              <a:rPr lang="pt-PT" dirty="0" err="1" smtClean="0"/>
-              <a:t>NodeJS</a:t>
-            </a:r>
-            <a:r>
-              <a:rPr lang="pt-PT" dirty="0" smtClean="0"/>
-              <a:t> (</a:t>
-            </a:r>
-            <a:r>
-              <a:rPr lang="pt-PT" dirty="0" err="1" smtClean="0"/>
-              <a:t>Learning</a:t>
-            </a:r>
-            <a:r>
-              <a:rPr lang="pt-PT" dirty="0" smtClean="0"/>
-              <a:t> curve elevada, com </a:t>
-            </a:r>
-            <a:r>
-              <a:rPr lang="pt-PT" dirty="0" err="1" smtClean="0"/>
-              <a:t>frameworks</a:t>
-            </a:r>
-            <a:r>
-              <a:rPr lang="pt-PT" dirty="0" smtClean="0"/>
-              <a:t>)</a:t>
-            </a:r>
-          </a:p>
-          <a:p>
-            <a:pPr lvl="1"/>
-            <a:r>
-              <a:rPr lang="pt-PT" dirty="0" smtClean="0"/>
-              <a:t>PHP (</a:t>
-            </a:r>
-            <a:r>
-              <a:rPr lang="pt-PT" dirty="0" err="1" smtClean="0"/>
-              <a:t>Ugh</a:t>
-            </a:r>
-            <a:r>
-              <a:rPr lang="pt-PT" dirty="0" smtClean="0"/>
-              <a:t>!)</a:t>
-            </a:r>
-          </a:p>
-          <a:p>
-            <a:pPr lvl="1"/>
-            <a:r>
-              <a:rPr lang="pt-PT" dirty="0" smtClean="0"/>
-              <a:t>Outra que vamos falar à frente</a:t>
-            </a:r>
-          </a:p>
-        </p:txBody>
-      </p:sp>
+      <p:pic>
+        <p:nvPicPr>
+          <p:cNvPr id="8" name="Imagem 7" descr="Architecture.wmf"/>
+          <p:cNvPicPr>
+            <a:picLocks noChangeAspect="1"/>
+          </p:cNvPicPr>
+          <p:nvPr/>
+        </p:nvPicPr>
+        <p:blipFill>
+          <a:blip r:embed="rId2" cstate="print"/>
+          <a:stretch>
+            <a:fillRect/>
+          </a:stretch>
+        </p:blipFill>
+        <p:spPr>
+          <a:xfrm>
+            <a:off x="2862360" y="306700"/>
+            <a:ext cx="3419280" cy="3990960"/>
+          </a:xfrm>
+          <a:prstGeom prst="rect">
+            <a:avLst/>
+          </a:prstGeom>
+        </p:spPr>
+      </p:pic>
     </p:spTree>
   </p:cSld>
   <p:clrMapOvr>
@@ -6974,7 +8102,11 @@
           <a:p>
             <a:r>
               <a:rPr lang="pt-PT" dirty="0" smtClean="0"/>
-              <a:t>Tecnologias para o SGBD</a:t>
+              <a:t>Tecnologias para o </a:t>
+            </a:r>
+            <a:r>
+              <a:rPr lang="pt-PT" dirty="0" smtClean="0"/>
+              <a:t>Servidor Web</a:t>
             </a:r>
             <a:endParaRPr lang="pt-PT" dirty="0"/>
           </a:p>
@@ -6992,19 +8124,25 @@
         </p:nvSpPr>
         <p:spPr/>
         <p:txBody>
-          <a:bodyPr/>
-          <a:lstStyle/>
-          <a:p>
-            <a:r>
-              <a:rPr lang="pt-PT" dirty="0" smtClean="0"/>
-              <a:t>Pensou-se nas seguintes tecnologias de SGBD:</a:t>
+          <a:bodyPr>
+            <a:normAutofit/>
+          </a:bodyPr>
+          <a:lstStyle/>
+          <a:p>
+            <a:r>
+              <a:rPr lang="pt-PT" dirty="0" smtClean="0"/>
+              <a:t>Pensou-se nas seguintes opções:</a:t>
             </a:r>
           </a:p>
           <a:p>
             <a:pPr lvl="1"/>
             <a:r>
-              <a:rPr lang="pt-PT" dirty="0" smtClean="0"/>
-              <a:t>Microsoft SQL Server (</a:t>
+              <a:rPr lang="pt-PT" dirty="0" err="1" smtClean="0"/>
+              <a:t>asp.NET</a:t>
+            </a:r>
+            <a:r>
+              <a:rPr lang="pt-PT" dirty="0" smtClean="0"/>
+              <a:t> (</a:t>
             </a:r>
             <a:r>
               <a:rPr lang="pt-PT" dirty="0" err="1" smtClean="0"/>
@@ -7012,14 +8150,40 @@
             </a:r>
             <a:r>
               <a:rPr lang="pt-PT" dirty="0" smtClean="0"/>
-              <a:t> do Windows outra vez)</a:t>
+              <a:t> do Windows são pagas)</a:t>
             </a:r>
           </a:p>
           <a:p>
             <a:pPr lvl="1"/>
             <a:r>
               <a:rPr lang="pt-PT" dirty="0" err="1" smtClean="0"/>
-              <a:t>MongoDB+Semelhantes</a:t>
+              <a:t>Python</a:t>
+            </a:r>
+            <a:r>
+              <a:rPr lang="pt-PT" dirty="0" smtClean="0"/>
+              <a:t> (Só uma pessoa conhece, e pouco)</a:t>
+            </a:r>
+          </a:p>
+          <a:p>
+            <a:pPr lvl="1"/>
+            <a:r>
+              <a:rPr lang="pt-PT" dirty="0" smtClean="0"/>
+              <a:t>Apache, </a:t>
+            </a:r>
+            <a:r>
+              <a:rPr lang="pt-PT" dirty="0" err="1" smtClean="0"/>
+              <a:t>Nginx</a:t>
+            </a:r>
+            <a:r>
+              <a:rPr lang="pt-PT" dirty="0" smtClean="0"/>
+              <a:t> (Só servem ficheiros estáticos)</a:t>
+            </a:r>
+          </a:p>
+          <a:p>
+            <a:pPr lvl="1"/>
+            <a:r>
+              <a:rPr lang="pt-PT" dirty="0" err="1" smtClean="0"/>
+              <a:t>NodeJS</a:t>
             </a:r>
             <a:r>
               <a:rPr lang="pt-PT" dirty="0" smtClean="0"/>
@@ -7027,55 +8191,42 @@
             </a:r>
             <a:r>
               <a:rPr lang="pt-PT" dirty="0" err="1" smtClean="0"/>
-              <a:t>NoSQL</a:t>
-            </a:r>
-            <a:r>
-              <a:rPr lang="pt-PT" dirty="0" smtClean="0"/>
-              <a:t> → No ACID, No </a:t>
+              <a:t>Learning</a:t>
+            </a:r>
+            <a:r>
+              <a:rPr lang="pt-PT" dirty="0" smtClean="0"/>
+              <a:t> curve elevada, com </a:t>
             </a:r>
             <a:r>
               <a:rPr lang="pt-PT" dirty="0" err="1" smtClean="0"/>
-              <a:t>Transactions</a:t>
-            </a:r>
-            <a:r>
-              <a:rPr lang="pt-PT" dirty="0" smtClean="0"/>
-              <a:t>…)</a:t>
+              <a:t>frameworks</a:t>
+            </a:r>
+            <a:r>
+              <a:rPr lang="pt-PT" dirty="0" smtClean="0"/>
+              <a:t>)</a:t>
             </a:r>
           </a:p>
           <a:p>
             <a:pPr lvl="1"/>
             <a:r>
               <a:rPr lang="pt-PT" dirty="0" smtClean="0"/>
-              <a:t>Oracle (</a:t>
+              <a:t>PHP (</a:t>
             </a:r>
             <a:r>
               <a:rPr lang="pt-PT" dirty="0" err="1" smtClean="0"/>
-              <a:t>Insert</a:t>
-            </a:r>
-            <a:r>
-              <a:rPr lang="pt-PT" dirty="0" smtClean="0"/>
-              <a:t> </a:t>
-            </a:r>
-            <a:r>
-              <a:rPr lang="pt-PT" dirty="0" err="1" smtClean="0"/>
-              <a:t>coin</a:t>
-            </a:r>
-            <a:r>
-              <a:rPr lang="pt-PT" dirty="0" smtClean="0"/>
-              <a:t> to continue?)</a:t>
+              <a:t>Ugh</a:t>
+            </a:r>
+            <a:r>
+              <a:rPr lang="pt-PT" dirty="0" smtClean="0"/>
+              <a:t>!)</a:t>
             </a:r>
           </a:p>
           <a:p>
             <a:pPr lvl="1"/>
             <a:r>
-              <a:rPr lang="pt-PT" dirty="0" err="1" smtClean="0"/>
-              <a:t>MySQL</a:t>
-            </a:r>
-            <a:r>
-              <a:rPr lang="pt-PT" dirty="0" smtClean="0"/>
-              <a:t> (Simples, conhecido, boa documentação)</a:t>
-            </a:r>
-            <a:endParaRPr lang="pt-PT" dirty="0"/>
+              <a:rPr lang="pt-PT" dirty="0" smtClean="0"/>
+              <a:t>Outra que vamos falar à frente</a:t>
+            </a:r>
           </a:p>
         </p:txBody>
       </p:sp>
@@ -7128,7 +8279,7 @@
           <a:p>
             <a:r>
               <a:rPr lang="pt-PT" dirty="0" smtClean="0"/>
-              <a:t>Protocolos e suporte de dados</a:t>
+              <a:t>Tecnologias para o SGBD</a:t>
             </a:r>
             <a:endParaRPr lang="pt-PT" dirty="0"/>
           </a:p>
@@ -7151,35 +8302,85 @@
           <a:p>
             <a:r>
               <a:rPr lang="pt-PT" dirty="0" smtClean="0"/>
-              <a:t>Protocolo da camada de aplicação:</a:t>
+              <a:t>Pensou-se nas seguintes tecnologias de SGBD:</a:t>
             </a:r>
           </a:p>
           <a:p>
             <a:pPr lvl="1"/>
             <a:r>
               <a:rPr lang="pt-PT" dirty="0" smtClean="0"/>
-              <a:t>HTTP (Testado, comum, trabalha sobre TCP, pode-se usar SSL para encriptação)</a:t>
-            </a:r>
-          </a:p>
-          <a:p>
-            <a:r>
-              <a:rPr lang="pt-PT" dirty="0" smtClean="0"/>
-              <a:t>Suporte de dados:</a:t>
+              <a:t>Microsoft SQL Server (</a:t>
+            </a:r>
+            <a:r>
+              <a:rPr lang="pt-PT" dirty="0" err="1" smtClean="0"/>
+              <a:t>Licensas</a:t>
+            </a:r>
+            <a:r>
+              <a:rPr lang="pt-PT" dirty="0" smtClean="0"/>
+              <a:t> do Windows outra vez)</a:t>
             </a:r>
           </a:p>
           <a:p>
             <a:pPr lvl="1"/>
             <a:r>
-              <a:rPr lang="pt-PT" dirty="0" smtClean="0"/>
-              <a:t>XML (Pesado, difícil tratamento)</a:t>
+              <a:rPr lang="pt-PT" dirty="0" err="1" smtClean="0"/>
+              <a:t>MongoDB+Semelhantes</a:t>
+            </a:r>
+            <a:r>
+              <a:rPr lang="pt-PT" dirty="0" smtClean="0"/>
+              <a:t> (</a:t>
+            </a:r>
+            <a:r>
+              <a:rPr lang="pt-PT" dirty="0" err="1" smtClean="0"/>
+              <a:t>NoSQL</a:t>
+            </a:r>
+            <a:r>
+              <a:rPr lang="pt-PT" dirty="0" smtClean="0"/>
+              <a:t> → No ACID, No </a:t>
+            </a:r>
+            <a:r>
+              <a:rPr lang="pt-PT" dirty="0" err="1" smtClean="0"/>
+              <a:t>Transactions</a:t>
+            </a:r>
+            <a:r>
+              <a:rPr lang="pt-PT" dirty="0" smtClean="0"/>
+              <a:t>…)</a:t>
             </a:r>
           </a:p>
           <a:p>
             <a:pPr lvl="1"/>
             <a:r>
               <a:rPr lang="pt-PT" dirty="0" smtClean="0"/>
-              <a:t>JSON (Leve, fácil tratamento por linguagens modernas)</a:t>
-            </a:r>
+              <a:t>Oracle (</a:t>
+            </a:r>
+            <a:r>
+              <a:rPr lang="pt-PT" dirty="0" err="1" smtClean="0"/>
+              <a:t>Insert</a:t>
+            </a:r>
+            <a:r>
+              <a:rPr lang="pt-PT" dirty="0" smtClean="0"/>
+              <a:t> </a:t>
+            </a:r>
+            <a:r>
+              <a:rPr lang="pt-PT" dirty="0" err="1" smtClean="0"/>
+              <a:t>coin</a:t>
+            </a:r>
+            <a:r>
+              <a:rPr lang="pt-PT" dirty="0" smtClean="0"/>
+              <a:t> to continue?)</a:t>
+            </a:r>
+          </a:p>
+          <a:p>
+            <a:pPr lvl="1"/>
+            <a:r>
+              <a:rPr lang="pt-PT" dirty="0" err="1" smtClean="0"/>
+              <a:t>MySQL</a:t>
+            </a:r>
+            <a:r>
+              <a:rPr lang="pt-PT" dirty="0" smtClean="0"/>
+              <a:t> (Simples, conhecido, boa documentação)</a:t>
+            </a:r>
+            <a:endParaRPr lang="pt-PT" dirty="0"/>
           </a:p>
         </p:txBody>
       </p:sp>
@@ -7232,7 +8433,7 @@
           <a:p>
             <a:r>
               <a:rPr lang="pt-PT" dirty="0" smtClean="0"/>
-              <a:t>Tecnologias escolhidas</a:t>
+              <a:t>Protocolos e suporte de dados</a:t>
             </a:r>
             <a:endParaRPr lang="pt-PT" dirty="0"/>
           </a:p>
@@ -7255,59 +8456,35 @@
           <a:p>
             <a:r>
               <a:rPr lang="pt-PT" dirty="0" smtClean="0"/>
-              <a:t>Protocolo de transporte: HTTP</a:t>
-            </a:r>
-          </a:p>
-          <a:p>
-            <a:r>
-              <a:rPr lang="pt-PT" dirty="0" smtClean="0"/>
-              <a:t>Suporte de dados: JSON</a:t>
-            </a:r>
-          </a:p>
-          <a:p>
-            <a:r>
-              <a:rPr lang="pt-PT" dirty="0" smtClean="0"/>
-              <a:t>Servidor web + </a:t>
-            </a:r>
-            <a:r>
-              <a:rPr lang="pt-PT" dirty="0" err="1" smtClean="0"/>
-              <a:t>WebService</a:t>
-            </a:r>
-            <a:r>
-              <a:rPr lang="pt-PT" dirty="0" smtClean="0"/>
-              <a:t>: </a:t>
-            </a:r>
-            <a:r>
-              <a:rPr lang="pt-PT" dirty="0" err="1" smtClean="0"/>
-              <a:t>Node.JS</a:t>
-            </a:r>
-            <a:endParaRPr lang="pt-PT" dirty="0" smtClean="0"/>
-          </a:p>
-          <a:p>
-            <a:r>
-              <a:rPr lang="pt-PT" dirty="0" smtClean="0"/>
-              <a:t>Base de dados: </a:t>
-            </a:r>
-            <a:r>
-              <a:rPr lang="pt-PT" dirty="0" err="1" smtClean="0"/>
-              <a:t>MySQL</a:t>
-            </a:r>
-            <a:endParaRPr lang="pt-PT" dirty="0" smtClean="0"/>
-          </a:p>
-          <a:p>
-            <a:r>
-              <a:rPr lang="pt-PT" dirty="0" smtClean="0"/>
-              <a:t>Sistema Operativo: Linux (</a:t>
-            </a:r>
-            <a:r>
-              <a:rPr lang="pt-PT" dirty="0" err="1" smtClean="0"/>
-              <a:t>Ubuntu</a:t>
-            </a:r>
-            <a:r>
-              <a:rPr lang="pt-PT" dirty="0" smtClean="0"/>
-              <a:t> Server)</a:t>
-            </a:r>
-            <a:endParaRPr lang="pt-PT" dirty="0"/>
+              <a:t>Protocolo da camada de aplicação:</a:t>
+            </a:r>
+          </a:p>
+          <a:p>
+            <a:pPr lvl="1"/>
+            <a:r>
+              <a:rPr lang="pt-PT" dirty="0" smtClean="0"/>
+              <a:t>HTTP (Testado, comum, trabalha sobre TCP, pode-se usar SSL para encriptação)</a:t>
+            </a:r>
+          </a:p>
+          <a:p>
+            <a:r>
+              <a:rPr lang="pt-PT" dirty="0" smtClean="0"/>
+              <a:t>Suporte de dados:</a:t>
+            </a:r>
+          </a:p>
+          <a:p>
+            <a:pPr lvl="1"/>
+            <a:r>
+              <a:rPr lang="pt-PT" dirty="0" smtClean="0"/>
+              <a:t>XML (Pesado, difícil tratamento)</a:t>
+            </a:r>
+          </a:p>
+          <a:p>
+            <a:pPr lvl="1"/>
+            <a:r>
+              <a:rPr lang="pt-PT" dirty="0" smtClean="0"/>
+              <a:t>JSON (Leve, fácil tratamento por linguagens modernas)</a:t>
+            </a:r>
           </a:p>
         </p:txBody>
       </p:sp>
@@ -7343,30 +8520,112 @@
           <a:chExt cx="0" cy="0"/>
         </a:xfrm>
       </p:grpSpPr>
-      <p:pic>
-        <p:nvPicPr>
-          <p:cNvPr id="8" name="Imagem 7" descr="dart-logo-wordmark-1200w.png"/>
-          <p:cNvPicPr>
-            <a:picLocks noChangeAspect="1"/>
-          </p:cNvPicPr>
-          <p:nvPr/>
-        </p:nvPicPr>
-        <p:blipFill>
-          <a:blip r:embed="rId2" cstate="print"/>
-          <a:stretch>
-            <a:fillRect/>
-          </a:stretch>
-        </p:blipFill>
-        <p:spPr>
-          <a:xfrm>
-            <a:off x="2743196" y="1485897"/>
-            <a:ext cx="3657607" cy="2743206"/>
-          </a:xfrm>
-          <a:prstGeom prst="rect">
-            <a:avLst/>
-          </a:prstGeom>
-        </p:spPr>
-      </p:pic>
+      <p:sp>
+        <p:nvSpPr>
+          <p:cNvPr id="2" name="Título 1"/>
+          <p:cNvSpPr>
+            <a:spLocks noGrp="1"/>
+          </p:cNvSpPr>
+          <p:nvPr>
+            <p:ph type="title"/>
+          </p:nvPr>
+        </p:nvSpPr>
+        <p:spPr/>
+        <p:txBody>
+          <a:bodyPr/>
+          <a:lstStyle/>
+          <a:p>
+            <a:r>
+              <a:rPr lang="pt-PT" dirty="0" smtClean="0"/>
+              <a:t>Tecnologias escolhidas</a:t>
+            </a:r>
+            <a:endParaRPr lang="pt-PT" dirty="0"/>
+          </a:p>
+        </p:txBody>
+      </p:sp>
+      <p:sp>
+        <p:nvSpPr>
+          <p:cNvPr id="3" name="Marcador de Posição de Conteúdo 2"/>
+          <p:cNvSpPr>
+            <a:spLocks noGrp="1"/>
+          </p:cNvSpPr>
+          <p:nvPr>
+            <p:ph idx="1"/>
+          </p:nvPr>
+        </p:nvSpPr>
+        <p:spPr/>
+        <p:txBody>
+          <a:bodyPr/>
+          <a:lstStyle/>
+          <a:p>
+            <a:r>
+              <a:rPr lang="pt-PT" dirty="0" smtClean="0"/>
+              <a:t>Protocolo de transporte: </a:t>
+            </a:r>
+            <a:r>
+              <a:rPr lang="pt-PT" dirty="0" err="1" smtClean="0"/>
+              <a:t>Http</a:t>
+            </a:r>
+            <a:endParaRPr lang="pt-PT" dirty="0" smtClean="0"/>
+          </a:p>
+          <a:p>
+            <a:r>
+              <a:rPr lang="pt-PT" dirty="0" smtClean="0"/>
+              <a:t>Suporte de dados: JSON + Base64 </a:t>
+            </a:r>
+            <a:r>
+              <a:rPr lang="pt-PT" dirty="0" err="1" smtClean="0"/>
+              <a:t>Encoding</a:t>
+            </a:r>
+            <a:endParaRPr lang="pt-PT" dirty="0" smtClean="0"/>
+          </a:p>
+          <a:p>
+            <a:r>
+              <a:rPr lang="pt-PT" dirty="0" smtClean="0"/>
+              <a:t>Servidor web + </a:t>
+            </a:r>
+            <a:r>
+              <a:rPr lang="pt-PT" dirty="0" err="1" smtClean="0"/>
+              <a:t>WebService</a:t>
+            </a:r>
+            <a:r>
+              <a:rPr lang="pt-PT" dirty="0" smtClean="0"/>
+              <a:t>: </a:t>
+            </a:r>
+            <a:r>
+              <a:rPr lang="pt-PT" dirty="0" err="1" smtClean="0"/>
+              <a:t>Node.JS</a:t>
+            </a:r>
+            <a:endParaRPr lang="pt-PT" dirty="0" smtClean="0"/>
+          </a:p>
+          <a:p>
+            <a:r>
+              <a:rPr lang="pt-PT" dirty="0" smtClean="0"/>
+              <a:t>Base de dados: </a:t>
+            </a:r>
+            <a:r>
+              <a:rPr lang="pt-PT" dirty="0" err="1" smtClean="0"/>
+              <a:t>MySQL</a:t>
+            </a:r>
+            <a:endParaRPr lang="pt-PT" dirty="0" smtClean="0"/>
+          </a:p>
+          <a:p>
+            <a:r>
+              <a:rPr lang="pt-PT" dirty="0" smtClean="0"/>
+              <a:t>Sistema Operativo: Linux (</a:t>
+            </a:r>
+            <a:r>
+              <a:rPr lang="pt-PT" dirty="0" err="1" smtClean="0"/>
+              <a:t>Ubuntu</a:t>
+            </a:r>
+            <a:r>
+              <a:rPr lang="pt-PT" dirty="0" smtClean="0"/>
+              <a:t> Server)</a:t>
+            </a:r>
+            <a:endParaRPr lang="pt-PT" dirty="0"/>
+          </a:p>
+        </p:txBody>
+      </p:sp>
     </p:spTree>
   </p:cSld>
   <p:clrMapOvr>
@@ -8512,4 +9771,287 @@
   <a:objectDefaults/>
   <a:extraClrSchemeLst/>
 </a:theme>
+</file>
+
+<file path=ppt/theme/theme5.xml><?xml version="1.0" encoding="utf-8"?>
+<a:theme xmlns:a="http://schemas.openxmlformats.org/drawingml/2006/main" name="Tema do Office">
+  <a:themeElements>
+    <a:clrScheme name="Office">
+      <a:dk1>
+        <a:sysClr val="windowText" lastClr="000000"/>
+      </a:dk1>
+      <a:lt1>
+        <a:sysClr val="window" lastClr="FFFFFF"/>
+      </a:lt1>
+      <a:dk2>
+        <a:srgbClr val="1F497D"/>
+      </a:dk2>
+      <a:lt2>
+        <a:srgbClr val="EEECE1"/>
+      </a:lt2>
+      <a:accent1>
+        <a:srgbClr val="4F81BD"/>
+      </a:accent1>
+      <a:accent2>
+        <a:srgbClr val="C0504D"/>
+      </a:accent2>
+      <a:accent3>
+        <a:srgbClr val="9BBB59"/>
+      </a:accent3>
+      <a:accent4>
+        <a:srgbClr val="8064A2"/>
+      </a:accent4>
+      <a:accent5>
+        <a:srgbClr val="4BACC6"/>
+      </a:accent5>
+      <a:accent6>
+        <a:srgbClr val="F79646"/>
+      </a:accent6>
+      <a:hlink>
+        <a:srgbClr val="0000FF"/>
+      </a:hlink>
+      <a:folHlink>
+        <a:srgbClr val="800080"/>
+      </a:folHlink>
+    </a:clrScheme>
+    <a:fontScheme name="Office">
+      <a:majorFont>
+        <a:latin typeface="Calibri"/>
+        <a:ea typeface=""/>
+        <a:cs typeface=""/>
+        <a:font script="Jpan" typeface="ＭＳ Ｐゴシック"/>
+        <a:font script="Hang" typeface="맑은 고딕"/>
+        <a:font script="Hans" typeface="宋体"/>
+        <a:font script="Hant" typeface="新細明體"/>
+        <a:font script="Arab" typeface="Times New Roman"/>
+        <a:font script="Hebr" typeface="Times New Roman"/>
+        <a:font script="Thai" typeface="Angsana New"/>
+        <a:font script="Ethi" typeface="Nyala"/>
+        <a:font script="Beng" typeface="Vrinda"/>
+        <a:font script="Gujr" typeface="Shruti"/>
+        <a:font script="Khmr" typeface="MoolBoran"/>
+        <a:font script="Knda" typeface="Tunga"/>
+        <a:font script="Guru" typeface="Raavi"/>
+        <a:font script="Cans" typeface="Euphemia"/>
+        <a:font script="Cher" typeface="Plantagenet Cherokee"/>
+        <a:font script="Yiii" typeface="Microsoft Yi Baiti"/>
+        <a:font script="Tibt" typeface="Microsoft Himalaya"/>
+        <a:font script="Thaa" typeface="MV Boli"/>
+        <a:font script="Deva" typeface="Mangal"/>
+        <a:font script="Telu" typeface="Gautami"/>
+        <a:font script="Taml" typeface="Latha"/>
+        <a:font script="Syrc" typeface="Estrangelo Edessa"/>
+        <a:font script="Orya" typeface="Kalinga"/>
+        <a:font script="Mlym" typeface="Kartika"/>
+        <a:font script="Laoo" typeface="DokChampa"/>
+        <a:font script="Sinh" typeface="Iskoola Pota"/>
+        <a:font script="Mong" typeface="Mongolian Baiti"/>
+        <a:font script="Viet" typeface="Times New Roman"/>
+        <a:font script="Uigh" typeface="Microsoft Uighur"/>
+      </a:majorFont>
+      <a:minorFont>
+        <a:latin typeface="Calibri"/>
+        <a:ea typeface=""/>
+        <a:cs typeface=""/>
+        <a:font script="Jpan" typeface="ＭＳ Ｐゴシック"/>
+        <a:font script="Hang" typeface="맑은 고딕"/>
+        <a:font script="Hans" typeface="宋体"/>
+        <a:font script="Hant" typeface="新細明體"/>
+        <a:font script="Arab" typeface="Arial"/>
+        <a:font script="Hebr" typeface="Arial"/>
+        <a:font script="Thai" typeface="Cordia New"/>
+        <a:font script="Ethi" typeface="Nyala"/>
+        <a:font script="Beng" typeface="Vrinda"/>
+        <a:font script="Gujr" typeface="Shruti"/>
+        <a:font script="Khmr" typeface="DaunPenh"/>
+        <a:font script="Knda" typeface="Tunga"/>
+        <a:font script="Guru" typeface="Raavi"/>
+        <a:font script="Cans" typeface="Euphemia"/>
+        <a:font script="Cher" typeface="Plantagenet Cherokee"/>
+        <a:font script="Yiii" typeface="Microsoft Yi Baiti"/>
+        <a:font script="Tibt" typeface="Microsoft Himalaya"/>
+        <a:font script="Thaa" typeface="MV Boli"/>
+        <a:font script="Deva" typeface="Mangal"/>
+        <a:font script="Telu" typeface="Gautami"/>
+        <a:font script="Taml" typeface="Latha"/>
+        <a:font script="Syrc" typeface="Estrangelo Edessa"/>
+        <a:font script="Orya" typeface="Kalinga"/>
+        <a:font script="Mlym" typeface="Kartika"/>
+        <a:font script="Laoo" typeface="DokChampa"/>
+        <a:font script="Sinh" typeface="Iskoola Pota"/>
+        <a:font script="Mong" typeface="Mongolian Baiti"/>
+        <a:font script="Viet" typeface="Arial"/>
+        <a:font script="Uigh" typeface="Microsoft Uighur"/>
+      </a:minorFont>
+    </a:fontScheme>
+    <a:fmtScheme name="Office">
+      <a:fillStyleLst>
+        <a:solidFill>
+          <a:schemeClr val="phClr"/>
+        </a:solidFill>
+        <a:gradFill rotWithShape="1">
+          <a:gsLst>
+            <a:gs pos="0">
+              <a:schemeClr val="phClr">
+                <a:tint val="50000"/>
+                <a:satMod val="300000"/>
+              </a:schemeClr>
+            </a:gs>
+            <a:gs pos="35000">
+              <a:schemeClr val="phClr">
+                <a:tint val="37000"/>
+                <a:satMod val="300000"/>
+              </a:schemeClr>
+            </a:gs>
+            <a:gs pos="100000">
+              <a:schemeClr val="phClr">
+                <a:tint val="15000"/>
+                <a:satMod val="350000"/>
+              </a:schemeClr>
+            </a:gs>
+          </a:gsLst>
+          <a:lin ang="16200000" scaled="1"/>
+        </a:gradFill>
+        <a:gradFill rotWithShape="1">
+          <a:gsLst>
+            <a:gs pos="0">
+              <a:schemeClr val="phClr">
+                <a:shade val="51000"/>
+                <a:satMod val="130000"/>
+              </a:schemeClr>
+            </a:gs>
+            <a:gs pos="80000">
+              <a:schemeClr val="phClr">
+                <a:shade val="93000"/>
+                <a:satMod val="130000"/>
+              </a:schemeClr>
+            </a:gs>
+            <a:gs pos="100000">
+              <a:schemeClr val="phClr">
+                <a:shade val="94000"/>
+                <a:satMod val="135000"/>
+              </a:schemeClr>
+            </a:gs>
+          </a:gsLst>
+          <a:lin ang="16200000" scaled="0"/>
+        </a:gradFill>
+      </a:fillStyleLst>
+      <a:lnStyleLst>
+        <a:ln w="9525" cap="flat" cmpd="sng" algn="ctr">
+          <a:solidFill>
+            <a:schemeClr val="phClr">
+              <a:shade val="95000"/>
+              <a:satMod val="105000"/>
+            </a:schemeClr>
+          </a:solidFill>
+          <a:prstDash val="solid"/>
+        </a:ln>
+        <a:ln w="25400" cap="flat" cmpd="sng" algn="ctr">
+          <a:solidFill>
+            <a:schemeClr val="phClr"/>
+          </a:solidFill>
+          <a:prstDash val="solid"/>
+        </a:ln>
+        <a:ln w="38100" cap="flat" cmpd="sng" algn="ctr">
+          <a:solidFill>
+            <a:schemeClr val="phClr"/>
+          </a:solidFill>
+          <a:prstDash val="solid"/>
+        </a:ln>
+      </a:lnStyleLst>
+      <a:effectStyleLst>
+        <a:effectStyle>
+          <a:effectLst>
+            <a:outerShdw blurRad="40000" dist="20000" dir="5400000" rotWithShape="0">
+              <a:srgbClr val="000000">
+                <a:alpha val="38000"/>
+              </a:srgbClr>
+            </a:outerShdw>
+          </a:effectLst>
+        </a:effectStyle>
+        <a:effectStyle>
+          <a:effectLst>
+            <a:outerShdw blurRad="40000" dist="23000" dir="5400000" rotWithShape="0">
+              <a:srgbClr val="000000">
+                <a:alpha val="35000"/>
+              </a:srgbClr>
+            </a:outerShdw>
+          </a:effectLst>
+        </a:effectStyle>
+        <a:effectStyle>
+          <a:effectLst>
+            <a:outerShdw blurRad="40000" dist="23000" dir="5400000" rotWithShape="0">
+              <a:srgbClr val="000000">
+                <a:alpha val="35000"/>
+              </a:srgbClr>
+            </a:outerShdw>
+          </a:effectLst>
+          <a:scene3d>
+            <a:camera prst="orthographicFront">
+              <a:rot lat="0" lon="0" rev="0"/>
+            </a:camera>
+            <a:lightRig rig="threePt" dir="t">
+              <a:rot lat="0" lon="0" rev="1200000"/>
+            </a:lightRig>
+          </a:scene3d>
+          <a:sp3d>
+            <a:bevelT w="63500" h="25400"/>
+          </a:sp3d>
+        </a:effectStyle>
+      </a:effectStyleLst>
+      <a:bgFillStyleLst>
+        <a:solidFill>
+          <a:schemeClr val="phClr"/>
+        </a:solidFill>
+        <a:gradFill rotWithShape="1">
+          <a:gsLst>
+            <a:gs pos="0">
+              <a:schemeClr val="phClr">
+                <a:tint val="40000"/>
+                <a:satMod val="350000"/>
+              </a:schemeClr>
+            </a:gs>
+            <a:gs pos="40000">
+              <a:schemeClr val="phClr">
+                <a:tint val="45000"/>
+                <a:shade val="99000"/>
+                <a:satMod val="350000"/>
+              </a:schemeClr>
+            </a:gs>
+            <a:gs pos="100000">
+              <a:schemeClr val="phClr">
+                <a:shade val="20000"/>
+                <a:satMod val="255000"/>
+              </a:schemeClr>
+            </a:gs>
+          </a:gsLst>
+          <a:path path="circle">
+            <a:fillToRect l="50000" t="-80000" r="50000" b="180000"/>
+          </a:path>
+        </a:gradFill>
+        <a:gradFill rotWithShape="1">
+          <a:gsLst>
+            <a:gs pos="0">
+              <a:schemeClr val="phClr">
+                <a:tint val="80000"/>
+                <a:satMod val="300000"/>
+              </a:schemeClr>
+            </a:gs>
+            <a:gs pos="100000">
+              <a:schemeClr val="phClr">
+                <a:shade val="30000"/>
+                <a:satMod val="200000"/>
+              </a:schemeClr>
+            </a:gs>
+          </a:gsLst>
+          <a:path path="circle">
+            <a:fillToRect l="50000" t="50000" r="50000" b="50000"/>
+          </a:path>
+        </a:gradFill>
+      </a:bgFillStyleLst>
+    </a:fmtScheme>
+  </a:themeElements>
+  <a:objectDefaults/>
+  <a:extraClrSchemeLst/>
+</a:theme>
 </file>
</xml_diff>

<commit_message>
Menores alterações na apresentação.
</commit_message>
<xml_diff>
--- a/Apresentacoes/v01.pptx
+++ b/Apresentacoes/v01.pptx
@@ -229,7 +229,7 @@
             <a:fld id="{26E7F2CC-330F-4FEA-A2B0-657791948129}" type="datetimeFigureOut">
               <a:rPr lang="pt-PT" smtClean="0"/>
               <a:pPr/>
-              <a:t>26/03/2014</a:t>
+              <a:t>27/03/2014</a:t>
             </a:fld>
             <a:endParaRPr lang="pt-PT"/>
           </a:p>
@@ -391,7 +391,7 @@
             <a:fld id="{64C1928E-6349-48A8-8C96-32B641D59371}" type="datetimeFigureOut">
               <a:rPr lang="pt-PT" smtClean="0"/>
               <a:pPr/>
-              <a:t>26/03/2014</a:t>
+              <a:t>27/03/2014</a:t>
             </a:fld>
             <a:endParaRPr lang="pt-PT"/>
           </a:p>
@@ -921,7 +921,7 @@
             <a:fld id="{57B51982-E955-4F1A-BFA0-0F0AB3300023}" type="datetimeFigureOut">
               <a:rPr lang="pt-PT" smtClean="0"/>
               <a:pPr/>
-              <a:t>26/03/2014</a:t>
+              <a:t>27/03/2014</a:t>
             </a:fld>
             <a:endParaRPr lang="pt-PT"/>
           </a:p>
@@ -1088,7 +1088,7 @@
             <a:fld id="{57B51982-E955-4F1A-BFA0-0F0AB3300023}" type="datetimeFigureOut">
               <a:rPr lang="pt-PT" smtClean="0"/>
               <a:pPr/>
-              <a:t>26/03/2014</a:t>
+              <a:t>27/03/2014</a:t>
             </a:fld>
             <a:endParaRPr lang="pt-PT"/>
           </a:p>
@@ -1265,7 +1265,7 @@
             <a:fld id="{57B51982-E955-4F1A-BFA0-0F0AB3300023}" type="datetimeFigureOut">
               <a:rPr lang="pt-PT" smtClean="0"/>
               <a:pPr/>
-              <a:t>26/03/2014</a:t>
+              <a:t>27/03/2014</a:t>
             </a:fld>
             <a:endParaRPr lang="pt-PT"/>
           </a:p>
@@ -1357,7 +1357,7 @@
             <a:fld id="{57B51982-E955-4F1A-BFA0-0F0AB3300023}" type="datetimeFigureOut">
               <a:rPr lang="pt-PT" smtClean="0"/>
               <a:pPr/>
-              <a:t>26/03/2014</a:t>
+              <a:t>27/03/2014</a:t>
             </a:fld>
             <a:endParaRPr lang="pt-PT"/>
           </a:p>
@@ -1549,7 +1549,7 @@
             <a:fld id="{57B51982-E955-4F1A-BFA0-0F0AB3300023}" type="datetimeFigureOut">
               <a:rPr lang="pt-PT" smtClean="0"/>
               <a:pPr/>
-              <a:t>26/03/2014</a:t>
+              <a:t>27/03/2014</a:t>
             </a:fld>
             <a:endParaRPr lang="pt-PT"/>
           </a:p>
@@ -1741,7 +1741,7 @@
             <a:fld id="{57B51982-E955-4F1A-BFA0-0F0AB3300023}" type="datetimeFigureOut">
               <a:rPr lang="pt-PT" smtClean="0"/>
               <a:pPr/>
-              <a:t>26/03/2014</a:t>
+              <a:t>27/03/2014</a:t>
             </a:fld>
             <a:endParaRPr lang="pt-PT"/>
           </a:p>
@@ -2049,7 +2049,7 @@
             <a:fld id="{57B51982-E955-4F1A-BFA0-0F0AB3300023}" type="datetimeFigureOut">
               <a:rPr lang="pt-PT" smtClean="0"/>
               <a:pPr/>
-              <a:t>26/03/2014</a:t>
+              <a:t>27/03/2014</a:t>
             </a:fld>
             <a:endParaRPr lang="pt-PT"/>
           </a:p>
@@ -2176,7 +2176,7 @@
             <a:fld id="{977049CB-4CB5-45FE-B82E-F474B91E1741}" type="datetimeFigureOut">
               <a:rPr lang="pt-PT" smtClean="0"/>
               <a:pPr/>
-              <a:t>26/03/2014</a:t>
+              <a:t>27/03/2014</a:t>
             </a:fld>
             <a:endParaRPr lang="pt-PT"/>
           </a:p>
@@ -2477,7 +2477,7 @@
             <a:fld id="{92136B68-69E5-45CD-8C6F-F60CE3B7E52C}" type="datetimeFigureOut">
               <a:rPr lang="pt-PT" smtClean="0"/>
               <a:pPr/>
-              <a:t>26/03/2014</a:t>
+              <a:t>27/03/2014</a:t>
             </a:fld>
             <a:endParaRPr lang="pt-PT"/>
           </a:p>
@@ -2701,7 +2701,7 @@
             <a:fld id="{57B51982-E955-4F1A-BFA0-0F0AB3300023}" type="datetimeFigureOut">
               <a:rPr lang="pt-PT" smtClean="0"/>
               <a:pPr/>
-              <a:t>26/03/2014</a:t>
+              <a:t>27/03/2014</a:t>
             </a:fld>
             <a:endParaRPr lang="pt-PT"/>
           </a:p>
@@ -2944,7 +2944,7 @@
             <a:fld id="{57B51982-E955-4F1A-BFA0-0F0AB3300023}" type="datetimeFigureOut">
               <a:rPr lang="pt-PT" smtClean="0"/>
               <a:pPr/>
-              <a:t>26/03/2014</a:t>
+              <a:t>27/03/2014</a:t>
             </a:fld>
             <a:endParaRPr lang="pt-PT"/>
           </a:p>
@@ -3229,7 +3229,7 @@
             <a:fld id="{57B51982-E955-4F1A-BFA0-0F0AB3300023}" type="datetimeFigureOut">
               <a:rPr lang="pt-PT" smtClean="0"/>
               <a:pPr/>
-              <a:t>26/03/2014</a:t>
+              <a:t>27/03/2014</a:t>
             </a:fld>
             <a:endParaRPr lang="pt-PT"/>
           </a:p>
@@ -3653,7 +3653,7 @@
             <a:fld id="{57B51982-E955-4F1A-BFA0-0F0AB3300023}" type="datetimeFigureOut">
               <a:rPr lang="pt-PT" smtClean="0"/>
               <a:pPr/>
-              <a:t>26/03/2014</a:t>
+              <a:t>27/03/2014</a:t>
             </a:fld>
             <a:endParaRPr lang="pt-PT"/>
           </a:p>
@@ -3768,7 +3768,7 @@
             <a:fld id="{57B51982-E955-4F1A-BFA0-0F0AB3300023}" type="datetimeFigureOut">
               <a:rPr lang="pt-PT" smtClean="0"/>
               <a:pPr/>
-              <a:t>26/03/2014</a:t>
+              <a:t>27/03/2014</a:t>
             </a:fld>
             <a:endParaRPr lang="pt-PT"/>
           </a:p>
@@ -3860,7 +3860,7 @@
             <a:fld id="{57B51982-E955-4F1A-BFA0-0F0AB3300023}" type="datetimeFigureOut">
               <a:rPr lang="pt-PT" smtClean="0"/>
               <a:pPr/>
-              <a:t>26/03/2014</a:t>
+              <a:t>27/03/2014</a:t>
             </a:fld>
             <a:endParaRPr lang="pt-PT"/>
           </a:p>
@@ -4134,7 +4134,7 @@
             <a:fld id="{57B51982-E955-4F1A-BFA0-0F0AB3300023}" type="datetimeFigureOut">
               <a:rPr lang="pt-PT" smtClean="0"/>
               <a:pPr/>
-              <a:t>26/03/2014</a:t>
+              <a:t>27/03/2014</a:t>
             </a:fld>
             <a:endParaRPr lang="pt-PT"/>
           </a:p>
@@ -4384,7 +4384,7 @@
             <a:fld id="{57B51982-E955-4F1A-BFA0-0F0AB3300023}" type="datetimeFigureOut">
               <a:rPr lang="pt-PT" smtClean="0"/>
               <a:pPr/>
-              <a:t>26/03/2014</a:t>
+              <a:t>27/03/2014</a:t>
             </a:fld>
             <a:endParaRPr lang="pt-PT"/>
           </a:p>
@@ -4619,7 +4619,7 @@
             <a:fld id="{57B51982-E955-4F1A-BFA0-0F0AB3300023}" type="datetimeFigureOut">
               <a:rPr lang="pt-PT" smtClean="0"/>
               <a:pPr/>
-              <a:t>26/03/2014</a:t>
+              <a:t>27/03/2014</a:t>
             </a:fld>
             <a:endParaRPr lang="pt-PT"/>
           </a:p>
@@ -5130,7 +5130,7 @@
             <a:fld id="{977049CB-4CB5-45FE-B82E-F474B91E1741}" type="datetimeFigureOut">
               <a:rPr lang="pt-PT" smtClean="0"/>
               <a:pPr/>
-              <a:t>26/03/2014</a:t>
+              <a:t>27/03/2014</a:t>
             </a:fld>
             <a:endParaRPr lang="pt-PT"/>
           </a:p>
@@ -5627,7 +5627,7 @@
             <a:fld id="{92136B68-69E5-45CD-8C6F-F60CE3B7E52C}" type="datetimeFigureOut">
               <a:rPr lang="pt-PT" smtClean="0"/>
               <a:pPr/>
-              <a:t>26/03/2014</a:t>
+              <a:t>27/03/2014</a:t>
             </a:fld>
             <a:endParaRPr lang="pt-PT"/>
           </a:p>
@@ -6596,11 +6596,7 @@
           <a:p>
             <a:r>
               <a:rPr lang="pt-PT" dirty="0" err="1" smtClean="0"/>
-              <a:t>m</a:t>
-            </a:r>
-            <a:r>
-              <a:rPr lang="pt-PT" dirty="0" err="1" smtClean="0"/>
-              <a:t>ysql</a:t>
+              <a:t>mysql</a:t>
             </a:r>
             <a:r>
               <a:rPr lang="pt-PT" dirty="0" smtClean="0"/>
@@ -6848,16 +6844,7 @@
                 </a:solidFill>
                 <a:latin typeface="Consolas" pitchFamily="49" charset="0"/>
               </a:rPr>
-              <a:t> </a:t>
-            </a:r>
-            <a:r>
-              <a:rPr lang="pt-PT" sz="1400" dirty="0" smtClean="0">
-                <a:solidFill>
-                  <a:srgbClr val="008000"/>
-                </a:solidFill>
-                <a:latin typeface="Consolas" pitchFamily="49" charset="0"/>
-              </a:rPr>
-              <a:t>do ficheiro da lógica do servidor</a:t>
+              <a:t> do ficheiro da lógica do servidor</a:t>
             </a:r>
             <a:endParaRPr lang="pt-PT" sz="1400" dirty="0" smtClean="0">
               <a:solidFill>
@@ -7192,16 +7179,7 @@
                 </a:solidFill>
                 <a:latin typeface="Consolas" pitchFamily="49" charset="0"/>
               </a:rPr>
-              <a:t>'Server running at http://</a:t>
-            </a:r>
-            <a:r>
-              <a:rPr lang="en-US" sz="1400" dirty="0" smtClean="0">
-                <a:solidFill>
-                  <a:srgbClr val="A31515"/>
-                </a:solidFill>
-                <a:latin typeface="Consolas" pitchFamily="49" charset="0"/>
-              </a:rPr>
-              <a:t>127.0.0.1:8080/'</a:t>
+              <a:t>'Server running at http://127.0.0.1:8080/'</a:t>
             </a:r>
             <a:r>
               <a:rPr lang="en-US" sz="1400" dirty="0" smtClean="0">
@@ -7212,12 +7190,6 @@
               </a:rPr>
               <a:t>);</a:t>
             </a:r>
-            <a:endParaRPr lang="en-US" sz="1400" dirty="0" smtClean="0">
-              <a:solidFill>
-                <a:srgbClr val="333333"/>
-              </a:solidFill>
-              <a:latin typeface="Consolas" pitchFamily="49" charset="0"/>
-            </a:endParaRPr>
           </a:p>
           <a:p>
             <a:endParaRPr lang="pt-PT" sz="1400" dirty="0">
@@ -7337,19 +7309,7 @@
           <a:p>
             <a:r>
               <a:rPr lang="pt-PT" dirty="0" smtClean="0"/>
-              <a:t>Obtenção, </a:t>
-            </a:r>
-            <a:r>
-              <a:rPr lang="pt-PT" dirty="0" smtClean="0"/>
-              <a:t>colocação </a:t>
-            </a:r>
-            <a:r>
-              <a:rPr lang="pt-PT" dirty="0" smtClean="0"/>
-              <a:t>e tratamento de dados</a:t>
-            </a:r>
-            <a:r>
-              <a:rPr lang="pt-PT" dirty="0" smtClean="0"/>
-              <a:t>.</a:t>
+              <a:t>Obtenção, colocação e tratamento de dados.</a:t>
             </a:r>
             <a:endParaRPr lang="pt-PT" dirty="0"/>
           </a:p>
@@ -7457,11 +7417,7 @@
             </a:r>
             <a:r>
               <a:rPr lang="pt-PT" dirty="0" smtClean="0"/>
-              <a:t> para fazer o tratamento de </a:t>
-            </a:r>
-            <a:r>
-              <a:rPr lang="pt-PT" dirty="0" smtClean="0"/>
-              <a:t>JSON</a:t>
+              <a:t> para fazer o tratamento de JSON</a:t>
             </a:r>
           </a:p>
           <a:p>
@@ -7475,7 +7431,11 @@
             </a:r>
             <a:r>
               <a:rPr lang="pt-PT" dirty="0" smtClean="0"/>
-              <a:t> no caso do GET.</a:t>
+              <a:t> no caso do </a:t>
+            </a:r>
+            <a:r>
+              <a:rPr lang="pt-PT" dirty="0" smtClean="0"/>
+              <a:t>GET</a:t>
             </a:r>
             <a:endParaRPr lang="pt-PT" dirty="0"/>
           </a:p>
@@ -8393,16 +8353,7 @@
                 </a:solidFill>
                 <a:latin typeface="Consolas" pitchFamily="49" charset="0"/>
               </a:rPr>
-              <a:t>// </a:t>
-            </a:r>
-            <a:r>
-              <a:rPr lang="pt-PT" sz="1400" dirty="0" smtClean="0">
-                <a:solidFill>
-                  <a:srgbClr val="008000"/>
-                </a:solidFill>
-                <a:latin typeface="Consolas" pitchFamily="49" charset="0"/>
-              </a:rPr>
-              <a:t>Continua...</a:t>
+              <a:t>// Continua...</a:t>
             </a:r>
             <a:endParaRPr lang="pt-PT" sz="1400" dirty="0">
               <a:latin typeface="Consolas" pitchFamily="49" charset="0"/>
@@ -8494,34 +8445,16 @@
                 </a:solidFill>
                 <a:latin typeface="Consolas" pitchFamily="49" charset="0"/>
               </a:rPr>
-              <a:t> </a:t>
+              <a:t>    </a:t>
             </a:r>
             <a:r>
               <a:rPr lang="pt-PT" sz="1400" dirty="0" smtClean="0">
                 <a:solidFill>
-                  <a:srgbClr val="333333"/>
-                </a:solidFill>
-                <a:latin typeface="Consolas" pitchFamily="49" charset="0"/>
-              </a:rPr>
-              <a:t>   </a:t>
-            </a:r>
-            <a:r>
-              <a:rPr lang="pt-PT" sz="1400" dirty="0" smtClean="0">
-                <a:solidFill>
                   <a:srgbClr val="008000"/>
                 </a:solidFill>
                 <a:latin typeface="Consolas" pitchFamily="49" charset="0"/>
               </a:rPr>
-              <a:t>// </a:t>
-            </a:r>
-            <a:r>
-              <a:rPr lang="pt-PT" sz="1400" dirty="0" smtClean="0">
-                <a:solidFill>
-                  <a:srgbClr val="008000"/>
-                </a:solidFill>
-                <a:latin typeface="Consolas" pitchFamily="49" charset="0"/>
-              </a:rPr>
-              <a:t>Obtenção dos dados da resposta do servidor.</a:t>
+              <a:t>// Obtenção dos dados da resposta do servidor.</a:t>
             </a:r>
             <a:endParaRPr lang="pt-PT" sz="1400" dirty="0" smtClean="0">
               <a:solidFill>
@@ -8676,16 +8609,7 @@
                 </a:solidFill>
                 <a:latin typeface="Consolas" pitchFamily="49" charset="0"/>
               </a:rPr>
-              <a:t> (Exception e) </a:t>
-            </a:r>
-            <a:r>
-              <a:rPr lang="en-US" sz="1400" dirty="0" smtClean="0">
-                <a:solidFill>
-                  <a:srgbClr val="333333"/>
-                </a:solidFill>
-                <a:latin typeface="Consolas" pitchFamily="49" charset="0"/>
-              </a:rPr>
-              <a:t>{</a:t>
+              <a:t> (Exception e) {</a:t>
             </a:r>
             <a:r>
               <a:rPr lang="en-US" sz="1400" dirty="0" smtClean="0">
@@ -8741,12 +8665,6 @@
               </a:rPr>
               <a:t>}</a:t>
             </a:r>
-            <a:endParaRPr lang="en-US" sz="1400" dirty="0" smtClean="0">
-              <a:solidFill>
-                <a:srgbClr val="333333"/>
-              </a:solidFill>
-              <a:latin typeface="Consolas" pitchFamily="49" charset="0"/>
-            </a:endParaRPr>
           </a:p>
           <a:p>
             <a:r>
@@ -8950,54 +8868,27 @@
                 </a:solidFill>
                 <a:latin typeface="Consolas" pitchFamily="49" charset="0"/>
               </a:rPr>
-              <a:t>"</a:t>
-            </a:r>
-            <a:r>
-              <a:rPr lang="en-US" sz="1400" dirty="0" smtClean="0">
-                <a:solidFill>
-                  <a:srgbClr val="A31515"/>
-                </a:solidFill>
-                <a:latin typeface="Consolas" pitchFamily="49" charset="0"/>
-              </a:rPr>
-              <a:t>utf-8"</a:t>
-            </a:r>
-            <a:r>
-              <a:rPr lang="en-US" sz="1400" dirty="0" smtClean="0">
-                <a:solidFill>
-                  <a:srgbClr val="333333"/>
-                </a:solidFill>
-                <a:latin typeface="Consolas" pitchFamily="49" charset="0"/>
-              </a:rPr>
-              <a:t>), </a:t>
-            </a:r>
-            <a:r>
-              <a:rPr lang="en-US" sz="1400" dirty="0" smtClean="0">
-                <a:solidFill>
-                  <a:srgbClr val="333333"/>
-                </a:solidFill>
-                <a:latin typeface="Consolas" pitchFamily="49" charset="0"/>
-              </a:rPr>
-              <a:t>8</a:t>
-            </a:r>
-          </a:p>
-          <a:p>
-            <a:r>
-              <a:rPr lang="en-US" sz="1400" dirty="0" smtClean="0">
-                <a:solidFill>
-                  <a:srgbClr val="333333"/>
-                </a:solidFill>
-                <a:latin typeface="Consolas" pitchFamily="49" charset="0"/>
-              </a:rPr>
-              <a:t>        </a:t>
-            </a:r>
-            <a:r>
-              <a:rPr lang="en-US" sz="1400" dirty="0" smtClean="0">
-                <a:solidFill>
-                  <a:srgbClr val="333333"/>
-                </a:solidFill>
-                <a:latin typeface="Consolas" pitchFamily="49" charset="0"/>
-              </a:rPr>
-              <a:t>);</a:t>
+              <a:t>"utf-8"</a:t>
+            </a:r>
+            <a:r>
+              <a:rPr lang="en-US" sz="1400" dirty="0" smtClean="0">
+                <a:solidFill>
+                  <a:srgbClr val="333333"/>
+                </a:solidFill>
+                <a:latin typeface="Consolas" pitchFamily="49" charset="0"/>
+              </a:rPr>
+              <a:t>), 8</a:t>
+            </a:r>
+          </a:p>
+          <a:p>
+            <a:r>
+              <a:rPr lang="en-US" sz="1400" dirty="0" smtClean="0">
+                <a:solidFill>
+                  <a:srgbClr val="333333"/>
+                </a:solidFill>
+                <a:latin typeface="Consolas" pitchFamily="49" charset="0"/>
+              </a:rPr>
+              <a:t>        );</a:t>
             </a:r>
           </a:p>
           <a:p>
@@ -9008,16 +8899,7 @@
                 </a:solidFill>
                 <a:latin typeface="Consolas" pitchFamily="49" charset="0"/>
               </a:rPr>
-              <a:t> </a:t>
-            </a:r>
-            <a:r>
-              <a:rPr lang="pt-PT" sz="1400" dirty="0" smtClean="0">
-                <a:solidFill>
-                  <a:srgbClr val="333333"/>
-                </a:solidFill>
-                <a:latin typeface="Consolas" pitchFamily="49" charset="0"/>
-              </a:rPr>
-              <a:t>   </a:t>
+              <a:t>    </a:t>
             </a:r>
             <a:r>
               <a:rPr lang="pt-PT" sz="1400" dirty="0" smtClean="0">
@@ -9144,16 +9026,7 @@
                 </a:solidFill>
                 <a:latin typeface="Consolas" pitchFamily="49" charset="0"/>
               </a:rPr>
-              <a:t>    String line</a:t>
-            </a:r>
-            <a:r>
-              <a:rPr lang="en-US" sz="1400" dirty="0" smtClean="0">
-                <a:solidFill>
-                  <a:srgbClr val="333333"/>
-                </a:solidFill>
-                <a:latin typeface="Consolas" pitchFamily="49" charset="0"/>
-              </a:rPr>
-              <a:t>;</a:t>
+              <a:t>    String line;</a:t>
             </a:r>
           </a:p>
           <a:p>
@@ -9173,16 +9046,7 @@
                 </a:solidFill>
                 <a:latin typeface="Consolas" pitchFamily="49" charset="0"/>
               </a:rPr>
-              <a:t>// </a:t>
-            </a:r>
-            <a:r>
-              <a:rPr lang="pt-PT" sz="1400" dirty="0" smtClean="0">
-                <a:solidFill>
-                  <a:srgbClr val="008000"/>
-                </a:solidFill>
-                <a:latin typeface="Consolas" pitchFamily="49" charset="0"/>
-              </a:rPr>
-              <a:t>Continua...</a:t>
+              <a:t>// Continua...</a:t>
             </a:r>
             <a:endParaRPr lang="pt-PT" sz="1400" dirty="0">
               <a:latin typeface="Consolas" pitchFamily="49" charset="0"/>
@@ -9274,16 +9138,7 @@
                 </a:solidFill>
                 <a:latin typeface="Consolas" pitchFamily="49" charset="0"/>
               </a:rPr>
-              <a:t> </a:t>
-            </a:r>
-            <a:r>
-              <a:rPr lang="en-US" sz="1400" dirty="0" smtClean="0">
-                <a:solidFill>
-                  <a:srgbClr val="333333"/>
-                </a:solidFill>
-                <a:latin typeface="Consolas" pitchFamily="49" charset="0"/>
-              </a:rPr>
-              <a:t>   </a:t>
+              <a:t>    </a:t>
             </a:r>
             <a:r>
               <a:rPr lang="en-US" sz="1400" dirty="0" smtClean="0">
@@ -9401,12 +9256,6 @@
               </a:rPr>
               <a:t>) {</a:t>
             </a:r>
-            <a:endParaRPr lang="en-US" sz="1400" dirty="0" smtClean="0">
-              <a:solidFill>
-                <a:srgbClr val="333333"/>
-              </a:solidFill>
-              <a:latin typeface="Consolas" pitchFamily="49" charset="0"/>
-            </a:endParaRPr>
           </a:p>
           <a:p>
             <a:r>
@@ -9473,6 +9322,44 @@
                 <a:latin typeface="Consolas" pitchFamily="49" charset="0"/>
               </a:rPr>
               <a:t>}</a:t>
+            </a:r>
+          </a:p>
+          <a:p>
+            <a:r>
+              <a:rPr lang="pt-PT" sz="1400" dirty="0" smtClean="0">
+                <a:solidFill>
+                  <a:srgbClr val="333333"/>
+                </a:solidFill>
+                <a:latin typeface="Consolas" pitchFamily="49" charset="0"/>
+              </a:rPr>
+              <a:t>    </a:t>
+            </a:r>
+            <a:r>
+              <a:rPr lang="pt-PT" sz="1400" dirty="0" smtClean="0">
+                <a:solidFill>
+                  <a:srgbClr val="008000"/>
+                </a:solidFill>
+                <a:latin typeface="Consolas" pitchFamily="49" charset="0"/>
+              </a:rPr>
+              <a:t>// Fechar a </a:t>
+            </a:r>
+            <a:r>
+              <a:rPr lang="pt-PT" sz="1400" dirty="0" err="1" smtClean="0">
+                <a:solidFill>
+                  <a:srgbClr val="008000"/>
+                </a:solidFill>
+                <a:latin typeface="Consolas" pitchFamily="49" charset="0"/>
+              </a:rPr>
+              <a:t>stream</a:t>
+            </a:r>
+            <a:r>
+              <a:rPr lang="pt-PT" sz="1400" dirty="0" smtClean="0">
+                <a:solidFill>
+                  <a:srgbClr val="008000"/>
+                </a:solidFill>
+                <a:latin typeface="Consolas" pitchFamily="49" charset="0"/>
+              </a:rPr>
+              <a:t> de leitura.</a:t>
             </a:r>
             <a:endParaRPr lang="pt-PT" sz="1400" dirty="0" smtClean="0">
               <a:solidFill>
@@ -9492,13 +9379,219 @@
               <a:t>    </a:t>
             </a:r>
             <a:r>
+              <a:rPr lang="en-US" sz="1400" dirty="0" err="1" smtClean="0">
+                <a:solidFill>
+                  <a:srgbClr val="333333"/>
+                </a:solidFill>
+                <a:latin typeface="Consolas" pitchFamily="49" charset="0"/>
+              </a:rPr>
+              <a:t>is.close</a:t>
+            </a:r>
+            <a:r>
+              <a:rPr lang="en-US" sz="1400" dirty="0" smtClean="0">
+                <a:solidFill>
+                  <a:srgbClr val="333333"/>
+                </a:solidFill>
+                <a:latin typeface="Consolas" pitchFamily="49" charset="0"/>
+              </a:rPr>
+              <a:t>();</a:t>
+            </a:r>
+          </a:p>
+          <a:p>
+            <a:r>
+              <a:rPr lang="en-US" sz="1400" dirty="0" smtClean="0">
+                <a:solidFill>
+                  <a:srgbClr val="333333"/>
+                </a:solidFill>
+                <a:latin typeface="Consolas" pitchFamily="49" charset="0"/>
+              </a:rPr>
+              <a:t>    </a:t>
+            </a:r>
+            <a:r>
+              <a:rPr lang="en-US" sz="1400" dirty="0" err="1" smtClean="0">
+                <a:solidFill>
+                  <a:srgbClr val="333333"/>
+                </a:solidFill>
+                <a:latin typeface="Consolas" pitchFamily="49" charset="0"/>
+              </a:rPr>
+              <a:t>json</a:t>
+            </a:r>
+            <a:r>
+              <a:rPr lang="en-US" sz="1400" dirty="0" smtClean="0">
+                <a:solidFill>
+                  <a:srgbClr val="333333"/>
+                </a:solidFill>
+                <a:latin typeface="Consolas" pitchFamily="49" charset="0"/>
+              </a:rPr>
+              <a:t> = </a:t>
+            </a:r>
+            <a:r>
+              <a:rPr lang="en-US" sz="1400" dirty="0" err="1" smtClean="0">
+                <a:solidFill>
+                  <a:srgbClr val="333333"/>
+                </a:solidFill>
+                <a:latin typeface="Consolas" pitchFamily="49" charset="0"/>
+              </a:rPr>
+              <a:t>sb.toString</a:t>
+            </a:r>
+            <a:r>
+              <a:rPr lang="en-US" sz="1400" dirty="0" smtClean="0">
+                <a:solidFill>
+                  <a:srgbClr val="333333"/>
+                </a:solidFill>
+                <a:latin typeface="Consolas" pitchFamily="49" charset="0"/>
+              </a:rPr>
+              <a:t>();</a:t>
+            </a:r>
+          </a:p>
+          <a:p>
+            <a:r>
+              <a:rPr lang="en-US" sz="1400" dirty="0" smtClean="0">
+                <a:solidFill>
+                  <a:srgbClr val="333333"/>
+                </a:solidFill>
+                <a:latin typeface="Consolas" pitchFamily="49" charset="0"/>
+              </a:rPr>
+              <a:t>  } </a:t>
+            </a:r>
+            <a:r>
+              <a:rPr lang="en-US" sz="1400" dirty="0" smtClean="0">
+                <a:solidFill>
+                  <a:srgbClr val="0000FF"/>
+                </a:solidFill>
+                <a:latin typeface="Consolas" pitchFamily="49" charset="0"/>
+              </a:rPr>
+              <a:t>catch</a:t>
+            </a:r>
+            <a:r>
+              <a:rPr lang="en-US" sz="1400" dirty="0" smtClean="0">
+                <a:solidFill>
+                  <a:srgbClr val="333333"/>
+                </a:solidFill>
+                <a:latin typeface="Consolas" pitchFamily="49" charset="0"/>
+              </a:rPr>
+              <a:t> (Exception e) {</a:t>
+            </a:r>
+            <a:r>
+              <a:rPr lang="en-US" sz="1400" dirty="0" smtClean="0">
+                <a:solidFill>
+                  <a:srgbClr val="008000"/>
+                </a:solidFill>
+                <a:latin typeface="Consolas" pitchFamily="49" charset="0"/>
+              </a:rPr>
+              <a:t>/* </a:t>
+            </a:r>
+            <a:r>
+              <a:rPr lang="en-US" sz="1400" dirty="0" err="1" smtClean="0">
+                <a:solidFill>
+                  <a:srgbClr val="008000"/>
+                </a:solidFill>
+                <a:latin typeface="Consolas" pitchFamily="49" charset="0"/>
+              </a:rPr>
+              <a:t>Erro</a:t>
+            </a:r>
+            <a:r>
+              <a:rPr lang="en-US" sz="1400" dirty="0" smtClean="0">
+                <a:solidFill>
+                  <a:srgbClr val="008000"/>
+                </a:solidFill>
+                <a:latin typeface="Consolas" pitchFamily="49" charset="0"/>
+              </a:rPr>
+              <a:t> </a:t>
+            </a:r>
+            <a:r>
+              <a:rPr lang="en-US" sz="1400" dirty="0" err="1" smtClean="0">
+                <a:solidFill>
+                  <a:srgbClr val="008000"/>
+                </a:solidFill>
+                <a:latin typeface="Consolas" pitchFamily="49" charset="0"/>
+              </a:rPr>
+              <a:t>ao</a:t>
+            </a:r>
+            <a:r>
+              <a:rPr lang="en-US" sz="1400" dirty="0" smtClean="0">
+                <a:solidFill>
+                  <a:srgbClr val="008000"/>
+                </a:solidFill>
+                <a:latin typeface="Consolas" pitchFamily="49" charset="0"/>
+              </a:rPr>
+              <a:t> </a:t>
+            </a:r>
+            <a:r>
+              <a:rPr lang="en-US" sz="1400" dirty="0" err="1" smtClean="0">
+                <a:solidFill>
+                  <a:srgbClr val="008000"/>
+                </a:solidFill>
+                <a:latin typeface="Consolas" pitchFamily="49" charset="0"/>
+              </a:rPr>
+              <a:t>guardar</a:t>
+            </a:r>
+            <a:r>
+              <a:rPr lang="en-US" sz="1400" dirty="0" smtClean="0">
+                <a:solidFill>
+                  <a:srgbClr val="008000"/>
+                </a:solidFill>
+                <a:latin typeface="Consolas" pitchFamily="49" charset="0"/>
+              </a:rPr>
+              <a:t> dados! */</a:t>
+            </a:r>
+            <a:r>
+              <a:rPr lang="en-US" sz="1400" dirty="0" smtClean="0">
+                <a:solidFill>
+                  <a:srgbClr val="333333"/>
+                </a:solidFill>
+                <a:latin typeface="Consolas" pitchFamily="49" charset="0"/>
+              </a:rPr>
+              <a:t>}</a:t>
+            </a:r>
+          </a:p>
+          <a:p>
+            <a:r>
+              <a:rPr lang="en-US" sz="1400" dirty="0" smtClean="0">
+                <a:solidFill>
+                  <a:srgbClr val="333333"/>
+                </a:solidFill>
+                <a:latin typeface="Consolas" pitchFamily="49" charset="0"/>
+              </a:rPr>
+              <a:t>  </a:t>
+            </a:r>
+            <a:r>
+              <a:rPr lang="en-US" sz="1400" dirty="0" smtClean="0">
+                <a:solidFill>
+                  <a:srgbClr val="0000FF"/>
+                </a:solidFill>
+                <a:latin typeface="Consolas" pitchFamily="49" charset="0"/>
+              </a:rPr>
+              <a:t>try</a:t>
+            </a:r>
+            <a:r>
+              <a:rPr lang="en-US" sz="1400" dirty="0" smtClean="0">
+                <a:solidFill>
+                  <a:srgbClr val="333333"/>
+                </a:solidFill>
+                <a:latin typeface="Consolas" pitchFamily="49" charset="0"/>
+              </a:rPr>
+              <a:t> {</a:t>
+            </a:r>
+          </a:p>
+          <a:p>
+            <a:r>
+              <a:rPr lang="en-US" sz="1400" dirty="0" smtClean="0">
+                <a:solidFill>
+                  <a:srgbClr val="333333"/>
+                </a:solidFill>
+                <a:latin typeface="Consolas" pitchFamily="49" charset="0"/>
+              </a:rPr>
+              <a:t>    </a:t>
+            </a:r>
+            <a:r>
               <a:rPr lang="pt-PT" sz="1400" dirty="0" smtClean="0">
                 <a:solidFill>
                   <a:srgbClr val="008000"/>
                 </a:solidFill>
                 <a:latin typeface="Consolas" pitchFamily="49" charset="0"/>
               </a:rPr>
-              <a:t>// Fechar a </a:t>
+              <a:t>// Parse da </a:t>
             </a:r>
             <a:r>
               <a:rPr lang="pt-PT" sz="1400" dirty="0" err="1" smtClean="0">
@@ -9507,7 +9600,7 @@
                 </a:solidFill>
                 <a:latin typeface="Consolas" pitchFamily="49" charset="0"/>
               </a:rPr>
-              <a:t>stream</a:t>
+              <a:t>string</a:t>
             </a:r>
             <a:r>
               <a:rPr lang="pt-PT" sz="1400" dirty="0" smtClean="0">
@@ -9516,7 +9609,7 @@
                 </a:solidFill>
                 <a:latin typeface="Consolas" pitchFamily="49" charset="0"/>
               </a:rPr>
-              <a:t> de leitura.</a:t>
+              <a:t> para um objeto</a:t>
             </a:r>
             <a:endParaRPr lang="pt-PT" sz="1400" dirty="0" smtClean="0">
               <a:solidFill>
@@ -9542,27 +9635,16 @@
                 </a:solidFill>
                 <a:latin typeface="Consolas" pitchFamily="49" charset="0"/>
               </a:rPr>
-              <a:t>is.close</a:t>
-            </a:r>
-            <a:r>
-              <a:rPr lang="en-US" sz="1400" dirty="0" smtClean="0">
-                <a:solidFill>
-                  <a:srgbClr val="333333"/>
-                </a:solidFill>
-                <a:latin typeface="Consolas" pitchFamily="49" charset="0"/>
-              </a:rPr>
-              <a:t>();</a:t>
-            </a:r>
-          </a:p>
-          <a:p>
-            <a:r>
-              <a:rPr lang="en-US" sz="1400" dirty="0" smtClean="0">
-                <a:solidFill>
-                  <a:srgbClr val="333333"/>
-                </a:solidFill>
-                <a:latin typeface="Consolas" pitchFamily="49" charset="0"/>
-              </a:rPr>
-              <a:t>    </a:t>
+              <a:t>JSONObject</a:t>
+            </a:r>
+            <a:r>
+              <a:rPr lang="en-US" sz="1400" dirty="0" smtClean="0">
+                <a:solidFill>
+                  <a:srgbClr val="333333"/>
+                </a:solidFill>
+                <a:latin typeface="Consolas" pitchFamily="49" charset="0"/>
+              </a:rPr>
+              <a:t> </a:t>
             </a:r>
             <a:r>
               <a:rPr lang="en-US" sz="1400" dirty="0" err="1" smtClean="0">
@@ -9571,6 +9653,60 @@
                 </a:solidFill>
                 <a:latin typeface="Consolas" pitchFamily="49" charset="0"/>
               </a:rPr>
+              <a:t>jObj</a:t>
+            </a:r>
+            <a:r>
+              <a:rPr lang="en-US" sz="1400" dirty="0" smtClean="0">
+                <a:solidFill>
+                  <a:srgbClr val="333333"/>
+                </a:solidFill>
+                <a:latin typeface="Consolas" pitchFamily="49" charset="0"/>
+              </a:rPr>
+              <a:t> = </a:t>
+            </a:r>
+            <a:r>
+              <a:rPr lang="en-US" sz="1400" dirty="0" smtClean="0">
+                <a:solidFill>
+                  <a:srgbClr val="0000FF"/>
+                </a:solidFill>
+                <a:latin typeface="Consolas" pitchFamily="49" charset="0"/>
+              </a:rPr>
+              <a:t>new</a:t>
+            </a:r>
+            <a:r>
+              <a:rPr lang="en-US" sz="1400" dirty="0" smtClean="0">
+                <a:solidFill>
+                  <a:srgbClr val="333333"/>
+                </a:solidFill>
+                <a:latin typeface="Consolas" pitchFamily="49" charset="0"/>
+              </a:rPr>
+              <a:t> </a:t>
+            </a:r>
+            <a:r>
+              <a:rPr lang="en-US" sz="1400" dirty="0" err="1" smtClean="0">
+                <a:solidFill>
+                  <a:srgbClr val="333333"/>
+                </a:solidFill>
+                <a:latin typeface="Consolas" pitchFamily="49" charset="0"/>
+              </a:rPr>
+              <a:t>JSONObject</a:t>
+            </a:r>
+            <a:r>
+              <a:rPr lang="en-US" sz="1400" dirty="0" smtClean="0">
+                <a:solidFill>
+                  <a:srgbClr val="333333"/>
+                </a:solidFill>
+                <a:latin typeface="Consolas" pitchFamily="49" charset="0"/>
+              </a:rPr>
+              <a:t>(</a:t>
+            </a:r>
+            <a:r>
+              <a:rPr lang="en-US" sz="1400" dirty="0" err="1" smtClean="0">
+                <a:solidFill>
+                  <a:srgbClr val="333333"/>
+                </a:solidFill>
+                <a:latin typeface="Consolas" pitchFamily="49" charset="0"/>
+              </a:rPr>
               <a:t>json</a:t>
             </a:r>
             <a:r>
@@ -9580,7 +9716,36 @@
                 </a:solidFill>
                 <a:latin typeface="Consolas" pitchFamily="49" charset="0"/>
               </a:rPr>
-              <a:t> = </a:t>
+              <a:t>);</a:t>
+            </a:r>
+          </a:p>
+          <a:p>
+            <a:r>
+              <a:rPr lang="en-US" sz="1400" dirty="0" smtClean="0">
+                <a:solidFill>
+                  <a:srgbClr val="333333"/>
+                </a:solidFill>
+                <a:latin typeface="Consolas" pitchFamily="49" charset="0"/>
+              </a:rPr>
+              <a:t>  } </a:t>
+            </a:r>
+            <a:r>
+              <a:rPr lang="en-US" sz="1400" dirty="0" smtClean="0">
+                <a:solidFill>
+                  <a:srgbClr val="0000FF"/>
+                </a:solidFill>
+                <a:latin typeface="Consolas" pitchFamily="49" charset="0"/>
+              </a:rPr>
+              <a:t>catch</a:t>
+            </a:r>
+            <a:r>
+              <a:rPr lang="en-US" sz="1400" dirty="0" smtClean="0">
+                <a:solidFill>
+                  <a:srgbClr val="333333"/>
+                </a:solidFill>
+                <a:latin typeface="Consolas" pitchFamily="49" charset="0"/>
+              </a:rPr>
+              <a:t> (</a:t>
             </a:r>
             <a:r>
               <a:rPr lang="en-US" sz="1400" dirty="0" err="1" smtClean="0">
@@ -9589,51 +9754,16 @@
                 </a:solidFill>
                 <a:latin typeface="Consolas" pitchFamily="49" charset="0"/>
               </a:rPr>
-              <a:t>sb.toString</a:t>
-            </a:r>
-            <a:r>
-              <a:rPr lang="en-US" sz="1400" dirty="0" smtClean="0">
-                <a:solidFill>
-                  <a:srgbClr val="333333"/>
-                </a:solidFill>
-                <a:latin typeface="Consolas" pitchFamily="49" charset="0"/>
-              </a:rPr>
-              <a:t>();</a:t>
-            </a:r>
-            <a:endParaRPr lang="en-US" sz="1400" dirty="0" smtClean="0">
-              <a:solidFill>
-                <a:srgbClr val="333333"/>
-              </a:solidFill>
-              <a:latin typeface="Consolas" pitchFamily="49" charset="0"/>
-            </a:endParaRPr>
-          </a:p>
-          <a:p>
-            <a:r>
-              <a:rPr lang="en-US" sz="1400" dirty="0" smtClean="0">
-                <a:solidFill>
-                  <a:srgbClr val="333333"/>
-                </a:solidFill>
-                <a:latin typeface="Consolas" pitchFamily="49" charset="0"/>
-              </a:rPr>
-              <a:t>  } </a:t>
-            </a:r>
-            <a:r>
-              <a:rPr lang="en-US" sz="1400" dirty="0" smtClean="0">
-                <a:solidFill>
-                  <a:srgbClr val="0000FF"/>
-                </a:solidFill>
-                <a:latin typeface="Consolas" pitchFamily="49" charset="0"/>
-              </a:rPr>
-              <a:t>catch</a:t>
-            </a:r>
-            <a:r>
-              <a:rPr lang="en-US" sz="1400" dirty="0" smtClean="0">
-                <a:solidFill>
-                  <a:srgbClr val="333333"/>
-                </a:solidFill>
-                <a:latin typeface="Consolas" pitchFamily="49" charset="0"/>
-              </a:rPr>
-              <a:t> (Exception e) {</a:t>
+              <a:t>JSONException</a:t>
+            </a:r>
+            <a:r>
+              <a:rPr lang="en-US" sz="1400" dirty="0" smtClean="0">
+                <a:solidFill>
+                  <a:srgbClr val="333333"/>
+                </a:solidFill>
+                <a:latin typeface="Consolas" pitchFamily="49" charset="0"/>
+              </a:rPr>
+              <a:t> e) {</a:t>
             </a:r>
             <a:r>
               <a:rPr lang="en-US" sz="1400" dirty="0" smtClean="0">
@@ -9642,7 +9772,7 @@
                 </a:solidFill>
                 <a:latin typeface="Consolas" pitchFamily="49" charset="0"/>
               </a:rPr>
-              <a:t>/* </a:t>
+              <a:t>/* JSON </a:t>
             </a:r>
             <a:r>
               <a:rPr lang="en-US" sz="1400" dirty="0" err="1" smtClean="0">
@@ -9651,7 +9781,7 @@
                 </a:solidFill>
                 <a:latin typeface="Consolas" pitchFamily="49" charset="0"/>
               </a:rPr>
-              <a:t>Erro</a:t>
+              <a:t>Inválido</a:t>
             </a:r>
             <a:r>
               <a:rPr lang="en-US" sz="1400" dirty="0" smtClean="0">
@@ -9660,55 +9790,19 @@
                 </a:solidFill>
                 <a:latin typeface="Consolas" pitchFamily="49" charset="0"/>
               </a:rPr>
-              <a:t> </a:t>
-            </a:r>
-            <a:r>
-              <a:rPr lang="en-US" sz="1400" dirty="0" err="1" smtClean="0">
+              <a:t>! </a:t>
+            </a:r>
+            <a:r>
+              <a:rPr lang="pt-PT" sz="1400" dirty="0" smtClean="0">
                 <a:solidFill>
                   <a:srgbClr val="008000"/>
                 </a:solidFill>
                 <a:latin typeface="Consolas" pitchFamily="49" charset="0"/>
               </a:rPr>
-              <a:t>ao</a:t>
-            </a:r>
-            <a:r>
-              <a:rPr lang="en-US" sz="1400" dirty="0" smtClean="0">
-                <a:solidFill>
-                  <a:srgbClr val="008000"/>
-                </a:solidFill>
-                <a:latin typeface="Consolas" pitchFamily="49" charset="0"/>
-              </a:rPr>
-              <a:t> </a:t>
-            </a:r>
-            <a:r>
-              <a:rPr lang="en-US" sz="1400" dirty="0" err="1" smtClean="0">
-                <a:solidFill>
-                  <a:srgbClr val="008000"/>
-                </a:solidFill>
-                <a:latin typeface="Consolas" pitchFamily="49" charset="0"/>
-              </a:rPr>
-              <a:t>guardar</a:t>
-            </a:r>
-            <a:r>
-              <a:rPr lang="en-US" sz="1400" dirty="0" smtClean="0">
-                <a:solidFill>
-                  <a:srgbClr val="008000"/>
-                </a:solidFill>
-                <a:latin typeface="Consolas" pitchFamily="49" charset="0"/>
-              </a:rPr>
-              <a:t> dados! </a:t>
-            </a:r>
-            <a:r>
-              <a:rPr lang="en-US" sz="1400" dirty="0" smtClean="0">
-                <a:solidFill>
-                  <a:srgbClr val="008000"/>
-                </a:solidFill>
-                <a:latin typeface="Consolas" pitchFamily="49" charset="0"/>
-              </a:rPr>
               <a:t>*/</a:t>
             </a:r>
             <a:r>
-              <a:rPr lang="en-US" sz="1400" dirty="0" smtClean="0">
+              <a:rPr lang="pt-PT" sz="1400" dirty="0" smtClean="0">
                 <a:solidFill>
                   <a:srgbClr val="333333"/>
                 </a:solidFill>
@@ -9716,278 +9810,6 @@
               </a:rPr>
               <a:t>}</a:t>
             </a:r>
-          </a:p>
-          <a:p>
-            <a:r>
-              <a:rPr lang="en-US" sz="1400" dirty="0" smtClean="0">
-                <a:solidFill>
-                  <a:srgbClr val="333333"/>
-                </a:solidFill>
-                <a:latin typeface="Consolas" pitchFamily="49" charset="0"/>
-              </a:rPr>
-              <a:t>  </a:t>
-            </a:r>
-            <a:r>
-              <a:rPr lang="en-US" sz="1400" dirty="0" smtClean="0">
-                <a:solidFill>
-                  <a:srgbClr val="0000FF"/>
-                </a:solidFill>
-                <a:latin typeface="Consolas" pitchFamily="49" charset="0"/>
-              </a:rPr>
-              <a:t>try</a:t>
-            </a:r>
-            <a:r>
-              <a:rPr lang="en-US" sz="1400" dirty="0" smtClean="0">
-                <a:solidFill>
-                  <a:srgbClr val="333333"/>
-                </a:solidFill>
-                <a:latin typeface="Consolas" pitchFamily="49" charset="0"/>
-              </a:rPr>
-              <a:t> {</a:t>
-            </a:r>
-          </a:p>
-          <a:p>
-            <a:r>
-              <a:rPr lang="en-US" sz="1400" dirty="0" smtClean="0">
-                <a:solidFill>
-                  <a:srgbClr val="333333"/>
-                </a:solidFill>
-                <a:latin typeface="Consolas" pitchFamily="49" charset="0"/>
-              </a:rPr>
-              <a:t>    </a:t>
-            </a:r>
-            <a:r>
-              <a:rPr lang="pt-PT" sz="1400" dirty="0" smtClean="0">
-                <a:solidFill>
-                  <a:srgbClr val="008000"/>
-                </a:solidFill>
-                <a:latin typeface="Consolas" pitchFamily="49" charset="0"/>
-              </a:rPr>
-              <a:t>// Parse da </a:t>
-            </a:r>
-            <a:r>
-              <a:rPr lang="pt-PT" sz="1400" dirty="0" err="1" smtClean="0">
-                <a:solidFill>
-                  <a:srgbClr val="008000"/>
-                </a:solidFill>
-                <a:latin typeface="Consolas" pitchFamily="49" charset="0"/>
-              </a:rPr>
-              <a:t>string</a:t>
-            </a:r>
-            <a:r>
-              <a:rPr lang="pt-PT" sz="1400" dirty="0" smtClean="0">
-                <a:solidFill>
-                  <a:srgbClr val="008000"/>
-                </a:solidFill>
-                <a:latin typeface="Consolas" pitchFamily="49" charset="0"/>
-              </a:rPr>
-              <a:t> para um objeto</a:t>
-            </a:r>
-            <a:endParaRPr lang="pt-PT" sz="1400" dirty="0" smtClean="0">
-              <a:solidFill>
-                <a:srgbClr val="333333"/>
-              </a:solidFill>
-              <a:latin typeface="Consolas" pitchFamily="49" charset="0"/>
-            </a:endParaRPr>
-          </a:p>
-          <a:p>
-            <a:r>
-              <a:rPr lang="pt-PT" sz="1400" dirty="0" smtClean="0">
-                <a:solidFill>
-                  <a:srgbClr val="333333"/>
-                </a:solidFill>
-                <a:latin typeface="Consolas" pitchFamily="49" charset="0"/>
-              </a:rPr>
-              <a:t>    </a:t>
-            </a:r>
-            <a:r>
-              <a:rPr lang="en-US" sz="1400" dirty="0" err="1" smtClean="0">
-                <a:solidFill>
-                  <a:srgbClr val="333333"/>
-                </a:solidFill>
-                <a:latin typeface="Consolas" pitchFamily="49" charset="0"/>
-              </a:rPr>
-              <a:t>JSONObject</a:t>
-            </a:r>
-            <a:r>
-              <a:rPr lang="en-US" sz="1400" dirty="0" smtClean="0">
-                <a:solidFill>
-                  <a:srgbClr val="333333"/>
-                </a:solidFill>
-                <a:latin typeface="Consolas" pitchFamily="49" charset="0"/>
-              </a:rPr>
-              <a:t> </a:t>
-            </a:r>
-            <a:r>
-              <a:rPr lang="en-US" sz="1400" dirty="0" err="1" smtClean="0">
-                <a:solidFill>
-                  <a:srgbClr val="333333"/>
-                </a:solidFill>
-                <a:latin typeface="Consolas" pitchFamily="49" charset="0"/>
-              </a:rPr>
-              <a:t>jObj</a:t>
-            </a:r>
-            <a:r>
-              <a:rPr lang="en-US" sz="1400" dirty="0" smtClean="0">
-                <a:solidFill>
-                  <a:srgbClr val="333333"/>
-                </a:solidFill>
-                <a:latin typeface="Consolas" pitchFamily="49" charset="0"/>
-              </a:rPr>
-              <a:t> = </a:t>
-            </a:r>
-            <a:r>
-              <a:rPr lang="en-US" sz="1400" dirty="0" smtClean="0">
-                <a:solidFill>
-                  <a:srgbClr val="0000FF"/>
-                </a:solidFill>
-                <a:latin typeface="Consolas" pitchFamily="49" charset="0"/>
-              </a:rPr>
-              <a:t>new</a:t>
-            </a:r>
-            <a:r>
-              <a:rPr lang="en-US" sz="1400" dirty="0" smtClean="0">
-                <a:solidFill>
-                  <a:srgbClr val="333333"/>
-                </a:solidFill>
-                <a:latin typeface="Consolas" pitchFamily="49" charset="0"/>
-              </a:rPr>
-              <a:t> </a:t>
-            </a:r>
-            <a:r>
-              <a:rPr lang="en-US" sz="1400" dirty="0" err="1" smtClean="0">
-                <a:solidFill>
-                  <a:srgbClr val="333333"/>
-                </a:solidFill>
-                <a:latin typeface="Consolas" pitchFamily="49" charset="0"/>
-              </a:rPr>
-              <a:t>JSONObject</a:t>
-            </a:r>
-            <a:r>
-              <a:rPr lang="en-US" sz="1400" dirty="0" smtClean="0">
-                <a:solidFill>
-                  <a:srgbClr val="333333"/>
-                </a:solidFill>
-                <a:latin typeface="Consolas" pitchFamily="49" charset="0"/>
-              </a:rPr>
-              <a:t>(</a:t>
-            </a:r>
-            <a:r>
-              <a:rPr lang="en-US" sz="1400" dirty="0" err="1" smtClean="0">
-                <a:solidFill>
-                  <a:srgbClr val="333333"/>
-                </a:solidFill>
-                <a:latin typeface="Consolas" pitchFamily="49" charset="0"/>
-              </a:rPr>
-              <a:t>json</a:t>
-            </a:r>
-            <a:r>
-              <a:rPr lang="en-US" sz="1400" dirty="0" smtClean="0">
-                <a:solidFill>
-                  <a:srgbClr val="333333"/>
-                </a:solidFill>
-                <a:latin typeface="Consolas" pitchFamily="49" charset="0"/>
-              </a:rPr>
-              <a:t>);</a:t>
-            </a:r>
-          </a:p>
-          <a:p>
-            <a:r>
-              <a:rPr lang="en-US" sz="1400" dirty="0" smtClean="0">
-                <a:solidFill>
-                  <a:srgbClr val="333333"/>
-                </a:solidFill>
-                <a:latin typeface="Consolas" pitchFamily="49" charset="0"/>
-              </a:rPr>
-              <a:t>  } </a:t>
-            </a:r>
-            <a:r>
-              <a:rPr lang="en-US" sz="1400" dirty="0" smtClean="0">
-                <a:solidFill>
-                  <a:srgbClr val="0000FF"/>
-                </a:solidFill>
-                <a:latin typeface="Consolas" pitchFamily="49" charset="0"/>
-              </a:rPr>
-              <a:t>catch</a:t>
-            </a:r>
-            <a:r>
-              <a:rPr lang="en-US" sz="1400" dirty="0" smtClean="0">
-                <a:solidFill>
-                  <a:srgbClr val="333333"/>
-                </a:solidFill>
-                <a:latin typeface="Consolas" pitchFamily="49" charset="0"/>
-              </a:rPr>
-              <a:t> (</a:t>
-            </a:r>
-            <a:r>
-              <a:rPr lang="en-US" sz="1400" dirty="0" err="1" smtClean="0">
-                <a:solidFill>
-                  <a:srgbClr val="333333"/>
-                </a:solidFill>
-                <a:latin typeface="Consolas" pitchFamily="49" charset="0"/>
-              </a:rPr>
-              <a:t>JSONException</a:t>
-            </a:r>
-            <a:r>
-              <a:rPr lang="en-US" sz="1400" dirty="0" smtClean="0">
-                <a:solidFill>
-                  <a:srgbClr val="333333"/>
-                </a:solidFill>
-                <a:latin typeface="Consolas" pitchFamily="49" charset="0"/>
-              </a:rPr>
-              <a:t> e) {</a:t>
-            </a:r>
-            <a:r>
-              <a:rPr lang="en-US" sz="1400" dirty="0" smtClean="0">
-                <a:solidFill>
-                  <a:srgbClr val="008000"/>
-                </a:solidFill>
-                <a:latin typeface="Consolas" pitchFamily="49" charset="0"/>
-              </a:rPr>
-              <a:t>/* JSON </a:t>
-            </a:r>
-            <a:r>
-              <a:rPr lang="en-US" sz="1400" dirty="0" err="1" smtClean="0">
-                <a:solidFill>
-                  <a:srgbClr val="008000"/>
-                </a:solidFill>
-                <a:latin typeface="Consolas" pitchFamily="49" charset="0"/>
-              </a:rPr>
-              <a:t>Inválido</a:t>
-            </a:r>
-            <a:r>
-              <a:rPr lang="en-US" sz="1400" dirty="0" smtClean="0">
-                <a:solidFill>
-                  <a:srgbClr val="008000"/>
-                </a:solidFill>
-                <a:latin typeface="Consolas" pitchFamily="49" charset="0"/>
-              </a:rPr>
-              <a:t>! </a:t>
-            </a:r>
-            <a:r>
-              <a:rPr lang="pt-PT" sz="1400" dirty="0" smtClean="0">
-                <a:solidFill>
-                  <a:srgbClr val="008000"/>
-                </a:solidFill>
-                <a:latin typeface="Consolas" pitchFamily="49" charset="0"/>
-              </a:rPr>
-              <a:t>*/</a:t>
-            </a:r>
-            <a:r>
-              <a:rPr lang="pt-PT" sz="1400" dirty="0" smtClean="0">
-                <a:solidFill>
-                  <a:srgbClr val="333333"/>
-                </a:solidFill>
-                <a:latin typeface="Consolas" pitchFamily="49" charset="0"/>
-              </a:rPr>
-              <a:t>}</a:t>
-            </a:r>
-            <a:endParaRPr lang="pt-PT" sz="1400" dirty="0" smtClean="0">
-              <a:solidFill>
-                <a:srgbClr val="333333"/>
-              </a:solidFill>
-              <a:latin typeface="Consolas" pitchFamily="49" charset="0"/>
-            </a:endParaRPr>
           </a:p>
           <a:p>
             <a:r>
@@ -10484,16 +10306,7 @@
                 </a:solidFill>
                 <a:latin typeface="Consolas" pitchFamily="49" charset="0"/>
               </a:rPr>
-              <a:t>) </a:t>
-            </a:r>
-            <a:r>
-              <a:rPr lang="en-US" sz="1400" dirty="0" smtClean="0">
-                <a:solidFill>
-                  <a:srgbClr val="333333"/>
-                </a:solidFill>
-                <a:latin typeface="Consolas" pitchFamily="49" charset="0"/>
-              </a:rPr>
-              <a:t>{</a:t>
+              <a:t>) {</a:t>
             </a:r>
           </a:p>
           <a:p>
@@ -10866,25 +10679,7 @@
                 </a:solidFill>
                 <a:latin typeface="Consolas" pitchFamily="49" charset="0"/>
               </a:rPr>
-              <a:t>// </a:t>
-            </a:r>
-            <a:r>
-              <a:rPr lang="pt-PT" sz="1400" dirty="0" smtClean="0">
-                <a:solidFill>
-                  <a:srgbClr val="008000"/>
-                </a:solidFill>
-                <a:latin typeface="Consolas" pitchFamily="49" charset="0"/>
-              </a:rPr>
-              <a:t>Colocação </a:t>
-            </a:r>
-            <a:r>
-              <a:rPr lang="pt-PT" sz="1400" dirty="0" smtClean="0">
-                <a:solidFill>
-                  <a:srgbClr val="008000"/>
-                </a:solidFill>
-                <a:latin typeface="Consolas" pitchFamily="49" charset="0"/>
-              </a:rPr>
-              <a:t>dos dados na </a:t>
+              <a:t>// Colocação dos dados na </a:t>
             </a:r>
             <a:r>
               <a:rPr lang="pt-PT" sz="1400" dirty="0" err="1" smtClean="0">
@@ -10939,25 +10734,52 @@
                 </a:solidFill>
                 <a:latin typeface="Consolas" pitchFamily="49" charset="0"/>
               </a:rPr>
+              <a:t>      </a:t>
+            </a:r>
+            <a:r>
+              <a:rPr lang="pt-PT" sz="1400" dirty="0" err="1" smtClean="0">
+                <a:solidFill>
+                  <a:srgbClr val="0000FF"/>
+                </a:solidFill>
+                <a:latin typeface="Consolas" pitchFamily="49" charset="0"/>
+              </a:rPr>
+              <a:t>new</a:t>
+            </a:r>
+            <a:r>
+              <a:rPr lang="pt-PT" sz="1400" dirty="0" smtClean="0">
+                <a:solidFill>
+                  <a:srgbClr val="333333"/>
+                </a:solidFill>
+                <a:latin typeface="Consolas" pitchFamily="49" charset="0"/>
+              </a:rPr>
               <a:t> </a:t>
             </a:r>
             <a:r>
+              <a:rPr lang="pt-PT" sz="1400" dirty="0" err="1" smtClean="0">
+                <a:solidFill>
+                  <a:srgbClr val="333333"/>
+                </a:solidFill>
+                <a:latin typeface="Consolas" pitchFamily="49" charset="0"/>
+              </a:rPr>
+              <a:t>StringEntity</a:t>
+            </a:r>
+            <a:r>
               <a:rPr lang="pt-PT" sz="1400" dirty="0" smtClean="0">
                 <a:solidFill>
                   <a:srgbClr val="333333"/>
                 </a:solidFill>
                 <a:latin typeface="Consolas" pitchFamily="49" charset="0"/>
               </a:rPr>
-              <a:t>     </a:t>
+              <a:t>(</a:t>
             </a:r>
             <a:r>
               <a:rPr lang="pt-PT" sz="1400" dirty="0" err="1" smtClean="0">
                 <a:solidFill>
-                  <a:srgbClr val="0000FF"/>
-                </a:solidFill>
-                <a:latin typeface="Consolas" pitchFamily="49" charset="0"/>
-              </a:rPr>
-              <a:t>new</a:t>
+                  <a:srgbClr val="333333"/>
+                </a:solidFill>
+                <a:latin typeface="Consolas" pitchFamily="49" charset="0"/>
+              </a:rPr>
+              <a:t>jsonObj.toString</a:t>
             </a:r>
             <a:r>
               <a:rPr lang="pt-PT" sz="1400" dirty="0" smtClean="0">
@@ -10966,17 +10788,10 @@
                 </a:solidFill>
                 <a:latin typeface="Consolas" pitchFamily="49" charset="0"/>
               </a:rPr>
-              <a:t> </a:t>
-            </a:r>
-            <a:r>
-              <a:rPr lang="pt-PT" sz="1400" dirty="0" err="1" smtClean="0">
-                <a:solidFill>
-                  <a:srgbClr val="333333"/>
-                </a:solidFill>
-                <a:latin typeface="Consolas" pitchFamily="49" charset="0"/>
-              </a:rPr>
-              <a:t>StringEntity</a:t>
-            </a:r>
+              <a:t>()</a:t>
+            </a:r>
+          </a:p>
+          <a:p>
             <a:r>
               <a:rPr lang="pt-PT" sz="1400" dirty="0" smtClean="0">
                 <a:solidFill>
@@ -10984,45 +10799,7 @@
                 </a:solidFill>
                 <a:latin typeface="Consolas" pitchFamily="49" charset="0"/>
               </a:rPr>
-              <a:t>(</a:t>
-            </a:r>
-            <a:r>
-              <a:rPr lang="pt-PT" sz="1400" dirty="0" err="1" smtClean="0">
-                <a:solidFill>
-                  <a:srgbClr val="333333"/>
-                </a:solidFill>
-                <a:latin typeface="Consolas" pitchFamily="49" charset="0"/>
-              </a:rPr>
-              <a:t>jsonObj.toString</a:t>
-            </a:r>
-            <a:r>
-              <a:rPr lang="pt-PT" sz="1400" dirty="0" smtClean="0">
-                <a:solidFill>
-                  <a:srgbClr val="333333"/>
-                </a:solidFill>
-                <a:latin typeface="Consolas" pitchFamily="49" charset="0"/>
-              </a:rPr>
-              <a:t>()</a:t>
-            </a:r>
-          </a:p>
-          <a:p>
-            <a:r>
-              <a:rPr lang="pt-PT" sz="1400" dirty="0" smtClean="0">
-                <a:solidFill>
-                  <a:srgbClr val="333333"/>
-                </a:solidFill>
-                <a:latin typeface="Consolas" pitchFamily="49" charset="0"/>
-              </a:rPr>
-              <a:t> </a:t>
-            </a:r>
-            <a:r>
-              <a:rPr lang="pt-PT" sz="1400" dirty="0" smtClean="0">
-                <a:solidFill>
-                  <a:srgbClr val="333333"/>
-                </a:solidFill>
-                <a:latin typeface="Consolas" pitchFamily="49" charset="0"/>
-              </a:rPr>
-              <a:t>   );</a:t>
+              <a:t>    );</a:t>
             </a:r>
           </a:p>
           <a:p>
@@ -11041,16 +10818,7 @@
                 </a:solidFill>
                 <a:latin typeface="Consolas" pitchFamily="49" charset="0"/>
               </a:rPr>
-              <a:t> </a:t>
-            </a:r>
-            <a:r>
-              <a:rPr lang="pt-PT" sz="1400" dirty="0" smtClean="0">
-                <a:solidFill>
-                  <a:srgbClr val="333333"/>
-                </a:solidFill>
-                <a:latin typeface="Consolas" pitchFamily="49" charset="0"/>
-              </a:rPr>
-              <a:t>   </a:t>
+              <a:t>    </a:t>
             </a:r>
             <a:r>
               <a:rPr lang="pt-PT" sz="1400" dirty="0" smtClean="0">
@@ -11151,16 +10919,7 @@
                 </a:solidFill>
                 <a:latin typeface="Consolas" pitchFamily="49" charset="0"/>
               </a:rPr>
-              <a:t> </a:t>
-            </a:r>
-            <a:r>
-              <a:rPr lang="pt-PT" sz="1400" dirty="0" smtClean="0">
-                <a:solidFill>
-                  <a:srgbClr val="333333"/>
-                </a:solidFill>
-                <a:latin typeface="Consolas" pitchFamily="49" charset="0"/>
-              </a:rPr>
-              <a:t>   </a:t>
+              <a:t>    </a:t>
             </a:r>
             <a:r>
               <a:rPr lang="pt-PT" sz="1400" dirty="0" smtClean="0">
@@ -11203,16 +10962,7 @@
                 </a:solidFill>
                 <a:latin typeface="Consolas" pitchFamily="49" charset="0"/>
               </a:rPr>
-              <a:t>// </a:t>
-            </a:r>
-            <a:r>
-              <a:rPr lang="pt-PT" sz="1400" dirty="0" smtClean="0">
-                <a:solidFill>
-                  <a:srgbClr val="008000"/>
-                </a:solidFill>
-                <a:latin typeface="Consolas" pitchFamily="49" charset="0"/>
-              </a:rPr>
-              <a:t>Envio da </a:t>
+              <a:t>// Envio da </a:t>
             </a:r>
             <a:r>
               <a:rPr lang="pt-PT" sz="1400" dirty="0" err="1" smtClean="0">
@@ -11449,16 +11199,7 @@
                 </a:solidFill>
                 <a:latin typeface="Consolas" pitchFamily="49" charset="0"/>
               </a:rPr>
-              <a:t>, algo correu mal </a:t>
-            </a:r>
-            <a:r>
-              <a:rPr lang="pt-PT" sz="1400" dirty="0" smtClean="0">
-                <a:solidFill>
-                  <a:srgbClr val="008000"/>
-                </a:solidFill>
-                <a:latin typeface="Consolas" pitchFamily="49" charset="0"/>
-              </a:rPr>
-              <a:t>no POST!</a:t>
+              <a:t>, algo correu mal no POST!</a:t>
             </a:r>
             <a:endParaRPr lang="pt-PT" sz="1400" dirty="0" smtClean="0">
               <a:solidFill>
@@ -11815,16 +11556,7 @@
                 </a:solidFill>
                 <a:latin typeface="Consolas" pitchFamily="49" charset="0"/>
               </a:rPr>
-              <a:t>"tests</a:t>
-            </a:r>
-            <a:r>
-              <a:rPr lang="en-US" sz="1400" dirty="0" smtClean="0">
-                <a:solidFill>
-                  <a:srgbClr val="A31515"/>
-                </a:solidFill>
-                <a:latin typeface="Consolas" pitchFamily="49" charset="0"/>
-              </a:rPr>
-              <a:t>"</a:t>
+              <a:t>"tests"</a:t>
             </a:r>
             <a:r>
               <a:rPr lang="en-US" sz="1400" dirty="0" smtClean="0">
@@ -11835,6 +11567,137 @@
               </a:rPr>
               <a:t>);</a:t>
             </a:r>
+          </a:p>
+          <a:p>
+            <a:r>
+              <a:rPr lang="pt-PT" sz="1400" dirty="0" smtClean="0">
+                <a:solidFill>
+                  <a:srgbClr val="008000"/>
+                </a:solidFill>
+                <a:latin typeface="Consolas" pitchFamily="49" charset="0"/>
+              </a:rPr>
+              <a:t>// Iterar para cada item do </a:t>
+            </a:r>
+            <a:r>
+              <a:rPr lang="pt-PT" sz="1400" dirty="0" err="1" smtClean="0">
+                <a:solidFill>
+                  <a:srgbClr val="008000"/>
+                </a:solidFill>
+                <a:latin typeface="Consolas" pitchFamily="49" charset="0"/>
+              </a:rPr>
+              <a:t>array</a:t>
+            </a:r>
+            <a:endParaRPr lang="pt-PT" sz="1400" dirty="0" smtClean="0">
+              <a:solidFill>
+                <a:srgbClr val="333333"/>
+              </a:solidFill>
+              <a:latin typeface="Consolas" pitchFamily="49" charset="0"/>
+            </a:endParaRPr>
+          </a:p>
+          <a:p>
+            <a:r>
+              <a:rPr lang="nn-NO" sz="1400" dirty="0" smtClean="0">
+                <a:solidFill>
+                  <a:srgbClr val="0000FF"/>
+                </a:solidFill>
+                <a:latin typeface="Consolas" pitchFamily="49" charset="0"/>
+              </a:rPr>
+              <a:t>for</a:t>
+            </a:r>
+            <a:r>
+              <a:rPr lang="nn-NO" sz="1400" dirty="0" smtClean="0">
+                <a:solidFill>
+                  <a:srgbClr val="333333"/>
+                </a:solidFill>
+                <a:latin typeface="Consolas" pitchFamily="49" charset="0"/>
+              </a:rPr>
+              <a:t> (</a:t>
+            </a:r>
+            <a:r>
+              <a:rPr lang="nn-NO" sz="1400" dirty="0" smtClean="0">
+                <a:solidFill>
+                  <a:srgbClr val="2B91AF"/>
+                </a:solidFill>
+                <a:latin typeface="Consolas" pitchFamily="49" charset="0"/>
+              </a:rPr>
+              <a:t>int</a:t>
+            </a:r>
+            <a:r>
+              <a:rPr lang="nn-NO" sz="1400" dirty="0" smtClean="0">
+                <a:solidFill>
+                  <a:srgbClr val="333333"/>
+                </a:solidFill>
+                <a:latin typeface="Consolas" pitchFamily="49" charset="0"/>
+              </a:rPr>
+              <a:t> i = 0; i &lt; tests.length(); i++) {</a:t>
+            </a:r>
+          </a:p>
+          <a:p>
+            <a:r>
+              <a:rPr lang="en-US" sz="1400" dirty="0" smtClean="0">
+                <a:solidFill>
+                  <a:srgbClr val="333333"/>
+                </a:solidFill>
+                <a:latin typeface="Consolas" pitchFamily="49" charset="0"/>
+              </a:rPr>
+              <a:t>  </a:t>
+            </a:r>
+            <a:r>
+              <a:rPr lang="en-US" sz="1400" dirty="0" err="1" smtClean="0">
+                <a:solidFill>
+                  <a:srgbClr val="333333"/>
+                </a:solidFill>
+                <a:latin typeface="Consolas" pitchFamily="49" charset="0"/>
+              </a:rPr>
+              <a:t>JSONObject</a:t>
+            </a:r>
+            <a:r>
+              <a:rPr lang="en-US" sz="1400" dirty="0" smtClean="0">
+                <a:solidFill>
+                  <a:srgbClr val="333333"/>
+                </a:solidFill>
+                <a:latin typeface="Consolas" pitchFamily="49" charset="0"/>
+              </a:rPr>
+              <a:t> c = </a:t>
+            </a:r>
+            <a:r>
+              <a:rPr lang="en-US" sz="1400" dirty="0" err="1" smtClean="0">
+                <a:solidFill>
+                  <a:srgbClr val="333333"/>
+                </a:solidFill>
+                <a:latin typeface="Consolas" pitchFamily="49" charset="0"/>
+              </a:rPr>
+              <a:t>tests.getJSONObject</a:t>
+            </a:r>
+            <a:r>
+              <a:rPr lang="en-US" sz="1400" dirty="0" smtClean="0">
+                <a:solidFill>
+                  <a:srgbClr val="333333"/>
+                </a:solidFill>
+                <a:latin typeface="Consolas" pitchFamily="49" charset="0"/>
+              </a:rPr>
+              <a:t>(</a:t>
+            </a:r>
+            <a:r>
+              <a:rPr lang="en-US" sz="1400" dirty="0" err="1" smtClean="0">
+                <a:solidFill>
+                  <a:srgbClr val="333333"/>
+                </a:solidFill>
+                <a:latin typeface="Consolas" pitchFamily="49" charset="0"/>
+              </a:rPr>
+              <a:t>i</a:t>
+            </a:r>
+            <a:r>
+              <a:rPr lang="en-US" sz="1400" dirty="0" smtClean="0">
+                <a:solidFill>
+                  <a:srgbClr val="333333"/>
+                </a:solidFill>
+                <a:latin typeface="Consolas" pitchFamily="49" charset="0"/>
+              </a:rPr>
+              <a:t>);</a:t>
+            </a:r>
+          </a:p>
+          <a:p>
             <a:endParaRPr lang="en-US" sz="1400" dirty="0" smtClean="0">
               <a:solidFill>
                 <a:srgbClr val="333333"/>
@@ -11844,13 +11707,238 @@
           </a:p>
           <a:p>
             <a:r>
+              <a:rPr lang="en-US" sz="1400" dirty="0" smtClean="0">
+                <a:solidFill>
+                  <a:srgbClr val="333333"/>
+                </a:solidFill>
+                <a:latin typeface="Consolas" pitchFamily="49" charset="0"/>
+              </a:rPr>
+              <a:t>  </a:t>
+            </a:r>
+            <a:r>
+              <a:rPr lang="en-US" sz="1400" dirty="0" smtClean="0">
+                <a:solidFill>
+                  <a:srgbClr val="008000"/>
+                </a:solidFill>
+                <a:latin typeface="Consolas" pitchFamily="49" charset="0"/>
+              </a:rPr>
+              <a:t>// </a:t>
+            </a:r>
+            <a:r>
+              <a:rPr lang="en-US" sz="1400" dirty="0" err="1" smtClean="0">
+                <a:solidFill>
+                  <a:srgbClr val="008000"/>
+                </a:solidFill>
+                <a:latin typeface="Consolas" pitchFamily="49" charset="0"/>
+              </a:rPr>
+              <a:t>HashMap</a:t>
+            </a:r>
+            <a:r>
+              <a:rPr lang="en-US" sz="1400" dirty="0" smtClean="0">
+                <a:solidFill>
+                  <a:srgbClr val="008000"/>
+                </a:solidFill>
+                <a:latin typeface="Consolas" pitchFamily="49" charset="0"/>
+              </a:rPr>
+              <a:t> </a:t>
+            </a:r>
+            <a:r>
+              <a:rPr lang="en-US" sz="1400" dirty="0" err="1" smtClean="0">
+                <a:solidFill>
+                  <a:srgbClr val="008000"/>
+                </a:solidFill>
+                <a:latin typeface="Consolas" pitchFamily="49" charset="0"/>
+              </a:rPr>
+              <a:t>que</a:t>
+            </a:r>
+            <a:r>
+              <a:rPr lang="en-US" sz="1400" dirty="0" smtClean="0">
+                <a:solidFill>
+                  <a:srgbClr val="008000"/>
+                </a:solidFill>
+                <a:latin typeface="Consolas" pitchFamily="49" charset="0"/>
+              </a:rPr>
+              <a:t> </a:t>
+            </a:r>
+            <a:r>
+              <a:rPr lang="en-US" sz="1400" dirty="0" err="1" smtClean="0">
+                <a:solidFill>
+                  <a:srgbClr val="008000"/>
+                </a:solidFill>
+                <a:latin typeface="Consolas" pitchFamily="49" charset="0"/>
+              </a:rPr>
+              <a:t>vai</a:t>
+            </a:r>
+            <a:r>
+              <a:rPr lang="en-US" sz="1400" dirty="0" smtClean="0">
+                <a:solidFill>
+                  <a:srgbClr val="008000"/>
+                </a:solidFill>
+                <a:latin typeface="Consolas" pitchFamily="49" charset="0"/>
+              </a:rPr>
+              <a:t> </a:t>
+            </a:r>
+            <a:r>
+              <a:rPr lang="en-US" sz="1400" dirty="0" err="1" smtClean="0">
+                <a:solidFill>
+                  <a:srgbClr val="008000"/>
+                </a:solidFill>
+                <a:latin typeface="Consolas" pitchFamily="49" charset="0"/>
+              </a:rPr>
+              <a:t>guardar</a:t>
+            </a:r>
+            <a:r>
+              <a:rPr lang="en-US" sz="1400" dirty="0" smtClean="0">
+                <a:solidFill>
+                  <a:srgbClr val="008000"/>
+                </a:solidFill>
+                <a:latin typeface="Consolas" pitchFamily="49" charset="0"/>
+              </a:rPr>
+              <a:t> </a:t>
+            </a:r>
+            <a:r>
+              <a:rPr lang="en-US" sz="1400" dirty="0" err="1" smtClean="0">
+                <a:solidFill>
+                  <a:srgbClr val="008000"/>
+                </a:solidFill>
+                <a:latin typeface="Consolas" pitchFamily="49" charset="0"/>
+              </a:rPr>
+              <a:t>os</a:t>
+            </a:r>
+            <a:r>
+              <a:rPr lang="en-US" sz="1400" dirty="0" smtClean="0">
+                <a:solidFill>
+                  <a:srgbClr val="008000"/>
+                </a:solidFill>
+                <a:latin typeface="Consolas" pitchFamily="49" charset="0"/>
+              </a:rPr>
+              <a:t> dados </a:t>
+            </a:r>
+            <a:r>
+              <a:rPr lang="en-US" sz="1400" dirty="0" err="1" smtClean="0">
+                <a:solidFill>
+                  <a:srgbClr val="008000"/>
+                </a:solidFill>
+                <a:latin typeface="Consolas" pitchFamily="49" charset="0"/>
+              </a:rPr>
+              <a:t>para</a:t>
+            </a:r>
+            <a:r>
+              <a:rPr lang="en-US" sz="1400" dirty="0" smtClean="0">
+                <a:solidFill>
+                  <a:srgbClr val="008000"/>
+                </a:solidFill>
+                <a:latin typeface="Consolas" pitchFamily="49" charset="0"/>
+              </a:rPr>
+              <a:t> </a:t>
+            </a:r>
+            <a:r>
+              <a:rPr lang="en-US" sz="1400" dirty="0" err="1" smtClean="0">
+                <a:solidFill>
+                  <a:srgbClr val="008000"/>
+                </a:solidFill>
+                <a:latin typeface="Consolas" pitchFamily="49" charset="0"/>
+              </a:rPr>
+              <a:t>depois</a:t>
+            </a:r>
+            <a:endParaRPr lang="en-US" sz="1400" dirty="0" smtClean="0">
+              <a:solidFill>
+                <a:srgbClr val="333333"/>
+              </a:solidFill>
+              <a:latin typeface="Consolas" pitchFamily="49" charset="0"/>
+            </a:endParaRPr>
+          </a:p>
+          <a:p>
+            <a:r>
+              <a:rPr lang="en-US" sz="1400" dirty="0" smtClean="0">
+                <a:solidFill>
+                  <a:srgbClr val="333333"/>
+                </a:solidFill>
+                <a:latin typeface="Consolas" pitchFamily="49" charset="0"/>
+              </a:rPr>
+              <a:t>  </a:t>
+            </a:r>
+            <a:r>
+              <a:rPr lang="en-US" sz="1400" dirty="0" err="1" smtClean="0">
+                <a:solidFill>
+                  <a:srgbClr val="333333"/>
+                </a:solidFill>
+                <a:latin typeface="Consolas" pitchFamily="49" charset="0"/>
+              </a:rPr>
+              <a:t>HashMap</a:t>
+            </a:r>
+            <a:r>
+              <a:rPr lang="en-US" sz="1400" dirty="0" smtClean="0">
+                <a:solidFill>
+                  <a:srgbClr val="333333"/>
+                </a:solidFill>
+                <a:latin typeface="Consolas" pitchFamily="49" charset="0"/>
+              </a:rPr>
+              <a:t>&lt;String, String&gt; map = </a:t>
+            </a:r>
+            <a:r>
+              <a:rPr lang="en-US" sz="1400" dirty="0" smtClean="0">
+                <a:solidFill>
+                  <a:srgbClr val="0000FF"/>
+                </a:solidFill>
+                <a:latin typeface="Consolas" pitchFamily="49" charset="0"/>
+              </a:rPr>
+              <a:t>new</a:t>
+            </a:r>
+            <a:r>
+              <a:rPr lang="en-US" sz="1400" dirty="0" smtClean="0">
+                <a:solidFill>
+                  <a:srgbClr val="333333"/>
+                </a:solidFill>
+                <a:latin typeface="Consolas" pitchFamily="49" charset="0"/>
+              </a:rPr>
+              <a:t> </a:t>
+            </a:r>
+            <a:r>
+              <a:rPr lang="en-US" sz="1400" dirty="0" err="1" smtClean="0">
+                <a:solidFill>
+                  <a:srgbClr val="333333"/>
+                </a:solidFill>
+                <a:latin typeface="Consolas" pitchFamily="49" charset="0"/>
+              </a:rPr>
+              <a:t>HashMap</a:t>
+            </a:r>
+            <a:r>
+              <a:rPr lang="en-US" sz="1400" dirty="0" smtClean="0">
+                <a:solidFill>
+                  <a:srgbClr val="333333"/>
+                </a:solidFill>
+                <a:latin typeface="Consolas" pitchFamily="49" charset="0"/>
+              </a:rPr>
+              <a:t>&lt;String, String&gt;();</a:t>
+            </a:r>
+          </a:p>
+          <a:p>
+            <a:endParaRPr lang="en-US" sz="1400" dirty="0" smtClean="0">
+              <a:solidFill>
+                <a:srgbClr val="333333"/>
+              </a:solidFill>
+              <a:latin typeface="Consolas" pitchFamily="49" charset="0"/>
+            </a:endParaRPr>
+          </a:p>
+          <a:p>
+            <a:r>
+              <a:rPr lang="en-US" sz="1400" dirty="0" smtClean="0">
+                <a:solidFill>
+                  <a:srgbClr val="333333"/>
+                </a:solidFill>
+                <a:latin typeface="Consolas" pitchFamily="49" charset="0"/>
+              </a:rPr>
+              <a:t>  </a:t>
+            </a:r>
+            <a:r>
               <a:rPr lang="pt-PT" sz="1400" dirty="0" smtClean="0">
                 <a:solidFill>
                   <a:srgbClr val="008000"/>
                 </a:solidFill>
                 <a:latin typeface="Consolas" pitchFamily="49" charset="0"/>
               </a:rPr>
-              <a:t>// Iterar para cada item do </a:t>
+              <a:t>// Adicionar cada valor ao </a:t>
             </a:r>
             <a:r>
               <a:rPr lang="pt-PT" sz="1400" dirty="0" err="1" smtClean="0">
@@ -11859,7 +11947,16 @@
                 </a:solidFill>
                 <a:latin typeface="Consolas" pitchFamily="49" charset="0"/>
               </a:rPr>
-              <a:t>array</a:t>
+              <a:t>HashMap</a:t>
+            </a:r>
+            <a:r>
+              <a:rPr lang="pt-PT" sz="1400" dirty="0" smtClean="0">
+                <a:solidFill>
+                  <a:srgbClr val="008000"/>
+                </a:solidFill>
+                <a:latin typeface="Consolas" pitchFamily="49" charset="0"/>
+              </a:rPr>
+              <a:t> chave =&gt; valor</a:t>
             </a:r>
             <a:endParaRPr lang="pt-PT" sz="1400" dirty="0" smtClean="0">
               <a:solidFill>
@@ -11870,45 +11967,7 @@
           </a:p>
           <a:p>
             <a:r>
-              <a:rPr lang="nn-NO" sz="1400" dirty="0" smtClean="0">
-                <a:solidFill>
-                  <a:srgbClr val="0000FF"/>
-                </a:solidFill>
-                <a:latin typeface="Consolas" pitchFamily="49" charset="0"/>
-              </a:rPr>
-              <a:t>for</a:t>
-            </a:r>
-            <a:r>
-              <a:rPr lang="nn-NO" sz="1400" dirty="0" smtClean="0">
-                <a:solidFill>
-                  <a:srgbClr val="333333"/>
-                </a:solidFill>
-                <a:latin typeface="Consolas" pitchFamily="49" charset="0"/>
-              </a:rPr>
-              <a:t> (</a:t>
-            </a:r>
-            <a:r>
-              <a:rPr lang="nn-NO" sz="1400" dirty="0" smtClean="0">
-                <a:solidFill>
-                  <a:srgbClr val="2B91AF"/>
-                </a:solidFill>
-                <a:latin typeface="Consolas" pitchFamily="49" charset="0"/>
-              </a:rPr>
-              <a:t>int</a:t>
-            </a:r>
-            <a:r>
-              <a:rPr lang="nn-NO" sz="1400" dirty="0" smtClean="0">
-                <a:solidFill>
-                  <a:srgbClr val="333333"/>
-                </a:solidFill>
-                <a:latin typeface="Consolas" pitchFamily="49" charset="0"/>
-              </a:rPr>
-              <a:t> i = 0; i &lt; tests.length(); i++) {</a:t>
-            </a:r>
-          </a:p>
-          <a:p>
-            <a:r>
-              <a:rPr lang="en-US" sz="1400" dirty="0" smtClean="0">
+              <a:rPr lang="pt-PT" sz="1400" dirty="0" smtClean="0">
                 <a:solidFill>
                   <a:srgbClr val="333333"/>
                 </a:solidFill>
@@ -11923,16 +11982,34 @@
                 </a:solidFill>
                 <a:latin typeface="Consolas" pitchFamily="49" charset="0"/>
               </a:rPr>
-              <a:t>JSONObject</a:t>
-            </a:r>
-            <a:r>
-              <a:rPr lang="en-US" sz="1400" dirty="0" smtClean="0">
-                <a:solidFill>
-                  <a:srgbClr val="333333"/>
-                </a:solidFill>
-                <a:latin typeface="Consolas" pitchFamily="49" charset="0"/>
-              </a:rPr>
-              <a:t> c = </a:t>
+              <a:t>map.put</a:t>
+            </a:r>
+            <a:r>
+              <a:rPr lang="en-US" sz="1400" dirty="0" smtClean="0">
+                <a:solidFill>
+                  <a:srgbClr val="333333"/>
+                </a:solidFill>
+                <a:latin typeface="Consolas" pitchFamily="49" charset="0"/>
+              </a:rPr>
+              <a:t>(</a:t>
+            </a:r>
+            <a:r>
+              <a:rPr lang="en-US" sz="1400" dirty="0" smtClean="0">
+                <a:solidFill>
+                  <a:srgbClr val="A31515"/>
+                </a:solidFill>
+                <a:latin typeface="Consolas" pitchFamily="49" charset="0"/>
+              </a:rPr>
+              <a:t>"id"</a:t>
+            </a:r>
+            <a:r>
+              <a:rPr lang="en-US" sz="1400" dirty="0" smtClean="0">
+                <a:solidFill>
+                  <a:srgbClr val="333333"/>
+                </a:solidFill>
+                <a:latin typeface="Consolas" pitchFamily="49" charset="0"/>
+              </a:rPr>
+              <a:t>, </a:t>
             </a:r>
             <a:r>
               <a:rPr lang="en-US" sz="1400" dirty="0" err="1" smtClean="0">
@@ -11941,7 +12018,7 @@
                 </a:solidFill>
                 <a:latin typeface="Consolas" pitchFamily="49" charset="0"/>
               </a:rPr>
-              <a:t>tests.getJSONObject</a:t>
+              <a:t>c.getString</a:t>
             </a:r>
             <a:r>
               <a:rPr lang="en-US" sz="1400" dirty="0" smtClean="0">
@@ -11953,31 +12030,23 @@
               <a:t>(</a:t>
             </a:r>
             <a:r>
-              <a:rPr lang="en-US" sz="1400" dirty="0" err="1" smtClean="0">
-                <a:solidFill>
-                  <a:srgbClr val="333333"/>
-                </a:solidFill>
-                <a:latin typeface="Consolas" pitchFamily="49" charset="0"/>
-              </a:rPr>
-              <a:t>i</a:t>
-            </a:r>
-            <a:r>
-              <a:rPr lang="en-US" sz="1400" dirty="0" smtClean="0">
-                <a:solidFill>
-                  <a:srgbClr val="333333"/>
-                </a:solidFill>
-                <a:latin typeface="Consolas" pitchFamily="49" charset="0"/>
-              </a:rPr>
-              <a:t>);</a:t>
-            </a:r>
-          </a:p>
-          <a:p>
-            <a:endParaRPr lang="en-US" sz="1400" dirty="0" smtClean="0">
-              <a:solidFill>
-                <a:srgbClr val="333333"/>
-              </a:solidFill>
-              <a:latin typeface="Consolas" pitchFamily="49" charset="0"/>
-            </a:endParaRPr>
+              <a:rPr lang="en-US" sz="1400" dirty="0" smtClean="0">
+                <a:solidFill>
+                  <a:srgbClr val="A31515"/>
+                </a:solidFill>
+                <a:latin typeface="Consolas" pitchFamily="49" charset="0"/>
+              </a:rPr>
+              <a:t>"id"</a:t>
+            </a:r>
+            <a:r>
+              <a:rPr lang="en-US" sz="1400" dirty="0" smtClean="0">
+                <a:solidFill>
+                  <a:srgbClr val="333333"/>
+                </a:solidFill>
+                <a:latin typeface="Consolas" pitchFamily="49" charset="0"/>
+              </a:rPr>
+              <a:t>));</a:t>
+            </a:r>
           </a:p>
           <a:p>
             <a:r>
@@ -11990,419 +12059,43 @@
               <a:t>  </a:t>
             </a:r>
             <a:r>
-              <a:rPr lang="en-US" sz="1400" dirty="0" smtClean="0">
+              <a:rPr lang="pt-PT" sz="1400" dirty="0" smtClean="0">
                 <a:solidFill>
                   <a:srgbClr val="008000"/>
                 </a:solidFill>
                 <a:latin typeface="Consolas" pitchFamily="49" charset="0"/>
               </a:rPr>
-              <a:t>// </a:t>
-            </a:r>
-            <a:r>
-              <a:rPr lang="en-US" sz="1400" dirty="0" err="1" smtClean="0">
+              <a:t>// Repete para os outros (</a:t>
+            </a:r>
+            <a:r>
+              <a:rPr lang="pt-PT" sz="1400" dirty="0" err="1" smtClean="0">
                 <a:solidFill>
                   <a:srgbClr val="008000"/>
                 </a:solidFill>
                 <a:latin typeface="Consolas" pitchFamily="49" charset="0"/>
               </a:rPr>
-              <a:t>HashMap</a:t>
-            </a:r>
-            <a:r>
-              <a:rPr lang="en-US" sz="1400" dirty="0" smtClean="0">
+              <a:t>getInt</a:t>
+            </a:r>
+            <a:r>
+              <a:rPr lang="pt-PT" sz="1400" dirty="0" smtClean="0">
                 <a:solidFill>
                   <a:srgbClr val="008000"/>
                 </a:solidFill>
                 <a:latin typeface="Consolas" pitchFamily="49" charset="0"/>
               </a:rPr>
-              <a:t> </a:t>
-            </a:r>
-            <a:r>
-              <a:rPr lang="en-US" sz="1400" dirty="0" err="1" smtClean="0">
-                <a:solidFill>
-                  <a:srgbClr val="008000"/>
-                </a:solidFill>
-                <a:latin typeface="Consolas" pitchFamily="49" charset="0"/>
-              </a:rPr>
-              <a:t>que</a:t>
-            </a:r>
-            <a:r>
-              <a:rPr lang="en-US" sz="1400" dirty="0" smtClean="0">
-                <a:solidFill>
-                  <a:srgbClr val="008000"/>
-                </a:solidFill>
-                <a:latin typeface="Consolas" pitchFamily="49" charset="0"/>
-              </a:rPr>
-              <a:t> </a:t>
-            </a:r>
-            <a:r>
-              <a:rPr lang="en-US" sz="1400" dirty="0" err="1" smtClean="0">
-                <a:solidFill>
-                  <a:srgbClr val="008000"/>
-                </a:solidFill>
-                <a:latin typeface="Consolas" pitchFamily="49" charset="0"/>
-              </a:rPr>
-              <a:t>vai</a:t>
-            </a:r>
-            <a:r>
-              <a:rPr lang="en-US" sz="1400" dirty="0" smtClean="0">
-                <a:solidFill>
-                  <a:srgbClr val="008000"/>
-                </a:solidFill>
-                <a:latin typeface="Consolas" pitchFamily="49" charset="0"/>
-              </a:rPr>
-              <a:t> </a:t>
-            </a:r>
-            <a:r>
-              <a:rPr lang="en-US" sz="1400" dirty="0" err="1" smtClean="0">
-                <a:solidFill>
-                  <a:srgbClr val="008000"/>
-                </a:solidFill>
-                <a:latin typeface="Consolas" pitchFamily="49" charset="0"/>
-              </a:rPr>
-              <a:t>guardar</a:t>
-            </a:r>
-            <a:r>
-              <a:rPr lang="en-US" sz="1400" dirty="0" smtClean="0">
-                <a:solidFill>
-                  <a:srgbClr val="008000"/>
-                </a:solidFill>
-                <a:latin typeface="Consolas" pitchFamily="49" charset="0"/>
-              </a:rPr>
-              <a:t> </a:t>
-            </a:r>
-            <a:r>
-              <a:rPr lang="en-US" sz="1400" dirty="0" err="1" smtClean="0">
-                <a:solidFill>
-                  <a:srgbClr val="008000"/>
-                </a:solidFill>
-                <a:latin typeface="Consolas" pitchFamily="49" charset="0"/>
-              </a:rPr>
-              <a:t>os</a:t>
-            </a:r>
-            <a:r>
-              <a:rPr lang="en-US" sz="1400" dirty="0" smtClean="0">
-                <a:solidFill>
-                  <a:srgbClr val="008000"/>
-                </a:solidFill>
-                <a:latin typeface="Consolas" pitchFamily="49" charset="0"/>
-              </a:rPr>
-              <a:t> dados </a:t>
-            </a:r>
-            <a:r>
-              <a:rPr lang="en-US" sz="1400" dirty="0" err="1" smtClean="0">
-                <a:solidFill>
-                  <a:srgbClr val="008000"/>
-                </a:solidFill>
-                <a:latin typeface="Consolas" pitchFamily="49" charset="0"/>
-              </a:rPr>
-              <a:t>para</a:t>
-            </a:r>
-            <a:r>
-              <a:rPr lang="en-US" sz="1400" dirty="0" smtClean="0">
-                <a:solidFill>
-                  <a:srgbClr val="008000"/>
-                </a:solidFill>
-                <a:latin typeface="Consolas" pitchFamily="49" charset="0"/>
-              </a:rPr>
-              <a:t> </a:t>
-            </a:r>
-            <a:r>
-              <a:rPr lang="en-US" sz="1400" dirty="0" err="1" smtClean="0">
-                <a:solidFill>
-                  <a:srgbClr val="008000"/>
-                </a:solidFill>
-                <a:latin typeface="Consolas" pitchFamily="49" charset="0"/>
-              </a:rPr>
-              <a:t>depois</a:t>
-            </a:r>
-            <a:endParaRPr lang="en-US" sz="1400" dirty="0" smtClean="0">
-              <a:solidFill>
-                <a:srgbClr val="333333"/>
-              </a:solidFill>
-              <a:latin typeface="Consolas" pitchFamily="49" charset="0"/>
-            </a:endParaRPr>
-          </a:p>
-          <a:p>
-            <a:r>
-              <a:rPr lang="en-US" sz="1400" dirty="0" smtClean="0">
-                <a:solidFill>
-                  <a:srgbClr val="333333"/>
-                </a:solidFill>
-                <a:latin typeface="Consolas" pitchFamily="49" charset="0"/>
-              </a:rPr>
-              <a:t>  </a:t>
-            </a:r>
-            <a:r>
-              <a:rPr lang="en-US" sz="1400" dirty="0" err="1" smtClean="0">
-                <a:solidFill>
-                  <a:srgbClr val="333333"/>
-                </a:solidFill>
-                <a:latin typeface="Consolas" pitchFamily="49" charset="0"/>
-              </a:rPr>
-              <a:t>HashMap</a:t>
-            </a:r>
-            <a:r>
-              <a:rPr lang="en-US" sz="1400" dirty="0" smtClean="0">
-                <a:solidFill>
-                  <a:srgbClr val="333333"/>
-                </a:solidFill>
-                <a:latin typeface="Consolas" pitchFamily="49" charset="0"/>
-              </a:rPr>
-              <a:t>&lt;String, String&gt; map = </a:t>
-            </a:r>
-            <a:r>
-              <a:rPr lang="en-US" sz="1400" dirty="0" smtClean="0">
-                <a:solidFill>
-                  <a:srgbClr val="0000FF"/>
-                </a:solidFill>
-                <a:latin typeface="Consolas" pitchFamily="49" charset="0"/>
-              </a:rPr>
-              <a:t>new</a:t>
-            </a:r>
-            <a:r>
-              <a:rPr lang="en-US" sz="1400" dirty="0" smtClean="0">
-                <a:solidFill>
-                  <a:srgbClr val="333333"/>
-                </a:solidFill>
-                <a:latin typeface="Consolas" pitchFamily="49" charset="0"/>
-              </a:rPr>
-              <a:t> </a:t>
-            </a:r>
-            <a:r>
-              <a:rPr lang="en-US" sz="1400" dirty="0" err="1" smtClean="0">
-                <a:solidFill>
-                  <a:srgbClr val="333333"/>
-                </a:solidFill>
-                <a:latin typeface="Consolas" pitchFamily="49" charset="0"/>
-              </a:rPr>
-              <a:t>HashMap</a:t>
-            </a:r>
-            <a:r>
-              <a:rPr lang="en-US" sz="1400" dirty="0" smtClean="0">
-                <a:solidFill>
-                  <a:srgbClr val="333333"/>
-                </a:solidFill>
-                <a:latin typeface="Consolas" pitchFamily="49" charset="0"/>
-              </a:rPr>
-              <a:t>&lt;String, String&gt;();</a:t>
-            </a:r>
-          </a:p>
-          <a:p>
-            <a:endParaRPr lang="en-US" sz="1400" dirty="0" smtClean="0">
-              <a:solidFill>
-                <a:srgbClr val="333333"/>
-              </a:solidFill>
-              <a:latin typeface="Consolas" pitchFamily="49" charset="0"/>
-            </a:endParaRPr>
-          </a:p>
-          <a:p>
-            <a:r>
-              <a:rPr lang="en-US" sz="1400" dirty="0" smtClean="0">
-                <a:solidFill>
-                  <a:srgbClr val="333333"/>
-                </a:solidFill>
-                <a:latin typeface="Consolas" pitchFamily="49" charset="0"/>
-              </a:rPr>
-              <a:t>  </a:t>
-            </a:r>
+              <a:t>, etc. dependendo do tipo)...</a:t>
+            </a:r>
+          </a:p>
+          <a:p>
             <a:r>
               <a:rPr lang="pt-PT" sz="1400" dirty="0" smtClean="0">
                 <a:solidFill>
-                  <a:srgbClr val="008000"/>
-                </a:solidFill>
-                <a:latin typeface="Consolas" pitchFamily="49" charset="0"/>
-              </a:rPr>
-              <a:t>// Adicionar cada </a:t>
-            </a:r>
-            <a:r>
-              <a:rPr lang="pt-PT" sz="1400" dirty="0" smtClean="0">
-                <a:solidFill>
-                  <a:srgbClr val="008000"/>
-                </a:solidFill>
-                <a:latin typeface="Consolas" pitchFamily="49" charset="0"/>
-              </a:rPr>
-              <a:t>valor </a:t>
-            </a:r>
-            <a:r>
-              <a:rPr lang="pt-PT" sz="1400" dirty="0" smtClean="0">
-                <a:solidFill>
-                  <a:srgbClr val="008000"/>
-                </a:solidFill>
-                <a:latin typeface="Consolas" pitchFamily="49" charset="0"/>
-              </a:rPr>
-              <a:t>ao </a:t>
-            </a:r>
-            <a:r>
-              <a:rPr lang="pt-PT" sz="1400" dirty="0" err="1" smtClean="0">
-                <a:solidFill>
-                  <a:srgbClr val="008000"/>
-                </a:solidFill>
-                <a:latin typeface="Consolas" pitchFamily="49" charset="0"/>
-              </a:rPr>
-              <a:t>HashMap</a:t>
-            </a:r>
-            <a:r>
-              <a:rPr lang="pt-PT" sz="1400" dirty="0" smtClean="0">
-                <a:solidFill>
-                  <a:srgbClr val="008000"/>
-                </a:solidFill>
-                <a:latin typeface="Consolas" pitchFamily="49" charset="0"/>
-              </a:rPr>
-              <a:t> chave =&gt; valor</a:t>
-            </a:r>
-            <a:endParaRPr lang="pt-PT" sz="1400" dirty="0" smtClean="0">
-              <a:solidFill>
-                <a:srgbClr val="333333"/>
-              </a:solidFill>
-              <a:latin typeface="Consolas" pitchFamily="49" charset="0"/>
-            </a:endParaRPr>
-          </a:p>
-          <a:p>
-            <a:r>
-              <a:rPr lang="pt-PT" sz="1400" dirty="0" smtClean="0">
-                <a:solidFill>
-                  <a:srgbClr val="333333"/>
-                </a:solidFill>
-                <a:latin typeface="Consolas" pitchFamily="49" charset="0"/>
-              </a:rPr>
-              <a:t>  </a:t>
-            </a:r>
-            <a:r>
-              <a:rPr lang="en-US" sz="1400" dirty="0" err="1" smtClean="0">
-                <a:solidFill>
-                  <a:srgbClr val="333333"/>
-                </a:solidFill>
-                <a:latin typeface="Consolas" pitchFamily="49" charset="0"/>
-              </a:rPr>
-              <a:t>map.put</a:t>
-            </a:r>
-            <a:r>
-              <a:rPr lang="en-US" sz="1400" dirty="0" smtClean="0">
-                <a:solidFill>
-                  <a:srgbClr val="333333"/>
-                </a:solidFill>
-                <a:latin typeface="Consolas" pitchFamily="49" charset="0"/>
-              </a:rPr>
-              <a:t>(</a:t>
-            </a:r>
-            <a:r>
-              <a:rPr lang="en-US" sz="1400" dirty="0" smtClean="0">
-                <a:solidFill>
-                  <a:srgbClr val="A31515"/>
-                </a:solidFill>
-                <a:latin typeface="Consolas" pitchFamily="49" charset="0"/>
-              </a:rPr>
-              <a:t>"id"</a:t>
-            </a:r>
-            <a:r>
-              <a:rPr lang="en-US" sz="1400" dirty="0" smtClean="0">
-                <a:solidFill>
-                  <a:srgbClr val="333333"/>
-                </a:solidFill>
-                <a:latin typeface="Consolas" pitchFamily="49" charset="0"/>
-              </a:rPr>
-              <a:t>, </a:t>
-            </a:r>
-            <a:r>
-              <a:rPr lang="en-US" sz="1400" dirty="0" err="1" smtClean="0">
-                <a:solidFill>
-                  <a:srgbClr val="333333"/>
-                </a:solidFill>
-                <a:latin typeface="Consolas" pitchFamily="49" charset="0"/>
-              </a:rPr>
-              <a:t>c.getString</a:t>
-            </a:r>
-            <a:r>
-              <a:rPr lang="en-US" sz="1400" dirty="0" smtClean="0">
-                <a:solidFill>
-                  <a:srgbClr val="333333"/>
-                </a:solidFill>
-                <a:latin typeface="Consolas" pitchFamily="49" charset="0"/>
-              </a:rPr>
-              <a:t>(</a:t>
-            </a:r>
-            <a:r>
-              <a:rPr lang="en-US" sz="1400" dirty="0" smtClean="0">
-                <a:solidFill>
-                  <a:srgbClr val="A31515"/>
-                </a:solidFill>
-                <a:latin typeface="Consolas" pitchFamily="49" charset="0"/>
-              </a:rPr>
-              <a:t>"id"</a:t>
-            </a:r>
-            <a:r>
-              <a:rPr lang="en-US" sz="1400" dirty="0" smtClean="0">
-                <a:solidFill>
-                  <a:srgbClr val="333333"/>
-                </a:solidFill>
-                <a:latin typeface="Consolas" pitchFamily="49" charset="0"/>
-              </a:rPr>
-              <a:t>));</a:t>
-            </a:r>
-          </a:p>
-          <a:p>
-            <a:r>
-              <a:rPr lang="en-US" sz="1400" dirty="0" smtClean="0">
-                <a:solidFill>
-                  <a:srgbClr val="333333"/>
-                </a:solidFill>
-                <a:latin typeface="Consolas" pitchFamily="49" charset="0"/>
-              </a:rPr>
-              <a:t>  </a:t>
-            </a:r>
-            <a:r>
-              <a:rPr lang="pt-PT" sz="1400" dirty="0" smtClean="0">
-                <a:solidFill>
-                  <a:srgbClr val="008000"/>
-                </a:solidFill>
-                <a:latin typeface="Consolas" pitchFamily="49" charset="0"/>
-              </a:rPr>
-              <a:t>// </a:t>
-            </a:r>
-            <a:r>
-              <a:rPr lang="pt-PT" sz="1400" dirty="0" smtClean="0">
-                <a:solidFill>
-                  <a:srgbClr val="008000"/>
-                </a:solidFill>
-                <a:latin typeface="Consolas" pitchFamily="49" charset="0"/>
-              </a:rPr>
-              <a:t>Repete para os outros (</a:t>
-            </a:r>
-            <a:r>
-              <a:rPr lang="pt-PT" sz="1400" dirty="0" err="1" smtClean="0">
-                <a:solidFill>
-                  <a:srgbClr val="008000"/>
-                </a:solidFill>
-                <a:latin typeface="Consolas" pitchFamily="49" charset="0"/>
-              </a:rPr>
-              <a:t>getInt</a:t>
-            </a:r>
-            <a:r>
-              <a:rPr lang="pt-PT" sz="1400" dirty="0" smtClean="0">
-                <a:solidFill>
-                  <a:srgbClr val="008000"/>
-                </a:solidFill>
-                <a:latin typeface="Consolas" pitchFamily="49" charset="0"/>
-              </a:rPr>
-              <a:t>, etc. dependendo do tipo)...</a:t>
-            </a:r>
-          </a:p>
-          <a:p>
-            <a:r>
-              <a:rPr lang="pt-PT" sz="1400" dirty="0" smtClean="0">
-                <a:solidFill>
                   <a:srgbClr val="333333"/>
                 </a:solidFill>
                 <a:latin typeface="Consolas" pitchFamily="49" charset="0"/>
               </a:rPr>
               <a:t>}</a:t>
             </a:r>
-            <a:endParaRPr lang="pt-PT" sz="1400" dirty="0" smtClean="0">
-              <a:solidFill>
-                <a:srgbClr val="333333"/>
-              </a:solidFill>
-              <a:latin typeface="Consolas" pitchFamily="49" charset="0"/>
-            </a:endParaRPr>
           </a:p>
           <a:p>
             <a:endParaRPr lang="pt-PT" dirty="0"/>
@@ -12646,6 +12339,35 @@
               </a:rPr>
               <a:t>();</a:t>
             </a:r>
+          </a:p>
+          <a:p>
+            <a:r>
+              <a:rPr lang="pt-PT" sz="1400" dirty="0" smtClean="0">
+                <a:solidFill>
+                  <a:srgbClr val="008000"/>
+                </a:solidFill>
+                <a:latin typeface="Consolas" pitchFamily="49" charset="0"/>
+              </a:rPr>
+              <a:t>// Criação do </a:t>
+            </a:r>
+            <a:r>
+              <a:rPr lang="pt-PT" sz="1400" dirty="0" err="1" smtClean="0">
+                <a:solidFill>
+                  <a:srgbClr val="008000"/>
+                </a:solidFill>
+                <a:latin typeface="Consolas" pitchFamily="49" charset="0"/>
+              </a:rPr>
+              <a:t>array</a:t>
+            </a:r>
+            <a:r>
+              <a:rPr lang="pt-PT" sz="1400" dirty="0" smtClean="0">
+                <a:solidFill>
+                  <a:srgbClr val="008000"/>
+                </a:solidFill>
+                <a:latin typeface="Consolas" pitchFamily="49" charset="0"/>
+              </a:rPr>
+              <a:t> que vai conter os dados</a:t>
+            </a:r>
             <a:endParaRPr lang="pt-PT" sz="1400" dirty="0" smtClean="0">
               <a:solidFill>
                 <a:srgbClr val="333333"/>
@@ -12655,31 +12377,142 @@
           </a:p>
           <a:p>
             <a:r>
+              <a:rPr lang="en-US" sz="1400" dirty="0" err="1" smtClean="0">
+                <a:solidFill>
+                  <a:srgbClr val="333333"/>
+                </a:solidFill>
+                <a:latin typeface="Consolas" pitchFamily="49" charset="0"/>
+              </a:rPr>
+              <a:t>JSONArray</a:t>
+            </a:r>
+            <a:r>
+              <a:rPr lang="en-US" sz="1400" dirty="0" smtClean="0">
+                <a:solidFill>
+                  <a:srgbClr val="333333"/>
+                </a:solidFill>
+                <a:latin typeface="Consolas" pitchFamily="49" charset="0"/>
+              </a:rPr>
+              <a:t> </a:t>
+            </a:r>
+            <a:r>
+              <a:rPr lang="en-US" sz="1400" dirty="0" err="1" smtClean="0">
+                <a:solidFill>
+                  <a:srgbClr val="333333"/>
+                </a:solidFill>
+                <a:latin typeface="Consolas" pitchFamily="49" charset="0"/>
+              </a:rPr>
+              <a:t>solvedTests</a:t>
+            </a:r>
+            <a:r>
+              <a:rPr lang="en-US" sz="1400" dirty="0" smtClean="0">
+                <a:solidFill>
+                  <a:srgbClr val="333333"/>
+                </a:solidFill>
+                <a:latin typeface="Consolas" pitchFamily="49" charset="0"/>
+              </a:rPr>
+              <a:t> = </a:t>
+            </a:r>
+            <a:r>
+              <a:rPr lang="en-US" sz="1400" dirty="0" smtClean="0">
+                <a:solidFill>
+                  <a:srgbClr val="0000FF"/>
+                </a:solidFill>
+                <a:latin typeface="Consolas" pitchFamily="49" charset="0"/>
+              </a:rPr>
+              <a:t>new</a:t>
+            </a:r>
+            <a:r>
+              <a:rPr lang="en-US" sz="1400" dirty="0" smtClean="0">
+                <a:solidFill>
+                  <a:srgbClr val="333333"/>
+                </a:solidFill>
+                <a:latin typeface="Consolas" pitchFamily="49" charset="0"/>
+              </a:rPr>
+              <a:t> </a:t>
+            </a:r>
+            <a:r>
+              <a:rPr lang="en-US" sz="1400" dirty="0" err="1" smtClean="0">
+                <a:solidFill>
+                  <a:srgbClr val="333333"/>
+                </a:solidFill>
+                <a:latin typeface="Consolas" pitchFamily="49" charset="0"/>
+              </a:rPr>
+              <a:t>JSONArray</a:t>
+            </a:r>
+            <a:r>
+              <a:rPr lang="en-US" sz="1400" dirty="0" smtClean="0">
+                <a:solidFill>
+                  <a:srgbClr val="333333"/>
+                </a:solidFill>
+                <a:latin typeface="Consolas" pitchFamily="49" charset="0"/>
+              </a:rPr>
+              <a:t>();</a:t>
+            </a:r>
+          </a:p>
+          <a:p>
+            <a:endParaRPr lang="en-US" sz="1400" dirty="0" smtClean="0">
+              <a:solidFill>
+                <a:srgbClr val="333333"/>
+              </a:solidFill>
+              <a:latin typeface="Consolas" pitchFamily="49" charset="0"/>
+            </a:endParaRPr>
+          </a:p>
+          <a:p>
+            <a:r>
+              <a:rPr lang="en-US" sz="1400" dirty="0" smtClean="0">
+                <a:solidFill>
+                  <a:srgbClr val="0000FF"/>
+                </a:solidFill>
+                <a:latin typeface="Consolas" pitchFamily="49" charset="0"/>
+              </a:rPr>
+              <a:t>for</a:t>
+            </a:r>
+            <a:r>
+              <a:rPr lang="en-US" sz="1400" dirty="0" smtClean="0">
+                <a:solidFill>
+                  <a:srgbClr val="333333"/>
+                </a:solidFill>
+                <a:latin typeface="Consolas" pitchFamily="49" charset="0"/>
+              </a:rPr>
+              <a:t> (Test t : </a:t>
+            </a:r>
+            <a:r>
+              <a:rPr lang="en-US" sz="1400" dirty="0" err="1" smtClean="0">
+                <a:solidFill>
+                  <a:srgbClr val="333333"/>
+                </a:solidFill>
+                <a:latin typeface="Consolas" pitchFamily="49" charset="0"/>
+              </a:rPr>
+              <a:t>testArray</a:t>
+            </a:r>
+            <a:r>
+              <a:rPr lang="en-US" sz="1400" dirty="0" smtClean="0">
+                <a:solidFill>
+                  <a:srgbClr val="333333"/>
+                </a:solidFill>
+                <a:latin typeface="Consolas" pitchFamily="49" charset="0"/>
+              </a:rPr>
+              <a:t>) {</a:t>
+            </a:r>
+          </a:p>
+          <a:p>
+            <a:r>
+              <a:rPr lang="en-US" sz="1400" dirty="0" smtClean="0">
+                <a:solidFill>
+                  <a:srgbClr val="333333"/>
+                </a:solidFill>
+                <a:latin typeface="Consolas" pitchFamily="49" charset="0"/>
+              </a:rPr>
+              <a:t>  </a:t>
+            </a:r>
+            <a:r>
               <a:rPr lang="pt-PT" sz="1400" dirty="0" smtClean="0">
                 <a:solidFill>
                   <a:srgbClr val="008000"/>
                 </a:solidFill>
                 <a:latin typeface="Consolas" pitchFamily="49" charset="0"/>
               </a:rPr>
-              <a:t>// Criação do </a:t>
-            </a:r>
-            <a:r>
-              <a:rPr lang="pt-PT" sz="1400" dirty="0" err="1" smtClean="0">
-                <a:solidFill>
-                  <a:srgbClr val="008000"/>
-                </a:solidFill>
-                <a:latin typeface="Consolas" pitchFamily="49" charset="0"/>
-              </a:rPr>
-              <a:t>array</a:t>
-            </a:r>
-            <a:r>
-              <a:rPr lang="pt-PT" sz="1400" dirty="0" smtClean="0">
-                <a:solidFill>
-                  <a:srgbClr val="008000"/>
-                </a:solidFill>
-                <a:latin typeface="Consolas" pitchFamily="49" charset="0"/>
-              </a:rPr>
-              <a:t> que vai conter os dados</a:t>
+              <a:t>// Criar uma nova entidade</a:t>
             </a:r>
             <a:endParaRPr lang="pt-PT" sz="1400" dirty="0" smtClean="0">
               <a:solidFill>
@@ -12690,256 +12523,104 @@
           </a:p>
           <a:p>
             <a:r>
+              <a:rPr lang="pt-PT" sz="1400" dirty="0" smtClean="0">
+                <a:solidFill>
+                  <a:srgbClr val="333333"/>
+                </a:solidFill>
+                <a:latin typeface="Consolas" pitchFamily="49" charset="0"/>
+              </a:rPr>
+              <a:t>  </a:t>
+            </a:r>
+            <a:r>
+              <a:rPr lang="pt-PT" sz="1400" dirty="0" err="1" smtClean="0">
+                <a:solidFill>
+                  <a:srgbClr val="333333"/>
+                </a:solidFill>
+                <a:latin typeface="Consolas" pitchFamily="49" charset="0"/>
+              </a:rPr>
+              <a:t>JSONObject</a:t>
+            </a:r>
+            <a:r>
+              <a:rPr lang="pt-PT" sz="1400" dirty="0" smtClean="0">
+                <a:solidFill>
+                  <a:srgbClr val="333333"/>
+                </a:solidFill>
+                <a:latin typeface="Consolas" pitchFamily="49" charset="0"/>
+              </a:rPr>
+              <a:t> </a:t>
+            </a:r>
+            <a:r>
+              <a:rPr lang="pt-PT" sz="1400" dirty="0" err="1" smtClean="0">
+                <a:solidFill>
+                  <a:srgbClr val="333333"/>
+                </a:solidFill>
+                <a:latin typeface="Consolas" pitchFamily="49" charset="0"/>
+              </a:rPr>
+              <a:t>solvedTest</a:t>
+            </a:r>
+            <a:r>
+              <a:rPr lang="pt-PT" sz="1400" dirty="0" smtClean="0">
+                <a:solidFill>
+                  <a:srgbClr val="333333"/>
+                </a:solidFill>
+                <a:latin typeface="Consolas" pitchFamily="49" charset="0"/>
+              </a:rPr>
+              <a:t> = </a:t>
+            </a:r>
+            <a:r>
+              <a:rPr lang="pt-PT" sz="1400" dirty="0" err="1" smtClean="0">
+                <a:solidFill>
+                  <a:srgbClr val="0000FF"/>
+                </a:solidFill>
+                <a:latin typeface="Consolas" pitchFamily="49" charset="0"/>
+              </a:rPr>
+              <a:t>new</a:t>
+            </a:r>
+            <a:r>
+              <a:rPr lang="pt-PT" sz="1400" dirty="0" smtClean="0">
+                <a:solidFill>
+                  <a:srgbClr val="333333"/>
+                </a:solidFill>
+                <a:latin typeface="Consolas" pitchFamily="49" charset="0"/>
+              </a:rPr>
+              <a:t> </a:t>
+            </a:r>
+            <a:r>
+              <a:rPr lang="pt-PT" sz="1400" dirty="0" err="1" smtClean="0">
+                <a:solidFill>
+                  <a:srgbClr val="333333"/>
+                </a:solidFill>
+                <a:latin typeface="Consolas" pitchFamily="49" charset="0"/>
+              </a:rPr>
+              <a:t>JSONObject</a:t>
+            </a:r>
+            <a:r>
+              <a:rPr lang="pt-PT" sz="1400" dirty="0" smtClean="0">
+                <a:solidFill>
+                  <a:srgbClr val="333333"/>
+                </a:solidFill>
+                <a:latin typeface="Consolas" pitchFamily="49" charset="0"/>
+              </a:rPr>
+              <a:t>();</a:t>
+            </a:r>
+          </a:p>
+          <a:p>
+            <a:r>
+              <a:rPr lang="pt-PT" sz="1400" dirty="0" smtClean="0">
+                <a:solidFill>
+                  <a:srgbClr val="333333"/>
+                </a:solidFill>
+                <a:latin typeface="Consolas" pitchFamily="49" charset="0"/>
+              </a:rPr>
+              <a:t>  </a:t>
+            </a:r>
+            <a:r>
               <a:rPr lang="en-US" sz="1400" dirty="0" err="1" smtClean="0">
                 <a:solidFill>
                   <a:srgbClr val="333333"/>
                 </a:solidFill>
                 <a:latin typeface="Consolas" pitchFamily="49" charset="0"/>
               </a:rPr>
-              <a:t>JSONArray</a:t>
-            </a:r>
-            <a:r>
-              <a:rPr lang="en-US" sz="1400" dirty="0" smtClean="0">
-                <a:solidFill>
-                  <a:srgbClr val="333333"/>
-                </a:solidFill>
-                <a:latin typeface="Consolas" pitchFamily="49" charset="0"/>
-              </a:rPr>
-              <a:t> </a:t>
-            </a:r>
-            <a:r>
-              <a:rPr lang="en-US" sz="1400" dirty="0" err="1" smtClean="0">
-                <a:solidFill>
-                  <a:srgbClr val="333333"/>
-                </a:solidFill>
-                <a:latin typeface="Consolas" pitchFamily="49" charset="0"/>
-              </a:rPr>
-              <a:t>solvedTests</a:t>
-            </a:r>
-            <a:r>
-              <a:rPr lang="en-US" sz="1400" dirty="0" smtClean="0">
-                <a:solidFill>
-                  <a:srgbClr val="333333"/>
-                </a:solidFill>
-                <a:latin typeface="Consolas" pitchFamily="49" charset="0"/>
-              </a:rPr>
-              <a:t> = </a:t>
-            </a:r>
-            <a:r>
-              <a:rPr lang="en-US" sz="1400" dirty="0" smtClean="0">
-                <a:solidFill>
-                  <a:srgbClr val="0000FF"/>
-                </a:solidFill>
-                <a:latin typeface="Consolas" pitchFamily="49" charset="0"/>
-              </a:rPr>
-              <a:t>new</a:t>
-            </a:r>
-            <a:r>
-              <a:rPr lang="en-US" sz="1400" dirty="0" smtClean="0">
-                <a:solidFill>
-                  <a:srgbClr val="333333"/>
-                </a:solidFill>
-                <a:latin typeface="Consolas" pitchFamily="49" charset="0"/>
-              </a:rPr>
-              <a:t> </a:t>
-            </a:r>
-            <a:r>
-              <a:rPr lang="en-US" sz="1400" dirty="0" err="1" smtClean="0">
-                <a:solidFill>
-                  <a:srgbClr val="333333"/>
-                </a:solidFill>
-                <a:latin typeface="Consolas" pitchFamily="49" charset="0"/>
-              </a:rPr>
-              <a:t>JSONArray</a:t>
-            </a:r>
-            <a:r>
-              <a:rPr lang="en-US" sz="1400" dirty="0" smtClean="0">
-                <a:solidFill>
-                  <a:srgbClr val="333333"/>
-                </a:solidFill>
-                <a:latin typeface="Consolas" pitchFamily="49" charset="0"/>
-              </a:rPr>
-              <a:t>();</a:t>
-            </a:r>
-          </a:p>
-          <a:p>
-            <a:endParaRPr lang="en-US" sz="1400" dirty="0" smtClean="0">
-              <a:solidFill>
-                <a:srgbClr val="333333"/>
-              </a:solidFill>
-              <a:latin typeface="Consolas" pitchFamily="49" charset="0"/>
-            </a:endParaRPr>
-          </a:p>
-          <a:p>
-            <a:r>
-              <a:rPr lang="en-US" sz="1400" dirty="0" smtClean="0">
-                <a:solidFill>
-                  <a:srgbClr val="0000FF"/>
-                </a:solidFill>
-                <a:latin typeface="Consolas" pitchFamily="49" charset="0"/>
-              </a:rPr>
-              <a:t>for</a:t>
-            </a:r>
-            <a:r>
-              <a:rPr lang="en-US" sz="1400" dirty="0" smtClean="0">
-                <a:solidFill>
-                  <a:srgbClr val="333333"/>
-                </a:solidFill>
-                <a:latin typeface="Consolas" pitchFamily="49" charset="0"/>
-              </a:rPr>
-              <a:t> (Test t : </a:t>
-            </a:r>
-            <a:r>
-              <a:rPr lang="en-US" sz="1400" dirty="0" err="1" smtClean="0">
-                <a:solidFill>
-                  <a:srgbClr val="333333"/>
-                </a:solidFill>
-                <a:latin typeface="Consolas" pitchFamily="49" charset="0"/>
-              </a:rPr>
-              <a:t>testArray</a:t>
-            </a:r>
-            <a:r>
-              <a:rPr lang="en-US" sz="1400" dirty="0" smtClean="0">
-                <a:solidFill>
-                  <a:srgbClr val="333333"/>
-                </a:solidFill>
-                <a:latin typeface="Consolas" pitchFamily="49" charset="0"/>
-              </a:rPr>
-              <a:t>) {</a:t>
-            </a:r>
-          </a:p>
-          <a:p>
-            <a:r>
-              <a:rPr lang="en-US" sz="1400" dirty="0" smtClean="0">
-                <a:solidFill>
-                  <a:srgbClr val="333333"/>
-                </a:solidFill>
-                <a:latin typeface="Consolas" pitchFamily="49" charset="0"/>
-              </a:rPr>
-              <a:t>  </a:t>
-            </a:r>
-            <a:r>
-              <a:rPr lang="pt-PT" sz="1400" dirty="0" smtClean="0">
-                <a:solidFill>
-                  <a:srgbClr val="008000"/>
-                </a:solidFill>
-                <a:latin typeface="Consolas" pitchFamily="49" charset="0"/>
-              </a:rPr>
-              <a:t>// Criar uma nova entidade</a:t>
-            </a:r>
-            <a:endParaRPr lang="pt-PT" sz="1400" dirty="0" smtClean="0">
-              <a:solidFill>
-                <a:srgbClr val="333333"/>
-              </a:solidFill>
-              <a:latin typeface="Consolas" pitchFamily="49" charset="0"/>
-            </a:endParaRPr>
-          </a:p>
-          <a:p>
-            <a:r>
-              <a:rPr lang="pt-PT" sz="1400" dirty="0" smtClean="0">
-                <a:solidFill>
-                  <a:srgbClr val="333333"/>
-                </a:solidFill>
-                <a:latin typeface="Consolas" pitchFamily="49" charset="0"/>
-              </a:rPr>
-              <a:t>  </a:t>
-            </a:r>
-            <a:r>
-              <a:rPr lang="pt-PT" sz="1400" dirty="0" err="1" smtClean="0">
-                <a:solidFill>
-                  <a:srgbClr val="333333"/>
-                </a:solidFill>
-                <a:latin typeface="Consolas" pitchFamily="49" charset="0"/>
-              </a:rPr>
-              <a:t>JSONObject</a:t>
-            </a:r>
-            <a:r>
-              <a:rPr lang="pt-PT" sz="1400" dirty="0" smtClean="0">
-                <a:solidFill>
-                  <a:srgbClr val="333333"/>
-                </a:solidFill>
-                <a:latin typeface="Consolas" pitchFamily="49" charset="0"/>
-              </a:rPr>
-              <a:t> </a:t>
-            </a:r>
-            <a:r>
-              <a:rPr lang="pt-PT" sz="1400" dirty="0" err="1" smtClean="0">
-                <a:solidFill>
-                  <a:srgbClr val="333333"/>
-                </a:solidFill>
-                <a:latin typeface="Consolas" pitchFamily="49" charset="0"/>
-              </a:rPr>
-              <a:t>solvedTest</a:t>
-            </a:r>
-            <a:r>
-              <a:rPr lang="pt-PT" sz="1400" dirty="0" smtClean="0">
-                <a:solidFill>
-                  <a:srgbClr val="333333"/>
-                </a:solidFill>
-                <a:latin typeface="Consolas" pitchFamily="49" charset="0"/>
-              </a:rPr>
-              <a:t> = </a:t>
-            </a:r>
-            <a:r>
-              <a:rPr lang="pt-PT" sz="1400" dirty="0" err="1" smtClean="0">
-                <a:solidFill>
-                  <a:srgbClr val="0000FF"/>
-                </a:solidFill>
-                <a:latin typeface="Consolas" pitchFamily="49" charset="0"/>
-              </a:rPr>
-              <a:t>new</a:t>
-            </a:r>
-            <a:r>
-              <a:rPr lang="pt-PT" sz="1400" dirty="0" smtClean="0">
-                <a:solidFill>
-                  <a:srgbClr val="333333"/>
-                </a:solidFill>
-                <a:latin typeface="Consolas" pitchFamily="49" charset="0"/>
-              </a:rPr>
-              <a:t> </a:t>
-            </a:r>
-            <a:r>
-              <a:rPr lang="pt-PT" sz="1400" dirty="0" err="1" smtClean="0">
-                <a:solidFill>
-                  <a:srgbClr val="333333"/>
-                </a:solidFill>
-                <a:latin typeface="Consolas" pitchFamily="49" charset="0"/>
-              </a:rPr>
-              <a:t>JSONObject</a:t>
-            </a:r>
-            <a:r>
-              <a:rPr lang="pt-PT" sz="1400" dirty="0" smtClean="0">
-                <a:solidFill>
-                  <a:srgbClr val="333333"/>
-                </a:solidFill>
-                <a:latin typeface="Consolas" pitchFamily="49" charset="0"/>
-              </a:rPr>
-              <a:t>();</a:t>
-            </a:r>
-            <a:endParaRPr lang="pt-PT" sz="1400" dirty="0" smtClean="0">
-              <a:solidFill>
-                <a:srgbClr val="333333"/>
-              </a:solidFill>
-              <a:latin typeface="Consolas" pitchFamily="49" charset="0"/>
-            </a:endParaRPr>
-          </a:p>
-          <a:p>
-            <a:r>
-              <a:rPr lang="pt-PT" sz="1400" dirty="0" smtClean="0">
-                <a:solidFill>
-                  <a:srgbClr val="333333"/>
-                </a:solidFill>
-                <a:latin typeface="Consolas" pitchFamily="49" charset="0"/>
-              </a:rPr>
-              <a:t>  </a:t>
-            </a:r>
-            <a:r>
-              <a:rPr lang="en-US" sz="1400" dirty="0" err="1" smtClean="0">
-                <a:solidFill>
-                  <a:srgbClr val="333333"/>
-                </a:solidFill>
-                <a:latin typeface="Consolas" pitchFamily="49" charset="0"/>
-              </a:rPr>
               <a:t>solvedTest.put</a:t>
             </a:r>
             <a:r>
@@ -12967,16 +12648,7 @@
                 </a:solidFill>
                 <a:latin typeface="Consolas" pitchFamily="49" charset="0"/>
               </a:rPr>
-              <a:t>, t.id</a:t>
-            </a:r>
-            <a:r>
-              <a:rPr lang="en-US" sz="1400" dirty="0" smtClean="0">
-                <a:solidFill>
-                  <a:srgbClr val="333333"/>
-                </a:solidFill>
-                <a:latin typeface="Consolas" pitchFamily="49" charset="0"/>
-              </a:rPr>
-              <a:t>);</a:t>
+              <a:t>, t.id);</a:t>
             </a:r>
             <a:endParaRPr lang="pt-PT" sz="1400" dirty="0" smtClean="0">
               <a:solidFill>
@@ -13380,7 +13052,15 @@
           <a:p>
             <a:r>
               <a:rPr lang="pt-PT" dirty="0" smtClean="0"/>
-              <a:t>Modular, com recurso a bibliotecas e ao pub</a:t>
+              <a:t>Modular, com recurso a </a:t>
+            </a:r>
+            <a:r>
+              <a:rPr lang="pt-PT" dirty="0" smtClean="0"/>
+              <a:t>packages e </a:t>
+            </a:r>
+            <a:r>
+              <a:rPr lang="pt-PT" dirty="0" smtClean="0"/>
+              <a:t>ao pub</a:t>
             </a:r>
           </a:p>
           <a:p>
@@ -13406,10 +13086,6 @@
             <a:r>
               <a:rPr lang="pt-PT" dirty="0" err="1" smtClean="0"/>
               <a:t>source</a:t>
-            </a:r>
-            <a:r>
-              <a:rPr lang="pt-PT" dirty="0" smtClean="0"/>
-              <a:t> e comunidade ativa</a:t>
             </a:r>
             <a:endParaRPr lang="pt-PT" dirty="0"/>
           </a:p>
@@ -13879,21 +13555,21 @@
           <a:p>
             <a:r>
               <a:rPr lang="pt-PT" dirty="0" smtClean="0"/>
-              <a:t>Forte API base de I/O (</a:t>
-            </a:r>
-            <a:r>
-              <a:rPr lang="pt-PT" dirty="0" err="1" smtClean="0"/>
-              <a:t>dart:io</a:t>
+              <a:t>Forte API </a:t>
             </a:r>
             <a:r>
               <a:rPr lang="pt-PT" dirty="0" smtClean="0"/>
-              <a:t>)</a:t>
+              <a:t>base</a:t>
             </a:r>
           </a:p>
           <a:p>
             <a:r>
               <a:rPr lang="pt-PT" dirty="0" smtClean="0"/>
-              <a:t>Excelente documentação das </a:t>
+              <a:t>Excelente </a:t>
+            </a:r>
+            <a:r>
+              <a:rPr lang="pt-PT" dirty="0" smtClean="0"/>
+              <a:t>documentação das </a:t>
             </a:r>
             <a:r>
               <a:rPr lang="pt-PT" dirty="0" err="1" smtClean="0"/>
@@ -13914,44 +13590,17 @@
           <a:p>
             <a:r>
               <a:rPr lang="pt-PT" dirty="0" smtClean="0"/>
-              <a:t>Existência de bibliotecas e </a:t>
-            </a:r>
-            <a:r>
-              <a:rPr lang="pt-PT" dirty="0" err="1" smtClean="0"/>
-              <a:t>frameworks</a:t>
-            </a:r>
+              <a:t>I/O assíncrona</a:t>
+            </a:r>
+          </a:p>
+          <a:p>
             <a:r>
               <a:rPr lang="pt-PT" dirty="0" smtClean="0"/>
-              <a:t>:</a:t>
-            </a:r>
-          </a:p>
-          <a:p>
-            <a:pPr lvl="1"/>
+              <a:t>Performance </a:t>
+            </a:r>
             <a:r>
               <a:rPr lang="pt-PT" dirty="0" smtClean="0"/>
-              <a:t>Suporte para </a:t>
-            </a:r>
-            <a:r>
-              <a:rPr lang="pt-PT" dirty="0" err="1" smtClean="0"/>
-              <a:t>MySQL</a:t>
-            </a:r>
-            <a:r>
-              <a:rPr lang="pt-PT" dirty="0" smtClean="0"/>
-              <a:t> e </a:t>
-            </a:r>
-            <a:r>
-              <a:rPr lang="pt-PT" dirty="0" err="1" smtClean="0"/>
-              <a:t>webservices</a:t>
-            </a:r>
-            <a:r>
-              <a:rPr lang="pt-PT" dirty="0" smtClean="0"/>
-              <a:t>/websites</a:t>
-            </a:r>
-          </a:p>
-          <a:p>
-            <a:r>
-              <a:rPr lang="pt-PT" dirty="0" smtClean="0"/>
-              <a:t>Performance melhor que </a:t>
+              <a:t>melhor que </a:t>
             </a:r>
             <a:r>
               <a:rPr lang="pt-PT" dirty="0" err="1" smtClean="0"/>
@@ -13963,6 +13612,10 @@
             </a:r>
           </a:p>
           <a:p>
+            <a:r>
+              <a:rPr lang="pt-PT" dirty="0" smtClean="0"/>
+              <a:t>Comunidade em crescimento</a:t>
+            </a:r>
             <a:endParaRPr lang="pt-PT" dirty="0"/>
           </a:p>
         </p:txBody>
@@ -14178,6 +13831,21 @@
           <a:p>
             <a:r>
               <a:rPr lang="pt-PT" dirty="0" smtClean="0"/>
+              <a:t>Menos </a:t>
+            </a:r>
+            <a:r>
+              <a:rPr lang="pt-PT" dirty="0" err="1" smtClean="0"/>
+              <a:t>frameworks</a:t>
+            </a:r>
+            <a:r>
+              <a:rPr lang="pt-PT" dirty="0" smtClean="0"/>
+              <a:t>/bibliotecas do que o Node</a:t>
+            </a:r>
+          </a:p>
+          <a:p>
+            <a:pPr lvl="1"/>
+            <a:r>
+              <a:rPr lang="pt-PT" dirty="0" smtClean="0"/>
               <a:t>Conector </a:t>
             </a:r>
             <a:r>
@@ -14186,8 +13854,28 @@
             </a:r>
             <a:r>
               <a:rPr lang="pt-PT" dirty="0" smtClean="0"/>
-              <a:t> ainda em desenvolvimento (API estável)</a:t>
-            </a:r>
+              <a:t> ainda em desenvolvimento (</a:t>
+            </a:r>
+            <a:r>
+              <a:rPr lang="pt-PT" dirty="0" smtClean="0"/>
+              <a:t>API é </a:t>
+            </a:r>
+            <a:r>
+              <a:rPr lang="pt-PT" dirty="0" smtClean="0"/>
+              <a:t>estável</a:t>
+            </a:r>
+            <a:r>
+              <a:rPr lang="pt-PT" dirty="0" smtClean="0"/>
+              <a:t>)</a:t>
+            </a:r>
+          </a:p>
+          <a:p>
+            <a:pPr lvl="1"/>
+            <a:r>
+              <a:rPr lang="pt-PT" dirty="0" smtClean="0"/>
+              <a:t>Poderá implicar mais trabalho da nossa parte</a:t>
+            </a:r>
+            <a:endParaRPr lang="pt-PT" dirty="0" smtClean="0"/>
           </a:p>
           <a:p>
             <a:endParaRPr lang="pt-PT" dirty="0" smtClean="0"/>
@@ -14311,13 +13999,7 @@
               <a:rPr lang="pt-PT" sz="2000" dirty="0" smtClean="0">
                 <a:hlinkClick r:id="rId3"/>
               </a:rPr>
-              <a:t>https://</a:t>
-            </a:r>
-            <a:r>
-              <a:rPr lang="pt-PT" sz="2000" dirty="0" smtClean="0">
-                <a:hlinkClick r:id="rId3"/>
-              </a:rPr>
-              <a:t>github.com/felixge/node-mysql</a:t>
+              <a:t>https://github.com/felixge/node-mysql</a:t>
             </a:r>
             <a:endParaRPr lang="pt-PT" sz="2000" dirty="0" smtClean="0"/>
           </a:p>

</xml_diff>